<commit_message>
forgot to sync :(
</commit_message>
<xml_diff>
--- a/docs/meetings/WP3.3/architectures_solutions_new.pptx
+++ b/docs/meetings/WP3.3/architectures_solutions_new.pptx
@@ -11,6 +11,7 @@
     <p:sldId id="257" r:id="rId5"/>
     <p:sldId id="258" r:id="rId6"/>
     <p:sldId id="263" r:id="rId7"/>
+    <p:sldId id="264" r:id="rId8"/>
   </p:sldIdLst>
   <p:sldSz cx="9144000" cy="6858000" type="screen4x3"/>
   <p:notesSz cx="6858000" cy="9144000"/>
@@ -293,7 +294,7 @@
           <a:p>
             <a:fld id="{519BC0D5-E863-414A-87A7-748B4A81AC5F}" type="datetimeFigureOut">
               <a:rPr lang="fr-FR" smtClean="0"/>
-              <a:t>20/07/2015</a:t>
+              <a:t>29/07/2015</a:t>
             </a:fld>
             <a:endParaRPr lang="fr-FR"/>
           </a:p>
@@ -463,7 +464,7 @@
           <a:p>
             <a:fld id="{519BC0D5-E863-414A-87A7-748B4A81AC5F}" type="datetimeFigureOut">
               <a:rPr lang="fr-FR" smtClean="0"/>
-              <a:t>20/07/2015</a:t>
+              <a:t>29/07/2015</a:t>
             </a:fld>
             <a:endParaRPr lang="fr-FR"/>
           </a:p>
@@ -643,7 +644,7 @@
           <a:p>
             <a:fld id="{519BC0D5-E863-414A-87A7-748B4A81AC5F}" type="datetimeFigureOut">
               <a:rPr lang="fr-FR" smtClean="0"/>
-              <a:t>20/07/2015</a:t>
+              <a:t>29/07/2015</a:t>
             </a:fld>
             <a:endParaRPr lang="fr-FR"/>
           </a:p>
@@ -813,7 +814,7 @@
           <a:p>
             <a:fld id="{519BC0D5-E863-414A-87A7-748B4A81AC5F}" type="datetimeFigureOut">
               <a:rPr lang="fr-FR" smtClean="0"/>
-              <a:t>20/07/2015</a:t>
+              <a:t>29/07/2015</a:t>
             </a:fld>
             <a:endParaRPr lang="fr-FR"/>
           </a:p>
@@ -1059,7 +1060,7 @@
           <a:p>
             <a:fld id="{519BC0D5-E863-414A-87A7-748B4A81AC5F}" type="datetimeFigureOut">
               <a:rPr lang="fr-FR" smtClean="0"/>
-              <a:t>20/07/2015</a:t>
+              <a:t>29/07/2015</a:t>
             </a:fld>
             <a:endParaRPr lang="fr-FR"/>
           </a:p>
@@ -1347,7 +1348,7 @@
           <a:p>
             <a:fld id="{519BC0D5-E863-414A-87A7-748B4A81AC5F}" type="datetimeFigureOut">
               <a:rPr lang="fr-FR" smtClean="0"/>
-              <a:t>20/07/2015</a:t>
+              <a:t>29/07/2015</a:t>
             </a:fld>
             <a:endParaRPr lang="fr-FR"/>
           </a:p>
@@ -1769,7 +1770,7 @@
           <a:p>
             <a:fld id="{519BC0D5-E863-414A-87A7-748B4A81AC5F}" type="datetimeFigureOut">
               <a:rPr lang="fr-FR" smtClean="0"/>
-              <a:t>20/07/2015</a:t>
+              <a:t>29/07/2015</a:t>
             </a:fld>
             <a:endParaRPr lang="fr-FR"/>
           </a:p>
@@ -1887,7 +1888,7 @@
           <a:p>
             <a:fld id="{519BC0D5-E863-414A-87A7-748B4A81AC5F}" type="datetimeFigureOut">
               <a:rPr lang="fr-FR" smtClean="0"/>
-              <a:t>20/07/2015</a:t>
+              <a:t>29/07/2015</a:t>
             </a:fld>
             <a:endParaRPr lang="fr-FR"/>
           </a:p>
@@ -1982,7 +1983,7 @@
           <a:p>
             <a:fld id="{519BC0D5-E863-414A-87A7-748B4A81AC5F}" type="datetimeFigureOut">
               <a:rPr lang="fr-FR" smtClean="0"/>
-              <a:t>20/07/2015</a:t>
+              <a:t>29/07/2015</a:t>
             </a:fld>
             <a:endParaRPr lang="fr-FR"/>
           </a:p>
@@ -2259,7 +2260,7 @@
           <a:p>
             <a:fld id="{519BC0D5-E863-414A-87A7-748B4A81AC5F}" type="datetimeFigureOut">
               <a:rPr lang="fr-FR" smtClean="0"/>
-              <a:t>20/07/2015</a:t>
+              <a:t>29/07/2015</a:t>
             </a:fld>
             <a:endParaRPr lang="fr-FR"/>
           </a:p>
@@ -2512,7 +2513,7 @@
           <a:p>
             <a:fld id="{519BC0D5-E863-414A-87A7-748B4A81AC5F}" type="datetimeFigureOut">
               <a:rPr lang="fr-FR" smtClean="0"/>
-              <a:t>20/07/2015</a:t>
+              <a:t>29/07/2015</a:t>
             </a:fld>
             <a:endParaRPr lang="fr-FR"/>
           </a:p>
@@ -2725,7 +2726,7 @@
           <a:p>
             <a:fld id="{519BC0D5-E863-414A-87A7-748B4A81AC5F}" type="datetimeFigureOut">
               <a:rPr lang="fr-FR" smtClean="0"/>
-              <a:t>20/07/2015</a:t>
+              <a:t>29/07/2015</a:t>
             </a:fld>
             <a:endParaRPr lang="fr-FR"/>
           </a:p>
@@ -5559,6 +5560,45 @@
       </p:grpSpPr>
       <p:sp>
         <p:nvSpPr>
+          <p:cNvPr id="3" name="Nuage 2"/>
+          <p:cNvSpPr/>
+          <p:nvPr/>
+        </p:nvSpPr>
+        <p:spPr>
+          <a:xfrm>
+            <a:off x="2217319" y="4437112"/>
+            <a:ext cx="3197194" cy="1963760"/>
+          </a:xfrm>
+          <a:prstGeom prst="cloud">
+            <a:avLst/>
+          </a:prstGeom>
+          <a:ln w="9525"/>
+        </p:spPr>
+        <p:style>
+          <a:lnRef idx="2">
+            <a:schemeClr val="dk1"/>
+          </a:lnRef>
+          <a:fillRef idx="1">
+            <a:schemeClr val="lt1"/>
+          </a:fillRef>
+          <a:effectRef idx="0">
+            <a:schemeClr val="dk1"/>
+          </a:effectRef>
+          <a:fontRef idx="minor">
+            <a:schemeClr val="dk1"/>
+          </a:fontRef>
+        </p:style>
+        <p:txBody>
+          <a:bodyPr rtlCol="0" anchor="ctr"/>
+          <a:lstStyle/>
+          <a:p>
+            <a:pPr algn="ctr"/>
+            <a:endParaRPr lang="fr-FR" sz="1200"/>
+          </a:p>
+        </p:txBody>
+      </p:sp>
+      <p:sp>
+        <p:nvSpPr>
           <p:cNvPr id="41" name="Nuage 2"/>
           <p:cNvSpPr/>
           <p:nvPr/>
@@ -5620,52 +5660,17 @@
           <a:p>
             <a:r>
               <a:rPr lang="en-US" sz="2800" dirty="0" smtClean="0"/>
-              <a:t>Architecture </a:t>
+              <a:t>Architecture 3 (for </a:t>
             </a:r>
             <a:r>
               <a:rPr lang="en-US" sz="2800" dirty="0" smtClean="0"/>
-              <a:t>3 (for mobile connected devices)</a:t>
+              <a:t>mobile connected </a:t>
+            </a:r>
+            <a:r>
+              <a:rPr lang="en-US" sz="2800" dirty="0" smtClean="0"/>
+              <a:t>devices)</a:t>
             </a:r>
             <a:endParaRPr lang="fr-FR" sz="2800" dirty="0"/>
-          </a:p>
-        </p:txBody>
-      </p:sp>
-      <p:sp>
-        <p:nvSpPr>
-          <p:cNvPr id="3" name="Nuage 2"/>
-          <p:cNvSpPr/>
-          <p:nvPr/>
-        </p:nvSpPr>
-        <p:spPr>
-          <a:xfrm>
-            <a:off x="2433057" y="4725144"/>
-            <a:ext cx="2895027" cy="1413913"/>
-          </a:xfrm>
-          <a:prstGeom prst="cloud">
-            <a:avLst/>
-          </a:prstGeom>
-          <a:ln w="9525"/>
-        </p:spPr>
-        <p:style>
-          <a:lnRef idx="2">
-            <a:schemeClr val="dk1"/>
-          </a:lnRef>
-          <a:fillRef idx="1">
-            <a:schemeClr val="lt1"/>
-          </a:fillRef>
-          <a:effectRef idx="0">
-            <a:schemeClr val="dk1"/>
-          </a:effectRef>
-          <a:fontRef idx="minor">
-            <a:schemeClr val="dk1"/>
-          </a:fontRef>
-        </p:style>
-        <p:txBody>
-          <a:bodyPr rtlCol="0" anchor="ctr"/>
-          <a:lstStyle/>
-          <a:p>
-            <a:pPr algn="ctr"/>
-            <a:endParaRPr lang="fr-FR" sz="1200"/>
           </a:p>
         </p:txBody>
       </p:sp>
@@ -5678,7 +5683,7 @@
         <p:spPr>
           <a:xfrm>
             <a:off x="258873" y="4563020"/>
-            <a:ext cx="864096" cy="1710083"/>
+            <a:ext cx="864096" cy="2178348"/>
           </a:xfrm>
           <a:prstGeom prst="roundRect">
             <a:avLst/>
@@ -5913,12 +5918,20 @@
           <a:p>
             <a:pPr algn="ctr"/>
             <a:r>
+              <a:rPr lang="en-US" sz="1200" dirty="0" err="1" smtClean="0">
+                <a:solidFill>
+                  <a:schemeClr val="dk1"/>
+                </a:solidFill>
+              </a:rPr>
+              <a:t>WebrRTC</a:t>
+            </a:r>
+            <a:r>
               <a:rPr lang="en-US" sz="1200" dirty="0" smtClean="0">
                 <a:solidFill>
                   <a:schemeClr val="dk1"/>
                 </a:solidFill>
               </a:rPr>
-              <a:t>Web </a:t>
+              <a:t>/Web </a:t>
             </a:r>
             <a:r>
               <a:rPr lang="en-US" sz="1200" dirty="0" smtClean="0">
@@ -5956,14 +5969,13 @@
           <p:cNvPr id="11" name="Connecteur droit avec flèche 10"/>
           <p:cNvCxnSpPr>
             <a:stCxn id="6" idx="1"/>
-            <a:endCxn id="4" idx="3"/>
           </p:cNvCxnSpPr>
           <p:nvPr/>
         </p:nvCxnSpPr>
         <p:spPr>
           <a:xfrm flipH="1">
             <a:off x="1122969" y="5276266"/>
-            <a:ext cx="1720840" cy="141796"/>
+            <a:ext cx="1720840" cy="148815"/>
           </a:xfrm>
           <a:prstGeom prst="straightConnector1">
             <a:avLst/>
@@ -6193,7 +6205,7 @@
             <a:avLst/>
           </a:prstGeom>
           <a:ln w="9525">
-            <a:prstDash val="dash"/>
+            <a:prstDash val="solid"/>
           </a:ln>
         </p:spPr>
         <p:style>
@@ -7048,10 +7060,1989 @@
           </a:p>
         </p:txBody>
       </p:sp>
+      <p:sp>
+        <p:nvSpPr>
+          <p:cNvPr id="56" name="Rectangle à coins arrondis 3"/>
+          <p:cNvSpPr/>
+          <p:nvPr/>
+        </p:nvSpPr>
+        <p:spPr>
+          <a:xfrm>
+            <a:off x="8711952" y="5879393"/>
+            <a:ext cx="864096" cy="967613"/>
+          </a:xfrm>
+          <a:prstGeom prst="roundRect">
+            <a:avLst/>
+          </a:prstGeom>
+          <a:ln w="9525"/>
+        </p:spPr>
+        <p:style>
+          <a:lnRef idx="2">
+            <a:schemeClr val="dk1"/>
+          </a:lnRef>
+          <a:fillRef idx="1">
+            <a:schemeClr val="lt1"/>
+          </a:fillRef>
+          <a:effectRef idx="0">
+            <a:schemeClr val="dk1"/>
+          </a:effectRef>
+          <a:fontRef idx="minor">
+            <a:schemeClr val="dk1"/>
+          </a:fontRef>
+        </p:style>
+        <p:txBody>
+          <a:bodyPr rtlCol="0" anchor="ctr"/>
+          <a:lstStyle/>
+          <a:p>
+            <a:pPr algn="ctr"/>
+            <a:r>
+              <a:rPr lang="de-DE" sz="1200" dirty="0" smtClean="0"/>
+              <a:t>Other Peer</a:t>
+            </a:r>
+            <a:endParaRPr lang="en-US" sz="1200" dirty="0" smtClean="0"/>
+          </a:p>
+        </p:txBody>
+      </p:sp>
     </p:spTree>
     <p:extLst>
       <p:ext uri="{BB962C8B-B14F-4D97-AF65-F5344CB8AC3E}">
         <p14:creationId xmlns:p14="http://schemas.microsoft.com/office/powerpoint/2010/main" val="2523724920"/>
+      </p:ext>
+    </p:extLst>
+  </p:cSld>
+  <p:clrMapOvr>
+    <a:masterClrMapping/>
+  </p:clrMapOvr>
+</p:sld>
+</file>
+
+<file path=ppt/slides/slide7.xml><?xml version="1.0" encoding="utf-8"?>
+<p:sld xmlns:a="http://schemas.openxmlformats.org/drawingml/2006/main" xmlns:r="http://schemas.openxmlformats.org/officeDocument/2006/relationships" xmlns:p="http://schemas.openxmlformats.org/presentationml/2006/main">
+  <p:cSld>
+    <p:spTree>
+      <p:nvGrpSpPr>
+        <p:cNvPr id="1" name=""/>
+        <p:cNvGrpSpPr/>
+        <p:nvPr/>
+      </p:nvGrpSpPr>
+      <p:grpSpPr>
+        <a:xfrm>
+          <a:off x="0" y="0"/>
+          <a:ext cx="0" cy="0"/>
+          <a:chOff x="0" y="0"/>
+          <a:chExt cx="0" cy="0"/>
+        </a:xfrm>
+      </p:grpSpPr>
+      <p:sp>
+        <p:nvSpPr>
+          <p:cNvPr id="3" name="Nuage 2"/>
+          <p:cNvSpPr/>
+          <p:nvPr/>
+        </p:nvSpPr>
+        <p:spPr>
+          <a:xfrm>
+            <a:off x="899592" y="3889844"/>
+            <a:ext cx="3197194" cy="2249214"/>
+          </a:xfrm>
+          <a:prstGeom prst="cloud">
+            <a:avLst/>
+          </a:prstGeom>
+          <a:ln w="9525"/>
+        </p:spPr>
+        <p:style>
+          <a:lnRef idx="2">
+            <a:schemeClr val="dk1"/>
+          </a:lnRef>
+          <a:fillRef idx="1">
+            <a:schemeClr val="lt1"/>
+          </a:fillRef>
+          <a:effectRef idx="0">
+            <a:schemeClr val="dk1"/>
+          </a:effectRef>
+          <a:fontRef idx="minor">
+            <a:schemeClr val="dk1"/>
+          </a:fontRef>
+        </p:style>
+        <p:txBody>
+          <a:bodyPr rtlCol="0" anchor="ctr"/>
+          <a:lstStyle/>
+          <a:p>
+            <a:pPr algn="ctr"/>
+            <a:endParaRPr lang="fr-FR" sz="1200"/>
+          </a:p>
+        </p:txBody>
+      </p:sp>
+      <p:sp>
+        <p:nvSpPr>
+          <p:cNvPr id="35" name="Nuage 2"/>
+          <p:cNvSpPr/>
+          <p:nvPr/>
+        </p:nvSpPr>
+        <p:spPr>
+          <a:xfrm>
+            <a:off x="902386" y="5751377"/>
+            <a:ext cx="2913530" cy="1401192"/>
+          </a:xfrm>
+          <a:prstGeom prst="cloud">
+            <a:avLst/>
+          </a:prstGeom>
+          <a:ln w="9525"/>
+        </p:spPr>
+        <p:style>
+          <a:lnRef idx="2">
+            <a:schemeClr val="dk1"/>
+          </a:lnRef>
+          <a:fillRef idx="1">
+            <a:schemeClr val="lt1"/>
+          </a:fillRef>
+          <a:effectRef idx="0">
+            <a:schemeClr val="dk1"/>
+          </a:effectRef>
+          <a:fontRef idx="minor">
+            <a:schemeClr val="dk1"/>
+          </a:fontRef>
+        </p:style>
+        <p:txBody>
+          <a:bodyPr rtlCol="0" anchor="ctr"/>
+          <a:lstStyle/>
+          <a:p>
+            <a:pPr algn="ctr"/>
+            <a:endParaRPr lang="fr-FR" sz="1200"/>
+          </a:p>
+        </p:txBody>
+      </p:sp>
+      <p:sp>
+        <p:nvSpPr>
+          <p:cNvPr id="41" name="Nuage 2"/>
+          <p:cNvSpPr/>
+          <p:nvPr/>
+        </p:nvSpPr>
+        <p:spPr>
+          <a:xfrm>
+            <a:off x="5220071" y="4599187"/>
+            <a:ext cx="3672409" cy="1926157"/>
+          </a:xfrm>
+          <a:prstGeom prst="cloud">
+            <a:avLst/>
+          </a:prstGeom>
+          <a:ln w="9525"/>
+        </p:spPr>
+        <p:style>
+          <a:lnRef idx="2">
+            <a:schemeClr val="dk1"/>
+          </a:lnRef>
+          <a:fillRef idx="1">
+            <a:schemeClr val="lt1"/>
+          </a:fillRef>
+          <a:effectRef idx="0">
+            <a:schemeClr val="dk1"/>
+          </a:effectRef>
+          <a:fontRef idx="minor">
+            <a:schemeClr val="dk1"/>
+          </a:fontRef>
+        </p:style>
+        <p:txBody>
+          <a:bodyPr rtlCol="0" anchor="ctr"/>
+          <a:lstStyle/>
+          <a:p>
+            <a:pPr algn="ctr"/>
+            <a:endParaRPr lang="fr-FR" sz="1200"/>
+          </a:p>
+        </p:txBody>
+      </p:sp>
+      <p:sp>
+        <p:nvSpPr>
+          <p:cNvPr id="2" name="Titre 1"/>
+          <p:cNvSpPr>
+            <a:spLocks noGrp="1"/>
+          </p:cNvSpPr>
+          <p:nvPr>
+            <p:ph type="title"/>
+          </p:nvPr>
+        </p:nvSpPr>
+        <p:spPr>
+          <a:xfrm>
+            <a:off x="457200" y="274638"/>
+            <a:ext cx="8229600" cy="706090"/>
+          </a:xfrm>
+        </p:spPr>
+        <p:txBody>
+          <a:bodyPr>
+            <a:noAutofit/>
+          </a:bodyPr>
+          <a:lstStyle/>
+          <a:p>
+            <a:r>
+              <a:rPr lang="en-US" sz="2800" dirty="0" smtClean="0"/>
+              <a:t>Architecture </a:t>
+            </a:r>
+            <a:r>
+              <a:rPr lang="en-US" sz="2800" dirty="0" smtClean="0"/>
+              <a:t>4 </a:t>
+            </a:r>
+            <a:r>
+              <a:rPr lang="en-US" sz="2800" dirty="0" smtClean="0"/>
+              <a:t>(for </a:t>
+            </a:r>
+            <a:r>
+              <a:rPr lang="en-US" sz="2800" dirty="0" err="1" smtClean="0"/>
+              <a:t>mobile+fixed</a:t>
+            </a:r>
+            <a:r>
+              <a:rPr lang="en-US" sz="2800" dirty="0" smtClean="0"/>
+              <a:t> connected </a:t>
+            </a:r>
+            <a:r>
+              <a:rPr lang="en-US" sz="2800" dirty="0" smtClean="0"/>
+              <a:t>devices)</a:t>
+            </a:r>
+            <a:endParaRPr lang="fr-FR" sz="2800" dirty="0"/>
+          </a:p>
+        </p:txBody>
+      </p:sp>
+      <p:sp>
+        <p:nvSpPr>
+          <p:cNvPr id="4" name="Rectangle à coins arrondis 3"/>
+          <p:cNvSpPr/>
+          <p:nvPr/>
+        </p:nvSpPr>
+        <p:spPr>
+          <a:xfrm>
+            <a:off x="258873" y="4563020"/>
+            <a:ext cx="864096" cy="2178348"/>
+          </a:xfrm>
+          <a:prstGeom prst="roundRect">
+            <a:avLst/>
+          </a:prstGeom>
+          <a:ln w="9525"/>
+        </p:spPr>
+        <p:style>
+          <a:lnRef idx="2">
+            <a:schemeClr val="dk1"/>
+          </a:lnRef>
+          <a:fillRef idx="1">
+            <a:schemeClr val="lt1"/>
+          </a:fillRef>
+          <a:effectRef idx="0">
+            <a:schemeClr val="dk1"/>
+          </a:effectRef>
+          <a:fontRef idx="minor">
+            <a:schemeClr val="dk1"/>
+          </a:fontRef>
+        </p:style>
+        <p:txBody>
+          <a:bodyPr rtlCol="0" anchor="ctr"/>
+          <a:lstStyle/>
+          <a:p>
+            <a:pPr algn="ctr"/>
+            <a:endParaRPr lang="en-US" sz="1200" dirty="0" smtClean="0"/>
+          </a:p>
+          <a:p>
+            <a:pPr algn="ctr"/>
+            <a:endParaRPr lang="en-US" sz="1200" dirty="0"/>
+          </a:p>
+          <a:p>
+            <a:pPr algn="ctr"/>
+            <a:endParaRPr lang="en-US" sz="1200" dirty="0" smtClean="0"/>
+          </a:p>
+          <a:p>
+            <a:pPr algn="ctr"/>
+            <a:endParaRPr lang="en-US" sz="1200" dirty="0"/>
+          </a:p>
+          <a:p>
+            <a:pPr algn="ctr"/>
+            <a:endParaRPr lang="en-US" sz="1200" dirty="0" smtClean="0"/>
+          </a:p>
+          <a:p>
+            <a:pPr algn="ctr"/>
+            <a:r>
+              <a:rPr lang="en-US" sz="1200" dirty="0" smtClean="0"/>
+              <a:t>UE</a:t>
+            </a:r>
+            <a:endParaRPr lang="fr-FR" sz="1200" dirty="0"/>
+          </a:p>
+        </p:txBody>
+      </p:sp>
+      <p:sp>
+        <p:nvSpPr>
+          <p:cNvPr id="5" name="Rectangle à coins arrondis 4"/>
+          <p:cNvSpPr/>
+          <p:nvPr/>
+        </p:nvSpPr>
+        <p:spPr>
+          <a:xfrm>
+            <a:off x="342881" y="4761780"/>
+            <a:ext cx="700727" cy="394635"/>
+          </a:xfrm>
+          <a:prstGeom prst="roundRect">
+            <a:avLst/>
+          </a:prstGeom>
+          <a:ln w="9525"/>
+        </p:spPr>
+        <p:style>
+          <a:lnRef idx="2">
+            <a:schemeClr val="dk1"/>
+          </a:lnRef>
+          <a:fillRef idx="1">
+            <a:schemeClr val="lt1"/>
+          </a:fillRef>
+          <a:effectRef idx="0">
+            <a:schemeClr val="dk1"/>
+          </a:effectRef>
+          <a:fontRef idx="minor">
+            <a:schemeClr val="dk1"/>
+          </a:fontRef>
+        </p:style>
+        <p:txBody>
+          <a:bodyPr rtlCol="0" anchor="ctr"/>
+          <a:lstStyle/>
+          <a:p>
+            <a:pPr algn="ctr"/>
+            <a:r>
+              <a:rPr lang="en-US" sz="1200" dirty="0"/>
+              <a:t>App</a:t>
+            </a:r>
+            <a:endParaRPr lang="fr-FR" sz="1200" dirty="0"/>
+          </a:p>
+        </p:txBody>
+      </p:sp>
+      <p:sp>
+        <p:nvSpPr>
+          <p:cNvPr id="6" name="Rectangle à coins arrondis 5"/>
+          <p:cNvSpPr/>
+          <p:nvPr/>
+        </p:nvSpPr>
+        <p:spPr>
+          <a:xfrm>
+            <a:off x="2843809" y="5013176"/>
+            <a:ext cx="1152128" cy="526179"/>
+          </a:xfrm>
+          <a:prstGeom prst="roundRect">
+            <a:avLst/>
+          </a:prstGeom>
+          <a:ln w="9525"/>
+        </p:spPr>
+        <p:style>
+          <a:lnRef idx="2">
+            <a:schemeClr val="dk1"/>
+          </a:lnRef>
+          <a:fillRef idx="1">
+            <a:schemeClr val="lt1"/>
+          </a:fillRef>
+          <a:effectRef idx="0">
+            <a:schemeClr val="dk1"/>
+          </a:effectRef>
+          <a:fontRef idx="minor">
+            <a:schemeClr val="dk1"/>
+          </a:fontRef>
+        </p:style>
+        <p:txBody>
+          <a:bodyPr rtlCol="0" anchor="ctr"/>
+          <a:lstStyle/>
+          <a:p>
+            <a:pPr algn="ctr"/>
+            <a:r>
+              <a:rPr lang="en-US" sz="1200" dirty="0" smtClean="0">
+                <a:solidFill>
+                  <a:schemeClr val="dk1"/>
+                </a:solidFill>
+              </a:rPr>
+              <a:t>PDN Gateway</a:t>
+            </a:r>
+            <a:endParaRPr lang="fr-FR" sz="1200" dirty="0">
+              <a:solidFill>
+                <a:schemeClr val="dk1"/>
+              </a:solidFill>
+            </a:endParaRPr>
+          </a:p>
+        </p:txBody>
+      </p:sp>
+      <p:sp>
+        <p:nvSpPr>
+          <p:cNvPr id="8" name="Rectangle à coins arrondis 7"/>
+          <p:cNvSpPr/>
+          <p:nvPr/>
+        </p:nvSpPr>
+        <p:spPr>
+          <a:xfrm>
+            <a:off x="2999825" y="4077498"/>
+            <a:ext cx="816091" cy="526179"/>
+          </a:xfrm>
+          <a:prstGeom prst="roundRect">
+            <a:avLst/>
+          </a:prstGeom>
+          <a:ln w="9525"/>
+        </p:spPr>
+        <p:style>
+          <a:lnRef idx="2">
+            <a:schemeClr val="dk1"/>
+          </a:lnRef>
+          <a:fillRef idx="1">
+            <a:schemeClr val="lt1"/>
+          </a:fillRef>
+          <a:effectRef idx="0">
+            <a:schemeClr val="dk1"/>
+          </a:effectRef>
+          <a:fontRef idx="minor">
+            <a:schemeClr val="dk1"/>
+          </a:fontRef>
+        </p:style>
+        <p:txBody>
+          <a:bodyPr rtlCol="0" anchor="ctr"/>
+          <a:lstStyle/>
+          <a:p>
+            <a:pPr algn="ctr"/>
+            <a:r>
+              <a:rPr lang="en-US" sz="1200" dirty="0" smtClean="0">
+                <a:solidFill>
+                  <a:schemeClr val="dk1"/>
+                </a:solidFill>
+              </a:rPr>
+              <a:t>PCRF</a:t>
+            </a:r>
+            <a:endParaRPr lang="fr-FR" sz="1200" dirty="0">
+              <a:solidFill>
+                <a:schemeClr val="dk1"/>
+              </a:solidFill>
+            </a:endParaRPr>
+          </a:p>
+        </p:txBody>
+      </p:sp>
+      <p:sp>
+        <p:nvSpPr>
+          <p:cNvPr id="10" name="Rectangle à coins arrondis 9"/>
+          <p:cNvSpPr/>
+          <p:nvPr/>
+        </p:nvSpPr>
+        <p:spPr>
+          <a:xfrm>
+            <a:off x="3147796" y="1848618"/>
+            <a:ext cx="2326457" cy="526179"/>
+          </a:xfrm>
+          <a:prstGeom prst="roundRect">
+            <a:avLst/>
+          </a:prstGeom>
+          <a:ln w="9525"/>
+        </p:spPr>
+        <p:style>
+          <a:lnRef idx="2">
+            <a:schemeClr val="dk1"/>
+          </a:lnRef>
+          <a:fillRef idx="1">
+            <a:schemeClr val="lt1"/>
+          </a:fillRef>
+          <a:effectRef idx="0">
+            <a:schemeClr val="dk1"/>
+          </a:effectRef>
+          <a:fontRef idx="minor">
+            <a:schemeClr val="dk1"/>
+          </a:fontRef>
+        </p:style>
+        <p:txBody>
+          <a:bodyPr rtlCol="0" anchor="ctr"/>
+          <a:lstStyle/>
+          <a:p>
+            <a:pPr algn="ctr"/>
+            <a:r>
+              <a:rPr lang="en-US" sz="1200" dirty="0" err="1" smtClean="0">
+                <a:solidFill>
+                  <a:schemeClr val="dk1"/>
+                </a:solidFill>
+              </a:rPr>
+              <a:t>WebrRTC</a:t>
+            </a:r>
+            <a:r>
+              <a:rPr lang="en-US" sz="1200" dirty="0" smtClean="0">
+                <a:solidFill>
+                  <a:schemeClr val="dk1"/>
+                </a:solidFill>
+              </a:rPr>
+              <a:t>/Web </a:t>
+            </a:r>
+            <a:r>
+              <a:rPr lang="en-US" sz="1200" dirty="0" smtClean="0">
+                <a:solidFill>
+                  <a:schemeClr val="dk1"/>
+                </a:solidFill>
+              </a:rPr>
+              <a:t>Server</a:t>
+            </a:r>
+          </a:p>
+          <a:p>
+            <a:pPr algn="ctr"/>
+            <a:r>
+              <a:rPr lang="de-DE" sz="1200" dirty="0" smtClean="0"/>
+              <a:t>Network </a:t>
+            </a:r>
+            <a:r>
+              <a:rPr lang="de-DE" sz="1200" dirty="0" err="1" smtClean="0"/>
+              <a:t>Hyperty</a:t>
+            </a:r>
+            <a:r>
+              <a:rPr lang="de-DE" sz="1200" dirty="0" smtClean="0"/>
+              <a:t> </a:t>
+            </a:r>
+            <a:endParaRPr lang="fr-FR" sz="1200" dirty="0">
+              <a:solidFill>
+                <a:schemeClr val="dk1"/>
+              </a:solidFill>
+            </a:endParaRPr>
+          </a:p>
+        </p:txBody>
+      </p:sp>
+      <p:cxnSp>
+        <p:nvCxnSpPr>
+          <p:cNvPr id="11" name="Connecteur droit avec flèche 10"/>
+          <p:cNvCxnSpPr>
+            <a:stCxn id="6" idx="1"/>
+            <a:endCxn id="4" idx="3"/>
+          </p:cNvCxnSpPr>
+          <p:nvPr/>
+        </p:nvCxnSpPr>
+        <p:spPr>
+          <a:xfrm flipH="1">
+            <a:off x="1122969" y="5276266"/>
+            <a:ext cx="1720840" cy="375928"/>
+          </a:xfrm>
+          <a:prstGeom prst="straightConnector1">
+            <a:avLst/>
+          </a:prstGeom>
+          <a:ln>
+            <a:tailEnd type="arrow"/>
+          </a:ln>
+        </p:spPr>
+        <p:style>
+          <a:lnRef idx="1">
+            <a:schemeClr val="dk1"/>
+          </a:lnRef>
+          <a:fillRef idx="0">
+            <a:schemeClr val="dk1"/>
+          </a:fillRef>
+          <a:effectRef idx="0">
+            <a:schemeClr val="dk1"/>
+          </a:effectRef>
+          <a:fontRef idx="minor">
+            <a:schemeClr val="tx1"/>
+          </a:fontRef>
+        </p:style>
+      </p:cxnSp>
+      <p:sp>
+        <p:nvSpPr>
+          <p:cNvPr id="12" name="Rectangle à coins arrondis 11"/>
+          <p:cNvSpPr/>
+          <p:nvPr/>
+        </p:nvSpPr>
+        <p:spPr>
+          <a:xfrm>
+            <a:off x="5137577" y="2718102"/>
+            <a:ext cx="2984657" cy="599610"/>
+          </a:xfrm>
+          <a:prstGeom prst="roundRect">
+            <a:avLst/>
+          </a:prstGeom>
+          <a:ln w="9525">
+            <a:prstDash val="dash"/>
+          </a:ln>
+        </p:spPr>
+        <p:style>
+          <a:lnRef idx="2">
+            <a:schemeClr val="dk1"/>
+          </a:lnRef>
+          <a:fillRef idx="1">
+            <a:schemeClr val="lt1"/>
+          </a:fillRef>
+          <a:effectRef idx="0">
+            <a:schemeClr val="dk1"/>
+          </a:effectRef>
+          <a:fontRef idx="minor">
+            <a:schemeClr val="dk1"/>
+          </a:fontRef>
+        </p:style>
+        <p:txBody>
+          <a:bodyPr rtlCol="0" anchor="ctr"/>
+          <a:lstStyle/>
+          <a:p>
+            <a:pPr algn="ctr"/>
+            <a:r>
+              <a:rPr lang="en-US" sz="1200" dirty="0" smtClean="0">
+                <a:solidFill>
+                  <a:schemeClr val="dk1"/>
+                </a:solidFill>
+              </a:rPr>
+              <a:t>Broker</a:t>
+            </a:r>
+            <a:endParaRPr lang="fr-FR" sz="1200" dirty="0">
+              <a:solidFill>
+                <a:schemeClr val="dk1"/>
+              </a:solidFill>
+            </a:endParaRPr>
+          </a:p>
+        </p:txBody>
+      </p:sp>
+      <p:cxnSp>
+        <p:nvCxnSpPr>
+          <p:cNvPr id="13" name="Connecteur droit avec flèche 12"/>
+          <p:cNvCxnSpPr>
+            <a:stCxn id="10" idx="3"/>
+            <a:endCxn id="12" idx="0"/>
+          </p:cNvCxnSpPr>
+          <p:nvPr/>
+        </p:nvCxnSpPr>
+        <p:spPr>
+          <a:xfrm>
+            <a:off x="5474253" y="2111708"/>
+            <a:ext cx="1155653" cy="606394"/>
+          </a:xfrm>
+          <a:prstGeom prst="straightConnector1">
+            <a:avLst/>
+          </a:prstGeom>
+          <a:ln>
+            <a:tailEnd type="arrow"/>
+          </a:ln>
+        </p:spPr>
+        <p:style>
+          <a:lnRef idx="1">
+            <a:schemeClr val="dk1"/>
+          </a:lnRef>
+          <a:fillRef idx="0">
+            <a:schemeClr val="dk1"/>
+          </a:fillRef>
+          <a:effectRef idx="0">
+            <a:schemeClr val="dk1"/>
+          </a:effectRef>
+          <a:fontRef idx="minor">
+            <a:schemeClr val="tx1"/>
+          </a:fontRef>
+        </p:style>
+      </p:cxnSp>
+      <p:cxnSp>
+        <p:nvCxnSpPr>
+          <p:cNvPr id="14" name="Connecteur droit avec flèche 13"/>
+          <p:cNvCxnSpPr>
+            <a:stCxn id="44" idx="1"/>
+            <a:endCxn id="8" idx="0"/>
+          </p:cNvCxnSpPr>
+          <p:nvPr/>
+        </p:nvCxnSpPr>
+        <p:spPr>
+          <a:xfrm flipH="1">
+            <a:off x="3407871" y="3945952"/>
+            <a:ext cx="598904" cy="131546"/>
+          </a:xfrm>
+          <a:prstGeom prst="straightConnector1">
+            <a:avLst/>
+          </a:prstGeom>
+          <a:ln>
+            <a:tailEnd type="arrow"/>
+          </a:ln>
+        </p:spPr>
+        <p:style>
+          <a:lnRef idx="1">
+            <a:schemeClr val="dk1"/>
+          </a:lnRef>
+          <a:fillRef idx="0">
+            <a:schemeClr val="dk1"/>
+          </a:fillRef>
+          <a:effectRef idx="0">
+            <a:schemeClr val="dk1"/>
+          </a:effectRef>
+          <a:fontRef idx="minor">
+            <a:schemeClr val="tx1"/>
+          </a:fontRef>
+        </p:style>
+      </p:cxnSp>
+      <p:cxnSp>
+        <p:nvCxnSpPr>
+          <p:cNvPr id="15" name="Connecteur droit avec flèche 14"/>
+          <p:cNvCxnSpPr>
+            <a:stCxn id="8" idx="2"/>
+            <a:endCxn id="6" idx="0"/>
+          </p:cNvCxnSpPr>
+          <p:nvPr/>
+        </p:nvCxnSpPr>
+        <p:spPr>
+          <a:xfrm>
+            <a:off x="3407871" y="4603677"/>
+            <a:ext cx="12002" cy="409499"/>
+          </a:xfrm>
+          <a:prstGeom prst="straightConnector1">
+            <a:avLst/>
+          </a:prstGeom>
+          <a:ln>
+            <a:tailEnd type="arrow"/>
+          </a:ln>
+        </p:spPr>
+        <p:style>
+          <a:lnRef idx="1">
+            <a:schemeClr val="dk1"/>
+          </a:lnRef>
+          <a:fillRef idx="0">
+            <a:schemeClr val="dk1"/>
+          </a:fillRef>
+          <a:effectRef idx="0">
+            <a:schemeClr val="dk1"/>
+          </a:effectRef>
+          <a:fontRef idx="minor">
+            <a:schemeClr val="tx1"/>
+          </a:fontRef>
+        </p:style>
+      </p:cxnSp>
+      <p:sp>
+        <p:nvSpPr>
+          <p:cNvPr id="16" name="ZoneTexte 15"/>
+          <p:cNvSpPr txBox="1"/>
+          <p:nvPr/>
+        </p:nvSpPr>
+        <p:spPr>
+          <a:xfrm>
+            <a:off x="1694979" y="4963416"/>
+            <a:ext cx="831638" cy="461665"/>
+          </a:xfrm>
+          <a:prstGeom prst="rect">
+            <a:avLst/>
+          </a:prstGeom>
+          <a:noFill/>
+        </p:spPr>
+        <p:txBody>
+          <a:bodyPr wrap="square" rtlCol="0">
+            <a:spAutoFit/>
+          </a:bodyPr>
+          <a:lstStyle/>
+          <a:p>
+            <a:r>
+              <a:rPr lang="en-US" sz="1200" dirty="0" smtClean="0"/>
+              <a:t>dedicated bearer</a:t>
+            </a:r>
+            <a:endParaRPr lang="fr-FR" sz="1200" dirty="0"/>
+          </a:p>
+        </p:txBody>
+      </p:sp>
+      <p:sp>
+        <p:nvSpPr>
+          <p:cNvPr id="19" name="Rectangle à coins arrondis 18"/>
+          <p:cNvSpPr/>
+          <p:nvPr/>
+        </p:nvSpPr>
+        <p:spPr>
+          <a:xfrm>
+            <a:off x="4197634" y="5080576"/>
+            <a:ext cx="1022437" cy="464615"/>
+          </a:xfrm>
+          <a:prstGeom prst="roundRect">
+            <a:avLst/>
+          </a:prstGeom>
+          <a:ln w="9525">
+            <a:prstDash val="solid"/>
+          </a:ln>
+        </p:spPr>
+        <p:style>
+          <a:lnRef idx="2">
+            <a:schemeClr val="dk1"/>
+          </a:lnRef>
+          <a:fillRef idx="1">
+            <a:schemeClr val="lt1"/>
+          </a:fillRef>
+          <a:effectRef idx="0">
+            <a:schemeClr val="dk1"/>
+          </a:effectRef>
+          <a:fontRef idx="minor">
+            <a:schemeClr val="dk1"/>
+          </a:fontRef>
+        </p:style>
+        <p:txBody>
+          <a:bodyPr rtlCol="0" anchor="ctr"/>
+          <a:lstStyle/>
+          <a:p>
+            <a:pPr algn="ctr"/>
+            <a:r>
+              <a:rPr lang="en-US" sz="1200" dirty="0" smtClean="0">
+                <a:solidFill>
+                  <a:schemeClr val="dk1"/>
+                </a:solidFill>
+              </a:rPr>
+              <a:t>TDF</a:t>
+            </a:r>
+            <a:endParaRPr lang="fr-FR" sz="1200" dirty="0">
+              <a:solidFill>
+                <a:schemeClr val="dk1"/>
+              </a:solidFill>
+            </a:endParaRPr>
+          </a:p>
+        </p:txBody>
+      </p:sp>
+      <p:cxnSp>
+        <p:nvCxnSpPr>
+          <p:cNvPr id="21" name="Connecteur droit 20"/>
+          <p:cNvCxnSpPr>
+            <a:stCxn id="6" idx="3"/>
+            <a:endCxn id="19" idx="1"/>
+          </p:cNvCxnSpPr>
+          <p:nvPr/>
+        </p:nvCxnSpPr>
+        <p:spPr>
+          <a:xfrm>
+            <a:off x="3995937" y="5276266"/>
+            <a:ext cx="201697" cy="36618"/>
+          </a:xfrm>
+          <a:prstGeom prst="line">
+            <a:avLst/>
+          </a:prstGeom>
+          <a:ln w="6350"/>
+        </p:spPr>
+        <p:style>
+          <a:lnRef idx="1">
+            <a:schemeClr val="dk1"/>
+          </a:lnRef>
+          <a:fillRef idx="0">
+            <a:schemeClr val="dk1"/>
+          </a:fillRef>
+          <a:effectRef idx="0">
+            <a:schemeClr val="dk1"/>
+          </a:effectRef>
+          <a:fontRef idx="minor">
+            <a:schemeClr val="tx1"/>
+          </a:fontRef>
+        </p:style>
+      </p:cxnSp>
+      <p:cxnSp>
+        <p:nvCxnSpPr>
+          <p:cNvPr id="31" name="Connecteur droit avec flèche 30"/>
+          <p:cNvCxnSpPr>
+            <a:stCxn id="19" idx="0"/>
+            <a:endCxn id="8" idx="3"/>
+          </p:cNvCxnSpPr>
+          <p:nvPr/>
+        </p:nvCxnSpPr>
+        <p:spPr>
+          <a:xfrm flipH="1" flipV="1">
+            <a:off x="3815916" y="4340588"/>
+            <a:ext cx="892937" cy="739988"/>
+          </a:xfrm>
+          <a:prstGeom prst="straightConnector1">
+            <a:avLst/>
+          </a:prstGeom>
+          <a:ln>
+            <a:tailEnd type="arrow"/>
+          </a:ln>
+        </p:spPr>
+        <p:style>
+          <a:lnRef idx="1">
+            <a:schemeClr val="dk1"/>
+          </a:lnRef>
+          <a:fillRef idx="0">
+            <a:schemeClr val="dk1"/>
+          </a:fillRef>
+          <a:effectRef idx="0">
+            <a:schemeClr val="dk1"/>
+          </a:effectRef>
+          <a:fontRef idx="minor">
+            <a:schemeClr val="tx1"/>
+          </a:fontRef>
+        </p:style>
+      </p:cxnSp>
+      <p:sp>
+        <p:nvSpPr>
+          <p:cNvPr id="18" name="Rectangle à coins arrondis 17"/>
+          <p:cNvSpPr/>
+          <p:nvPr/>
+        </p:nvSpPr>
+        <p:spPr>
+          <a:xfrm>
+            <a:off x="5916149" y="5021507"/>
+            <a:ext cx="816091" cy="526179"/>
+          </a:xfrm>
+          <a:prstGeom prst="roundRect">
+            <a:avLst/>
+          </a:prstGeom>
+          <a:ln w="9525"/>
+        </p:spPr>
+        <p:style>
+          <a:lnRef idx="2">
+            <a:schemeClr val="dk1"/>
+          </a:lnRef>
+          <a:fillRef idx="1">
+            <a:schemeClr val="lt1"/>
+          </a:fillRef>
+          <a:effectRef idx="0">
+            <a:schemeClr val="dk1"/>
+          </a:effectRef>
+          <a:fontRef idx="minor">
+            <a:schemeClr val="dk1"/>
+          </a:fontRef>
+        </p:style>
+        <p:txBody>
+          <a:bodyPr rtlCol="0" anchor="ctr"/>
+          <a:lstStyle/>
+          <a:p>
+            <a:pPr algn="ctr"/>
+            <a:r>
+              <a:rPr lang="en-US" sz="1200" dirty="0" smtClean="0">
+                <a:solidFill>
+                  <a:schemeClr val="dk1"/>
+                </a:solidFill>
+              </a:rPr>
+              <a:t>TURN</a:t>
+            </a:r>
+            <a:endParaRPr lang="fr-FR" sz="1200" dirty="0">
+              <a:solidFill>
+                <a:schemeClr val="dk1"/>
+              </a:solidFill>
+            </a:endParaRPr>
+          </a:p>
+        </p:txBody>
+      </p:sp>
+      <p:cxnSp>
+        <p:nvCxnSpPr>
+          <p:cNvPr id="20" name="Connecteur droit avec flèche 37"/>
+          <p:cNvCxnSpPr>
+            <a:stCxn id="5" idx="0"/>
+            <a:endCxn id="12" idx="1"/>
+          </p:cNvCxnSpPr>
+          <p:nvPr/>
+        </p:nvCxnSpPr>
+        <p:spPr>
+          <a:xfrm flipV="1">
+            <a:off x="693245" y="3017907"/>
+            <a:ext cx="4444332" cy="1743873"/>
+          </a:xfrm>
+          <a:prstGeom prst="straightConnector1">
+            <a:avLst/>
+          </a:prstGeom>
+          <a:ln>
+            <a:prstDash val="sysDot"/>
+            <a:tailEnd type="arrow"/>
+          </a:ln>
+        </p:spPr>
+        <p:style>
+          <a:lnRef idx="1">
+            <a:schemeClr val="dk1"/>
+          </a:lnRef>
+          <a:fillRef idx="0">
+            <a:schemeClr val="dk1"/>
+          </a:fillRef>
+          <a:effectRef idx="0">
+            <a:schemeClr val="dk1"/>
+          </a:effectRef>
+          <a:fontRef idx="minor">
+            <a:schemeClr val="tx1"/>
+          </a:fontRef>
+        </p:style>
+      </p:cxnSp>
+      <p:sp>
+        <p:nvSpPr>
+          <p:cNvPr id="42" name="Rectangle à coins arrondis 17"/>
+          <p:cNvSpPr/>
+          <p:nvPr/>
+        </p:nvSpPr>
+        <p:spPr>
+          <a:xfrm>
+            <a:off x="7194259" y="5612878"/>
+            <a:ext cx="816091" cy="526179"/>
+          </a:xfrm>
+          <a:prstGeom prst="roundRect">
+            <a:avLst/>
+          </a:prstGeom>
+          <a:ln w="9525"/>
+        </p:spPr>
+        <p:style>
+          <a:lnRef idx="2">
+            <a:schemeClr val="dk1"/>
+          </a:lnRef>
+          <a:fillRef idx="1">
+            <a:schemeClr val="lt1"/>
+          </a:fillRef>
+          <a:effectRef idx="0">
+            <a:schemeClr val="dk1"/>
+          </a:effectRef>
+          <a:fontRef idx="minor">
+            <a:schemeClr val="dk1"/>
+          </a:fontRef>
+        </p:style>
+        <p:txBody>
+          <a:bodyPr rtlCol="0" anchor="ctr"/>
+          <a:lstStyle/>
+          <a:p>
+            <a:pPr algn="ctr"/>
+            <a:r>
+              <a:rPr lang="en-US" sz="1200" dirty="0" smtClean="0">
+                <a:solidFill>
+                  <a:schemeClr val="dk1"/>
+                </a:solidFill>
+              </a:rPr>
+              <a:t>TURN</a:t>
+            </a:r>
+            <a:endParaRPr lang="fr-FR" sz="1200" dirty="0">
+              <a:solidFill>
+                <a:schemeClr val="dk1"/>
+              </a:solidFill>
+            </a:endParaRPr>
+          </a:p>
+        </p:txBody>
+      </p:sp>
+      <p:sp>
+        <p:nvSpPr>
+          <p:cNvPr id="44" name="Rectangle à coins arrondis 7"/>
+          <p:cNvSpPr/>
+          <p:nvPr/>
+        </p:nvSpPr>
+        <p:spPr>
+          <a:xfrm>
+            <a:off x="4006775" y="3682862"/>
+            <a:ext cx="1213296" cy="526179"/>
+          </a:xfrm>
+          <a:prstGeom prst="roundRect">
+            <a:avLst/>
+          </a:prstGeom>
+          <a:ln w="9525"/>
+        </p:spPr>
+        <p:style>
+          <a:lnRef idx="2">
+            <a:schemeClr val="dk1"/>
+          </a:lnRef>
+          <a:fillRef idx="1">
+            <a:schemeClr val="lt1"/>
+          </a:fillRef>
+          <a:effectRef idx="0">
+            <a:schemeClr val="dk1"/>
+          </a:effectRef>
+          <a:fontRef idx="minor">
+            <a:schemeClr val="dk1"/>
+          </a:fontRef>
+        </p:style>
+        <p:txBody>
+          <a:bodyPr rtlCol="0" anchor="ctr"/>
+          <a:lstStyle/>
+          <a:p>
+            <a:pPr algn="ctr"/>
+            <a:r>
+              <a:rPr lang="en-US" sz="1200" dirty="0" smtClean="0">
+                <a:solidFill>
+                  <a:schemeClr val="dk1"/>
+                </a:solidFill>
+              </a:rPr>
+              <a:t>AF</a:t>
+            </a:r>
+            <a:br>
+              <a:rPr lang="en-US" sz="1200" dirty="0" smtClean="0">
+                <a:solidFill>
+                  <a:schemeClr val="dk1"/>
+                </a:solidFill>
+              </a:rPr>
+            </a:br>
+            <a:r>
+              <a:rPr lang="en-US" sz="1200" dirty="0" smtClean="0">
+                <a:solidFill>
+                  <a:schemeClr val="dk1"/>
+                </a:solidFill>
+              </a:rPr>
+              <a:t>(Connector)</a:t>
+            </a:r>
+            <a:endParaRPr lang="fr-FR" sz="1200" dirty="0">
+              <a:solidFill>
+                <a:schemeClr val="dk1"/>
+              </a:solidFill>
+            </a:endParaRPr>
+          </a:p>
+        </p:txBody>
+      </p:sp>
+      <p:cxnSp>
+        <p:nvCxnSpPr>
+          <p:cNvPr id="51" name="Connecteur droit avec flèche 13"/>
+          <p:cNvCxnSpPr>
+            <a:stCxn id="12" idx="2"/>
+            <a:endCxn id="44" idx="3"/>
+          </p:cNvCxnSpPr>
+          <p:nvPr/>
+        </p:nvCxnSpPr>
+        <p:spPr>
+          <a:xfrm flipH="1">
+            <a:off x="5220071" y="3317712"/>
+            <a:ext cx="1409835" cy="628240"/>
+          </a:xfrm>
+          <a:prstGeom prst="straightConnector1">
+            <a:avLst/>
+          </a:prstGeom>
+          <a:ln>
+            <a:tailEnd type="arrow"/>
+          </a:ln>
+        </p:spPr>
+        <p:style>
+          <a:lnRef idx="1">
+            <a:schemeClr val="dk1"/>
+          </a:lnRef>
+          <a:fillRef idx="0">
+            <a:schemeClr val="dk1"/>
+          </a:fillRef>
+          <a:effectRef idx="0">
+            <a:schemeClr val="dk1"/>
+          </a:effectRef>
+          <a:fontRef idx="minor">
+            <a:schemeClr val="tx1"/>
+          </a:fontRef>
+        </p:style>
+      </p:cxnSp>
+      <p:sp>
+        <p:nvSpPr>
+          <p:cNvPr id="54" name="Rectangle à coins arrondis 17"/>
+          <p:cNvSpPr/>
+          <p:nvPr/>
+        </p:nvSpPr>
+        <p:spPr>
+          <a:xfrm>
+            <a:off x="6544781" y="3682863"/>
+            <a:ext cx="1814856" cy="526179"/>
+          </a:xfrm>
+          <a:prstGeom prst="roundRect">
+            <a:avLst/>
+          </a:prstGeom>
+          <a:ln w="9525"/>
+        </p:spPr>
+        <p:style>
+          <a:lnRef idx="2">
+            <a:schemeClr val="dk1"/>
+          </a:lnRef>
+          <a:fillRef idx="1">
+            <a:schemeClr val="lt1"/>
+          </a:fillRef>
+          <a:effectRef idx="0">
+            <a:schemeClr val="dk1"/>
+          </a:effectRef>
+          <a:fontRef idx="minor">
+            <a:schemeClr val="dk1"/>
+          </a:fontRef>
+        </p:style>
+        <p:txBody>
+          <a:bodyPr rtlCol="0" anchor="ctr"/>
+          <a:lstStyle/>
+          <a:p>
+            <a:pPr algn="ctr"/>
+            <a:r>
+              <a:rPr lang="en-US" sz="1200" dirty="0" smtClean="0">
+                <a:solidFill>
+                  <a:schemeClr val="dk1"/>
+                </a:solidFill>
+              </a:rPr>
+              <a:t>Backend QoS</a:t>
+            </a:r>
+          </a:p>
+          <a:p>
+            <a:pPr algn="ctr"/>
+            <a:r>
+              <a:rPr lang="de-DE" sz="1200" dirty="0" err="1" smtClean="0"/>
+              <a:t>Function</a:t>
+            </a:r>
+            <a:r>
+              <a:rPr lang="de-DE" sz="1200" dirty="0" smtClean="0"/>
+              <a:t> (Connector)</a:t>
+            </a:r>
+            <a:endParaRPr lang="fr-FR" sz="1200" dirty="0">
+              <a:solidFill>
+                <a:schemeClr val="dk1"/>
+              </a:solidFill>
+            </a:endParaRPr>
+          </a:p>
+        </p:txBody>
+      </p:sp>
+      <p:cxnSp>
+        <p:nvCxnSpPr>
+          <p:cNvPr id="55" name="Connecteur droit avec flèche 13"/>
+          <p:cNvCxnSpPr>
+            <a:stCxn id="12" idx="2"/>
+            <a:endCxn id="54" idx="0"/>
+          </p:cNvCxnSpPr>
+          <p:nvPr/>
+        </p:nvCxnSpPr>
+        <p:spPr>
+          <a:xfrm>
+            <a:off x="6629906" y="3317712"/>
+            <a:ext cx="822303" cy="365151"/>
+          </a:xfrm>
+          <a:prstGeom prst="straightConnector1">
+            <a:avLst/>
+          </a:prstGeom>
+          <a:ln>
+            <a:tailEnd type="arrow"/>
+          </a:ln>
+        </p:spPr>
+        <p:style>
+          <a:lnRef idx="1">
+            <a:schemeClr val="dk1"/>
+          </a:lnRef>
+          <a:fillRef idx="0">
+            <a:schemeClr val="dk1"/>
+          </a:fillRef>
+          <a:effectRef idx="0">
+            <a:schemeClr val="dk1"/>
+          </a:effectRef>
+          <a:fontRef idx="minor">
+            <a:schemeClr val="tx1"/>
+          </a:fontRef>
+        </p:style>
+      </p:cxnSp>
+      <p:cxnSp>
+        <p:nvCxnSpPr>
+          <p:cNvPr id="59" name="Connecteur droit avec flèche 13"/>
+          <p:cNvCxnSpPr>
+            <a:stCxn id="54" idx="2"/>
+            <a:endCxn id="18" idx="3"/>
+          </p:cNvCxnSpPr>
+          <p:nvPr/>
+        </p:nvCxnSpPr>
+        <p:spPr>
+          <a:xfrm flipH="1">
+            <a:off x="6732240" y="4209042"/>
+            <a:ext cx="719969" cy="1075555"/>
+          </a:xfrm>
+          <a:prstGeom prst="straightConnector1">
+            <a:avLst/>
+          </a:prstGeom>
+          <a:ln>
+            <a:tailEnd type="arrow"/>
+          </a:ln>
+        </p:spPr>
+        <p:style>
+          <a:lnRef idx="1">
+            <a:schemeClr val="dk1"/>
+          </a:lnRef>
+          <a:fillRef idx="0">
+            <a:schemeClr val="dk1"/>
+          </a:fillRef>
+          <a:effectRef idx="0">
+            <a:schemeClr val="dk1"/>
+          </a:effectRef>
+          <a:fontRef idx="minor">
+            <a:schemeClr val="tx1"/>
+          </a:fontRef>
+        </p:style>
+      </p:cxnSp>
+      <p:cxnSp>
+        <p:nvCxnSpPr>
+          <p:cNvPr id="63" name="Connecteur droit avec flèche 13"/>
+          <p:cNvCxnSpPr>
+            <a:stCxn id="54" idx="2"/>
+            <a:endCxn id="42" idx="0"/>
+          </p:cNvCxnSpPr>
+          <p:nvPr/>
+        </p:nvCxnSpPr>
+        <p:spPr>
+          <a:xfrm>
+            <a:off x="7452209" y="4209042"/>
+            <a:ext cx="150096" cy="1403836"/>
+          </a:xfrm>
+          <a:prstGeom prst="straightConnector1">
+            <a:avLst/>
+          </a:prstGeom>
+          <a:ln>
+            <a:tailEnd type="arrow"/>
+          </a:ln>
+        </p:spPr>
+        <p:style>
+          <a:lnRef idx="1">
+            <a:schemeClr val="dk1"/>
+          </a:lnRef>
+          <a:fillRef idx="0">
+            <a:schemeClr val="dk1"/>
+          </a:fillRef>
+          <a:effectRef idx="0">
+            <a:schemeClr val="dk1"/>
+          </a:effectRef>
+          <a:fontRef idx="minor">
+            <a:schemeClr val="tx1"/>
+          </a:fontRef>
+        </p:style>
+      </p:cxnSp>
+      <p:sp>
+        <p:nvSpPr>
+          <p:cNvPr id="69" name="ZoneTexte 38"/>
+          <p:cNvSpPr txBox="1"/>
+          <p:nvPr/>
+        </p:nvSpPr>
+        <p:spPr>
+          <a:xfrm rot="20343114">
+            <a:off x="2518700" y="3571868"/>
+            <a:ext cx="962251" cy="276999"/>
+          </a:xfrm>
+          <a:prstGeom prst="rect">
+            <a:avLst/>
+          </a:prstGeom>
+          <a:noFill/>
+        </p:spPr>
+        <p:txBody>
+          <a:bodyPr wrap="none" rtlCol="0">
+            <a:spAutoFit/>
+          </a:bodyPr>
+          <a:lstStyle/>
+          <a:p>
+            <a:r>
+              <a:rPr lang="en-US" sz="1200" dirty="0" err="1" smtClean="0"/>
+              <a:t>getStats</a:t>
+            </a:r>
+            <a:r>
+              <a:rPr lang="en-US" sz="1200" dirty="0" smtClean="0"/>
+              <a:t> info</a:t>
+            </a:r>
+            <a:endParaRPr lang="fr-FR" sz="1200" dirty="0"/>
+          </a:p>
+        </p:txBody>
+      </p:sp>
+      <p:sp>
+        <p:nvSpPr>
+          <p:cNvPr id="74" name="Freeform 73"/>
+          <p:cNvSpPr/>
+          <p:nvPr/>
+        </p:nvSpPr>
+        <p:spPr>
+          <a:xfrm>
+            <a:off x="755576" y="5373216"/>
+            <a:ext cx="8039595" cy="933899"/>
+          </a:xfrm>
+          <a:custGeom>
+            <a:avLst/>
+            <a:gdLst>
+              <a:gd name="connsiteX0" fmla="*/ 0 w 8039595"/>
+              <a:gd name="connsiteY0" fmla="*/ 292631 h 933899"/>
+              <a:gd name="connsiteX1" fmla="*/ 2541320 w 8039595"/>
+              <a:gd name="connsiteY1" fmla="*/ 55125 h 933899"/>
+              <a:gd name="connsiteX2" fmla="*/ 4001985 w 8039595"/>
+              <a:gd name="connsiteY2" fmla="*/ 55125 h 933899"/>
+              <a:gd name="connsiteX3" fmla="*/ 5248894 w 8039595"/>
+              <a:gd name="connsiteY3" fmla="*/ 43249 h 933899"/>
+              <a:gd name="connsiteX4" fmla="*/ 6816437 w 8039595"/>
+              <a:gd name="connsiteY4" fmla="*/ 672642 h 933899"/>
+              <a:gd name="connsiteX5" fmla="*/ 8039595 w 8039595"/>
+              <a:gd name="connsiteY5" fmla="*/ 933899 h 933899"/>
+              <a:gd name="connsiteX6" fmla="*/ 8039595 w 8039595"/>
+              <a:gd name="connsiteY6" fmla="*/ 933899 h 933899"/>
+            </a:gdLst>
+            <a:ahLst/>
+            <a:cxnLst>
+              <a:cxn ang="0">
+                <a:pos x="connsiteX0" y="connsiteY0"/>
+              </a:cxn>
+              <a:cxn ang="0">
+                <a:pos x="connsiteX1" y="connsiteY1"/>
+              </a:cxn>
+              <a:cxn ang="0">
+                <a:pos x="connsiteX2" y="connsiteY2"/>
+              </a:cxn>
+              <a:cxn ang="0">
+                <a:pos x="connsiteX3" y="connsiteY3"/>
+              </a:cxn>
+              <a:cxn ang="0">
+                <a:pos x="connsiteX4" y="connsiteY4"/>
+              </a:cxn>
+              <a:cxn ang="0">
+                <a:pos x="connsiteX5" y="connsiteY5"/>
+              </a:cxn>
+              <a:cxn ang="0">
+                <a:pos x="connsiteX6" y="connsiteY6"/>
+              </a:cxn>
+            </a:cxnLst>
+            <a:rect l="l" t="t" r="r" b="b"/>
+            <a:pathLst>
+              <a:path w="8039595" h="933899">
+                <a:moveTo>
+                  <a:pt x="0" y="292631"/>
+                </a:moveTo>
+                <a:cubicBezTo>
+                  <a:pt x="937161" y="193670"/>
+                  <a:pt x="1874323" y="94709"/>
+                  <a:pt x="2541320" y="55125"/>
+                </a:cubicBezTo>
+                <a:cubicBezTo>
+                  <a:pt x="3208317" y="15541"/>
+                  <a:pt x="4001985" y="55125"/>
+                  <a:pt x="4001985" y="55125"/>
+                </a:cubicBezTo>
+                <a:cubicBezTo>
+                  <a:pt x="4453247" y="53146"/>
+                  <a:pt x="4779819" y="-59671"/>
+                  <a:pt x="5248894" y="43249"/>
+                </a:cubicBezTo>
+                <a:cubicBezTo>
+                  <a:pt x="5717969" y="146168"/>
+                  <a:pt x="6351320" y="524200"/>
+                  <a:pt x="6816437" y="672642"/>
+                </a:cubicBezTo>
+                <a:cubicBezTo>
+                  <a:pt x="7281554" y="821084"/>
+                  <a:pt x="8039595" y="933899"/>
+                  <a:pt x="8039595" y="933899"/>
+                </a:cubicBezTo>
+                <a:lnTo>
+                  <a:pt x="8039595" y="933899"/>
+                </a:lnTo>
+              </a:path>
+            </a:pathLst>
+          </a:custGeom>
+          <a:noFill/>
+          <a:ln w="28575"/>
+        </p:spPr>
+        <p:style>
+          <a:lnRef idx="2">
+            <a:schemeClr val="accent1">
+              <a:shade val="50000"/>
+            </a:schemeClr>
+          </a:lnRef>
+          <a:fillRef idx="1">
+            <a:schemeClr val="accent1"/>
+          </a:fillRef>
+          <a:effectRef idx="0">
+            <a:schemeClr val="accent1"/>
+          </a:effectRef>
+          <a:fontRef idx="minor">
+            <a:schemeClr val="lt1"/>
+          </a:fontRef>
+        </p:style>
+        <p:txBody>
+          <a:bodyPr rtlCol="0" anchor="ctr"/>
+          <a:lstStyle/>
+          <a:p>
+            <a:pPr algn="ctr"/>
+            <a:endParaRPr lang="en-US" sz="1200"/>
+          </a:p>
+        </p:txBody>
+      </p:sp>
+      <p:sp>
+        <p:nvSpPr>
+          <p:cNvPr id="75" name="TextBox 74"/>
+          <p:cNvSpPr txBox="1"/>
+          <p:nvPr/>
+        </p:nvSpPr>
+        <p:spPr>
+          <a:xfrm>
+            <a:off x="1122969" y="5612878"/>
+            <a:ext cx="1403648" cy="276999"/>
+          </a:xfrm>
+          <a:prstGeom prst="rect">
+            <a:avLst/>
+          </a:prstGeom>
+          <a:noFill/>
+        </p:spPr>
+        <p:txBody>
+          <a:bodyPr wrap="square" rtlCol="0">
+            <a:spAutoFit/>
+          </a:bodyPr>
+          <a:lstStyle/>
+          <a:p>
+            <a:r>
+              <a:rPr lang="de-DE" sz="1200" dirty="0" smtClean="0">
+                <a:solidFill>
+                  <a:schemeClr val="tx2">
+                    <a:lumMod val="50000"/>
+                  </a:schemeClr>
+                </a:solidFill>
+              </a:rPr>
+              <a:t>Data  Plane Traffic</a:t>
+            </a:r>
+            <a:endParaRPr lang="en-US" sz="1200" dirty="0">
+              <a:solidFill>
+                <a:schemeClr val="tx2">
+                  <a:lumMod val="50000"/>
+                </a:schemeClr>
+              </a:solidFill>
+            </a:endParaRPr>
+          </a:p>
+        </p:txBody>
+      </p:sp>
+      <p:sp>
+        <p:nvSpPr>
+          <p:cNvPr id="76" name="TextBox 75"/>
+          <p:cNvSpPr txBox="1"/>
+          <p:nvPr/>
+        </p:nvSpPr>
+        <p:spPr>
+          <a:xfrm>
+            <a:off x="258873" y="980728"/>
+            <a:ext cx="9065655" cy="738664"/>
+          </a:xfrm>
+          <a:prstGeom prst="rect">
+            <a:avLst/>
+          </a:prstGeom>
+          <a:noFill/>
+        </p:spPr>
+        <p:txBody>
+          <a:bodyPr wrap="square" rtlCol="0">
+            <a:spAutoFit/>
+          </a:bodyPr>
+          <a:lstStyle/>
+          <a:p>
+            <a:pPr marL="285750" indent="-285750">
+              <a:buFont typeface="Arial" panose="020B0604020202020204" pitchFamily="34" charset="0"/>
+              <a:buChar char="•"/>
+            </a:pPr>
+            <a:r>
+              <a:rPr lang="de-DE" sz="1400" dirty="0" err="1" smtClean="0"/>
+              <a:t>Receive</a:t>
+            </a:r>
+            <a:r>
+              <a:rPr lang="de-DE" sz="1400" dirty="0" smtClean="0"/>
+              <a:t> Information </a:t>
+            </a:r>
+            <a:r>
+              <a:rPr lang="de-DE" sz="1400" dirty="0" err="1" smtClean="0"/>
+              <a:t>from</a:t>
+            </a:r>
+            <a:r>
+              <a:rPr lang="de-DE" sz="1400" dirty="0" smtClean="0"/>
+              <a:t> </a:t>
+            </a:r>
+            <a:r>
+              <a:rPr lang="de-DE" sz="1400" dirty="0" err="1" smtClean="0"/>
+              <a:t>Application</a:t>
+            </a:r>
+            <a:r>
+              <a:rPr lang="de-DE" sz="1400" dirty="0" smtClean="0"/>
+              <a:t> (</a:t>
+            </a:r>
+            <a:r>
+              <a:rPr lang="de-DE" sz="1400" dirty="0" err="1" smtClean="0"/>
+              <a:t>getStats</a:t>
+            </a:r>
+            <a:r>
+              <a:rPr lang="de-DE" sz="1400" dirty="0" smtClean="0"/>
+              <a:t>) + TDF</a:t>
+            </a:r>
+          </a:p>
+          <a:p>
+            <a:pPr marL="285750" indent="-285750">
+              <a:buFont typeface="Arial" panose="020B0604020202020204" pitchFamily="34" charset="0"/>
+              <a:buChar char="•"/>
+            </a:pPr>
+            <a:r>
+              <a:rPr lang="de-DE" sz="1400" dirty="0" smtClean="0"/>
+              <a:t>TDF optional</a:t>
+            </a:r>
+          </a:p>
+          <a:p>
+            <a:pPr marL="285750" indent="-285750">
+              <a:buFont typeface="Arial" panose="020B0604020202020204" pitchFamily="34" charset="0"/>
+              <a:buChar char="•"/>
+            </a:pPr>
+            <a:r>
+              <a:rPr lang="de-DE" sz="1400" dirty="0" smtClean="0"/>
+              <a:t>Broker </a:t>
+            </a:r>
+            <a:r>
+              <a:rPr lang="de-DE" sz="1400" dirty="0" err="1" smtClean="0"/>
+              <a:t>requests</a:t>
+            </a:r>
+            <a:r>
+              <a:rPr lang="de-DE" sz="1400" dirty="0" smtClean="0"/>
+              <a:t> QoS </a:t>
+            </a:r>
+            <a:r>
+              <a:rPr lang="de-DE" sz="1400" dirty="0" err="1" smtClean="0"/>
+              <a:t>parameters</a:t>
+            </a:r>
+            <a:r>
+              <a:rPr lang="de-DE" sz="1400" dirty="0" smtClean="0"/>
+              <a:t> via </a:t>
+            </a:r>
+            <a:r>
+              <a:rPr lang="de-DE" sz="1400" dirty="0" err="1" smtClean="0"/>
+              <a:t>the</a:t>
+            </a:r>
+            <a:r>
+              <a:rPr lang="de-DE" sz="1400" dirty="0" smtClean="0"/>
+              <a:t> </a:t>
+            </a:r>
+            <a:r>
+              <a:rPr lang="de-DE" sz="1400" dirty="0" err="1" smtClean="0"/>
+              <a:t>specific</a:t>
+            </a:r>
+            <a:r>
+              <a:rPr lang="de-DE" sz="1400" dirty="0" smtClean="0"/>
+              <a:t> </a:t>
+            </a:r>
+            <a:r>
+              <a:rPr lang="de-DE" sz="1400" dirty="0" err="1" smtClean="0"/>
+              <a:t>Connectors</a:t>
+            </a:r>
+            <a:r>
+              <a:rPr lang="de-DE" sz="1400" dirty="0" smtClean="0"/>
+              <a:t> </a:t>
+            </a:r>
+            <a:r>
+              <a:rPr lang="de-DE" sz="1400" dirty="0" err="1" smtClean="0"/>
+              <a:t>to</a:t>
+            </a:r>
+            <a:r>
+              <a:rPr lang="de-DE" sz="1400" dirty="0" smtClean="0"/>
+              <a:t> </a:t>
+            </a:r>
+            <a:r>
+              <a:rPr lang="de-DE" sz="1400" dirty="0" err="1" smtClean="0"/>
+              <a:t>each</a:t>
+            </a:r>
+            <a:r>
+              <a:rPr lang="de-DE" sz="1400" dirty="0" smtClean="0"/>
+              <a:t> </a:t>
+            </a:r>
+            <a:r>
+              <a:rPr lang="de-DE" sz="1400" dirty="0" err="1" smtClean="0"/>
+              <a:t>domain</a:t>
+            </a:r>
+            <a:endParaRPr lang="en-US" sz="1400" dirty="0"/>
+          </a:p>
+        </p:txBody>
+      </p:sp>
+      <p:cxnSp>
+        <p:nvCxnSpPr>
+          <p:cNvPr id="32" name="Connecteur droit avec flèche 30"/>
+          <p:cNvCxnSpPr>
+            <a:stCxn id="19" idx="0"/>
+          </p:cNvCxnSpPr>
+          <p:nvPr/>
+        </p:nvCxnSpPr>
+        <p:spPr>
+          <a:xfrm flipV="1">
+            <a:off x="4708853" y="3317712"/>
+            <a:ext cx="1343226" cy="1762864"/>
+          </a:xfrm>
+          <a:prstGeom prst="straightConnector1">
+            <a:avLst/>
+          </a:prstGeom>
+          <a:ln>
+            <a:tailEnd type="arrow"/>
+          </a:ln>
+        </p:spPr>
+        <p:style>
+          <a:lnRef idx="1">
+            <a:schemeClr val="dk1"/>
+          </a:lnRef>
+          <a:fillRef idx="0">
+            <a:schemeClr val="dk1"/>
+          </a:fillRef>
+          <a:effectRef idx="0">
+            <a:schemeClr val="dk1"/>
+          </a:effectRef>
+          <a:fontRef idx="minor">
+            <a:schemeClr val="tx1"/>
+          </a:fontRef>
+        </p:style>
+      </p:cxnSp>
+      <p:sp>
+        <p:nvSpPr>
+          <p:cNvPr id="36" name="Rectangle à coins arrondis 5"/>
+          <p:cNvSpPr/>
+          <p:nvPr/>
+        </p:nvSpPr>
+        <p:spPr>
+          <a:xfrm>
+            <a:off x="2267744" y="6044025"/>
+            <a:ext cx="1380056" cy="526179"/>
+          </a:xfrm>
+          <a:prstGeom prst="roundRect">
+            <a:avLst/>
+          </a:prstGeom>
+          <a:ln w="9525"/>
+        </p:spPr>
+        <p:style>
+          <a:lnRef idx="2">
+            <a:schemeClr val="dk1"/>
+          </a:lnRef>
+          <a:fillRef idx="1">
+            <a:schemeClr val="lt1"/>
+          </a:fillRef>
+          <a:effectRef idx="0">
+            <a:schemeClr val="dk1"/>
+          </a:effectRef>
+          <a:fontRef idx="minor">
+            <a:schemeClr val="dk1"/>
+          </a:fontRef>
+        </p:style>
+        <p:txBody>
+          <a:bodyPr rtlCol="0" anchor="ctr"/>
+          <a:lstStyle/>
+          <a:p>
+            <a:pPr algn="ctr"/>
+            <a:r>
+              <a:rPr lang="en-US" sz="1200" dirty="0" smtClean="0">
+                <a:solidFill>
+                  <a:schemeClr val="dk1"/>
+                </a:solidFill>
+              </a:rPr>
+              <a:t>HGW</a:t>
+            </a:r>
+            <a:br>
+              <a:rPr lang="en-US" sz="1200" dirty="0" smtClean="0">
+                <a:solidFill>
+                  <a:schemeClr val="dk1"/>
+                </a:solidFill>
+              </a:rPr>
+            </a:br>
+            <a:r>
+              <a:rPr lang="en-US" sz="1200" dirty="0" smtClean="0">
+                <a:solidFill>
+                  <a:schemeClr val="dk1"/>
+                </a:solidFill>
+              </a:rPr>
+              <a:t>(DSCP Marking)</a:t>
+            </a:r>
+            <a:endParaRPr lang="fr-FR" sz="1200" dirty="0">
+              <a:solidFill>
+                <a:schemeClr val="dk1"/>
+              </a:solidFill>
+            </a:endParaRPr>
+          </a:p>
+        </p:txBody>
+      </p:sp>
+      <p:cxnSp>
+        <p:nvCxnSpPr>
+          <p:cNvPr id="37" name="Connecteur droit 20"/>
+          <p:cNvCxnSpPr>
+            <a:stCxn id="36" idx="3"/>
+            <a:endCxn id="19" idx="2"/>
+          </p:cNvCxnSpPr>
+          <p:nvPr/>
+        </p:nvCxnSpPr>
+        <p:spPr>
+          <a:xfrm flipV="1">
+            <a:off x="3647800" y="5545191"/>
+            <a:ext cx="1061053" cy="761924"/>
+          </a:xfrm>
+          <a:prstGeom prst="line">
+            <a:avLst/>
+          </a:prstGeom>
+          <a:ln w="6350"/>
+        </p:spPr>
+        <p:style>
+          <a:lnRef idx="1">
+            <a:schemeClr val="dk1"/>
+          </a:lnRef>
+          <a:fillRef idx="0">
+            <a:schemeClr val="dk1"/>
+          </a:fillRef>
+          <a:effectRef idx="0">
+            <a:schemeClr val="dk1"/>
+          </a:effectRef>
+          <a:fontRef idx="minor">
+            <a:schemeClr val="tx1"/>
+          </a:fontRef>
+        </p:style>
+      </p:cxnSp>
+      <p:cxnSp>
+        <p:nvCxnSpPr>
+          <p:cNvPr id="43" name="Connecteur droit 20"/>
+          <p:cNvCxnSpPr>
+            <a:stCxn id="36" idx="1"/>
+          </p:cNvCxnSpPr>
+          <p:nvPr/>
+        </p:nvCxnSpPr>
+        <p:spPr>
+          <a:xfrm flipH="1" flipV="1">
+            <a:off x="1122970" y="5926155"/>
+            <a:ext cx="1144774" cy="380960"/>
+          </a:xfrm>
+          <a:prstGeom prst="line">
+            <a:avLst/>
+          </a:prstGeom>
+          <a:ln w="6350"/>
+        </p:spPr>
+        <p:style>
+          <a:lnRef idx="1">
+            <a:schemeClr val="dk1"/>
+          </a:lnRef>
+          <a:fillRef idx="0">
+            <a:schemeClr val="dk1"/>
+          </a:fillRef>
+          <a:effectRef idx="0">
+            <a:schemeClr val="dk1"/>
+          </a:effectRef>
+          <a:fontRef idx="minor">
+            <a:schemeClr val="tx1"/>
+          </a:fontRef>
+        </p:style>
+      </p:cxnSp>
+      <p:sp>
+        <p:nvSpPr>
+          <p:cNvPr id="47" name="Rectangle à coins arrondis 7"/>
+          <p:cNvSpPr/>
+          <p:nvPr/>
+        </p:nvSpPr>
+        <p:spPr>
+          <a:xfrm>
+            <a:off x="4071813" y="6290667"/>
+            <a:ext cx="1213296" cy="526179"/>
+          </a:xfrm>
+          <a:prstGeom prst="roundRect">
+            <a:avLst/>
+          </a:prstGeom>
+          <a:ln w="9525"/>
+        </p:spPr>
+        <p:style>
+          <a:lnRef idx="2">
+            <a:schemeClr val="dk1"/>
+          </a:lnRef>
+          <a:fillRef idx="1">
+            <a:schemeClr val="lt1"/>
+          </a:fillRef>
+          <a:effectRef idx="0">
+            <a:schemeClr val="dk1"/>
+          </a:effectRef>
+          <a:fontRef idx="minor">
+            <a:schemeClr val="dk1"/>
+          </a:fontRef>
+        </p:style>
+        <p:txBody>
+          <a:bodyPr rtlCol="0" anchor="ctr"/>
+          <a:lstStyle/>
+          <a:p>
+            <a:pPr algn="ctr"/>
+            <a:r>
+              <a:rPr lang="en-US" sz="1200" dirty="0" smtClean="0"/>
+              <a:t>QoS for Fixed</a:t>
+            </a:r>
+            <a:r>
+              <a:rPr lang="en-US" sz="1200" dirty="0" smtClean="0">
+                <a:solidFill>
+                  <a:schemeClr val="dk1"/>
+                </a:solidFill>
+              </a:rPr>
+              <a:t/>
+            </a:r>
+            <a:br>
+              <a:rPr lang="en-US" sz="1200" dirty="0" smtClean="0">
+                <a:solidFill>
+                  <a:schemeClr val="dk1"/>
+                </a:solidFill>
+              </a:rPr>
+            </a:br>
+            <a:r>
+              <a:rPr lang="en-US" sz="1200" dirty="0" smtClean="0">
+                <a:solidFill>
+                  <a:schemeClr val="dk1"/>
+                </a:solidFill>
+              </a:rPr>
+              <a:t>(Connector)</a:t>
+            </a:r>
+            <a:endParaRPr lang="fr-FR" sz="1200" dirty="0">
+              <a:solidFill>
+                <a:schemeClr val="dk1"/>
+              </a:solidFill>
+            </a:endParaRPr>
+          </a:p>
+        </p:txBody>
+      </p:sp>
+      <p:cxnSp>
+        <p:nvCxnSpPr>
+          <p:cNvPr id="48" name="Connecteur droit avec flèche 13"/>
+          <p:cNvCxnSpPr>
+            <a:stCxn id="12" idx="2"/>
+            <a:endCxn id="47" idx="0"/>
+          </p:cNvCxnSpPr>
+          <p:nvPr/>
+        </p:nvCxnSpPr>
+        <p:spPr>
+          <a:xfrm flipH="1">
+            <a:off x="4678461" y="3317712"/>
+            <a:ext cx="1951445" cy="2972955"/>
+          </a:xfrm>
+          <a:prstGeom prst="straightConnector1">
+            <a:avLst/>
+          </a:prstGeom>
+          <a:ln>
+            <a:tailEnd type="arrow"/>
+          </a:ln>
+        </p:spPr>
+        <p:style>
+          <a:lnRef idx="1">
+            <a:schemeClr val="dk1"/>
+          </a:lnRef>
+          <a:fillRef idx="0">
+            <a:schemeClr val="dk1"/>
+          </a:fillRef>
+          <a:effectRef idx="0">
+            <a:schemeClr val="dk1"/>
+          </a:effectRef>
+          <a:fontRef idx="minor">
+            <a:schemeClr val="tx1"/>
+          </a:fontRef>
+        </p:style>
+      </p:cxnSp>
+      <p:cxnSp>
+        <p:nvCxnSpPr>
+          <p:cNvPr id="52" name="Connecteur droit avec flèche 13"/>
+          <p:cNvCxnSpPr>
+            <a:stCxn id="47" idx="1"/>
+          </p:cNvCxnSpPr>
+          <p:nvPr/>
+        </p:nvCxnSpPr>
+        <p:spPr>
+          <a:xfrm flipH="1" flipV="1">
+            <a:off x="3647801" y="6451973"/>
+            <a:ext cx="424012" cy="101784"/>
+          </a:xfrm>
+          <a:prstGeom prst="straightConnector1">
+            <a:avLst/>
+          </a:prstGeom>
+          <a:ln>
+            <a:tailEnd type="arrow"/>
+          </a:ln>
+        </p:spPr>
+        <p:style>
+          <a:lnRef idx="1">
+            <a:schemeClr val="dk1"/>
+          </a:lnRef>
+          <a:fillRef idx="0">
+            <a:schemeClr val="dk1"/>
+          </a:fillRef>
+          <a:effectRef idx="0">
+            <a:schemeClr val="dk1"/>
+          </a:effectRef>
+          <a:fontRef idx="minor">
+            <a:schemeClr val="tx1"/>
+          </a:fontRef>
+        </p:style>
+      </p:cxnSp>
+      <p:sp>
+        <p:nvSpPr>
+          <p:cNvPr id="56" name="Rectangle à coins arrondis 3"/>
+          <p:cNvSpPr/>
+          <p:nvPr/>
+        </p:nvSpPr>
+        <p:spPr>
+          <a:xfrm>
+            <a:off x="8711952" y="5879393"/>
+            <a:ext cx="864096" cy="967613"/>
+          </a:xfrm>
+          <a:prstGeom prst="roundRect">
+            <a:avLst/>
+          </a:prstGeom>
+          <a:ln w="9525"/>
+        </p:spPr>
+        <p:style>
+          <a:lnRef idx="2">
+            <a:schemeClr val="dk1"/>
+          </a:lnRef>
+          <a:fillRef idx="1">
+            <a:schemeClr val="lt1"/>
+          </a:fillRef>
+          <a:effectRef idx="0">
+            <a:schemeClr val="dk1"/>
+          </a:effectRef>
+          <a:fontRef idx="minor">
+            <a:schemeClr val="dk1"/>
+          </a:fontRef>
+        </p:style>
+        <p:txBody>
+          <a:bodyPr rtlCol="0" anchor="ctr"/>
+          <a:lstStyle/>
+          <a:p>
+            <a:pPr algn="ctr"/>
+            <a:r>
+              <a:rPr lang="de-DE" sz="1200" dirty="0" smtClean="0"/>
+              <a:t>Other Peer</a:t>
+            </a:r>
+            <a:endParaRPr lang="en-US" sz="1200" dirty="0" smtClean="0"/>
+          </a:p>
+        </p:txBody>
+      </p:sp>
+    </p:spTree>
+    <p:extLst>
+      <p:ext uri="{BB962C8B-B14F-4D97-AF65-F5344CB8AC3E}">
+        <p14:creationId xmlns:p14="http://schemas.microsoft.com/office/powerpoint/2010/main" val="1188101014"/>
       </p:ext>
     </p:extLst>
   </p:cSld>

</xml_diff>

<commit_message>
Updated the arch4 image + added a QoS Categorisation Table
</commit_message>
<xml_diff>
--- a/docs/meetings/WP3.3/architectures_solutions_new.pptx
+++ b/docs/meetings/WP3.3/architectures_solutions_new.pptx
@@ -4,6 +4,9 @@
   <p:sldMasterIdLst>
     <p:sldMasterId id="2147483648" r:id="rId1"/>
   </p:sldMasterIdLst>
+  <p:notesMasterIdLst>
+    <p:notesMasterId r:id="rId10"/>
+  </p:notesMasterIdLst>
   <p:sldIdLst>
     <p:sldId id="259" r:id="rId2"/>
     <p:sldId id="261" r:id="rId3"/>
@@ -12,6 +15,7 @@
     <p:sldId id="258" r:id="rId6"/>
     <p:sldId id="263" r:id="rId7"/>
     <p:sldId id="264" r:id="rId8"/>
+    <p:sldId id="266" r:id="rId9"/>
   </p:sldIdLst>
   <p:sldSz cx="9144000" cy="6858000" type="screen4x3"/>
   <p:notesSz cx="6858000" cy="9144000"/>
@@ -113,6 +117,440 @@
 </p:presentation>
 </file>
 
+<file path=ppt/notesMasters/notesMaster1.xml><?xml version="1.0" encoding="utf-8"?>
+<p:notesMaster xmlns:a="http://schemas.openxmlformats.org/drawingml/2006/main" xmlns:r="http://schemas.openxmlformats.org/officeDocument/2006/relationships" xmlns:p="http://schemas.openxmlformats.org/presentationml/2006/main">
+  <p:cSld>
+    <p:bg>
+      <p:bgRef idx="1001">
+        <a:schemeClr val="bg1"/>
+      </p:bgRef>
+    </p:bg>
+    <p:spTree>
+      <p:nvGrpSpPr>
+        <p:cNvPr id="1" name=""/>
+        <p:cNvGrpSpPr/>
+        <p:nvPr/>
+      </p:nvGrpSpPr>
+      <p:grpSpPr>
+        <a:xfrm>
+          <a:off x="0" y="0"/>
+          <a:ext cx="0" cy="0"/>
+          <a:chOff x="0" y="0"/>
+          <a:chExt cx="0" cy="0"/>
+        </a:xfrm>
+      </p:grpSpPr>
+      <p:sp>
+        <p:nvSpPr>
+          <p:cNvPr id="2" name="Header Placeholder 1"/>
+          <p:cNvSpPr>
+            <a:spLocks noGrp="1"/>
+          </p:cNvSpPr>
+          <p:nvPr>
+            <p:ph type="hdr" sz="quarter"/>
+          </p:nvPr>
+        </p:nvSpPr>
+        <p:spPr>
+          <a:xfrm>
+            <a:off x="0" y="0"/>
+            <a:ext cx="2971800" cy="457200"/>
+          </a:xfrm>
+          <a:prstGeom prst="rect">
+            <a:avLst/>
+          </a:prstGeom>
+        </p:spPr>
+        <p:txBody>
+          <a:bodyPr vert="horz" lIns="91440" tIns="45720" rIns="91440" bIns="45720" rtlCol="0"/>
+          <a:lstStyle>
+            <a:lvl1pPr algn="l">
+              <a:defRPr sz="1200"/>
+            </a:lvl1pPr>
+          </a:lstStyle>
+          <a:p>
+            <a:endParaRPr lang="en-US"/>
+          </a:p>
+        </p:txBody>
+      </p:sp>
+      <p:sp>
+        <p:nvSpPr>
+          <p:cNvPr id="3" name="Date Placeholder 2"/>
+          <p:cNvSpPr>
+            <a:spLocks noGrp="1"/>
+          </p:cNvSpPr>
+          <p:nvPr>
+            <p:ph type="dt" idx="1"/>
+          </p:nvPr>
+        </p:nvSpPr>
+        <p:spPr>
+          <a:xfrm>
+            <a:off x="3884613" y="0"/>
+            <a:ext cx="2971800" cy="457200"/>
+          </a:xfrm>
+          <a:prstGeom prst="rect">
+            <a:avLst/>
+          </a:prstGeom>
+        </p:spPr>
+        <p:txBody>
+          <a:bodyPr vert="horz" lIns="91440" tIns="45720" rIns="91440" bIns="45720" rtlCol="0"/>
+          <a:lstStyle>
+            <a:lvl1pPr algn="r">
+              <a:defRPr sz="1200"/>
+            </a:lvl1pPr>
+          </a:lstStyle>
+          <a:p>
+            <a:fld id="{5647BC28-C107-4A4A-B91C-4BF04E0D9B33}" type="datetimeFigureOut">
+              <a:rPr lang="en-US" smtClean="0"/>
+              <a:t>9/8/2015</a:t>
+            </a:fld>
+            <a:endParaRPr lang="en-US"/>
+          </a:p>
+        </p:txBody>
+      </p:sp>
+      <p:sp>
+        <p:nvSpPr>
+          <p:cNvPr id="4" name="Slide Image Placeholder 3"/>
+          <p:cNvSpPr>
+            <a:spLocks noGrp="1" noRot="1" noChangeAspect="1"/>
+          </p:cNvSpPr>
+          <p:nvPr>
+            <p:ph type="sldImg" idx="2"/>
+          </p:nvPr>
+        </p:nvSpPr>
+        <p:spPr>
+          <a:xfrm>
+            <a:off x="1143000" y="685800"/>
+            <a:ext cx="4572000" cy="3429000"/>
+          </a:xfrm>
+          <a:prstGeom prst="rect">
+            <a:avLst/>
+          </a:prstGeom>
+          <a:noFill/>
+          <a:ln w="12700">
+            <a:solidFill>
+              <a:prstClr val="black"/>
+            </a:solidFill>
+          </a:ln>
+        </p:spPr>
+        <p:txBody>
+          <a:bodyPr vert="horz" lIns="91440" tIns="45720" rIns="91440" bIns="45720" rtlCol="0" anchor="ctr"/>
+          <a:lstStyle/>
+          <a:p>
+            <a:endParaRPr lang="en-US"/>
+          </a:p>
+        </p:txBody>
+      </p:sp>
+      <p:sp>
+        <p:nvSpPr>
+          <p:cNvPr id="5" name="Notes Placeholder 4"/>
+          <p:cNvSpPr>
+            <a:spLocks noGrp="1"/>
+          </p:cNvSpPr>
+          <p:nvPr>
+            <p:ph type="body" sz="quarter" idx="3"/>
+          </p:nvPr>
+        </p:nvSpPr>
+        <p:spPr>
+          <a:xfrm>
+            <a:off x="685800" y="4343400"/>
+            <a:ext cx="5486400" cy="4114800"/>
+          </a:xfrm>
+          <a:prstGeom prst="rect">
+            <a:avLst/>
+          </a:prstGeom>
+        </p:spPr>
+        <p:txBody>
+          <a:bodyPr vert="horz" lIns="91440" tIns="45720" rIns="91440" bIns="45720" rtlCol="0"/>
+          <a:lstStyle/>
+          <a:p>
+            <a:pPr lvl="0"/>
+            <a:r>
+              <a:rPr lang="en-US" smtClean="0"/>
+              <a:t>Click to edit Master text styles</a:t>
+            </a:r>
+          </a:p>
+          <a:p>
+            <a:pPr lvl="1"/>
+            <a:r>
+              <a:rPr lang="en-US" smtClean="0"/>
+              <a:t>Second level</a:t>
+            </a:r>
+          </a:p>
+          <a:p>
+            <a:pPr lvl="2"/>
+            <a:r>
+              <a:rPr lang="en-US" smtClean="0"/>
+              <a:t>Third level</a:t>
+            </a:r>
+          </a:p>
+          <a:p>
+            <a:pPr lvl="3"/>
+            <a:r>
+              <a:rPr lang="en-US" smtClean="0"/>
+              <a:t>Fourth level</a:t>
+            </a:r>
+          </a:p>
+          <a:p>
+            <a:pPr lvl="4"/>
+            <a:r>
+              <a:rPr lang="en-US" smtClean="0"/>
+              <a:t>Fifth level</a:t>
+            </a:r>
+            <a:endParaRPr lang="en-US"/>
+          </a:p>
+        </p:txBody>
+      </p:sp>
+      <p:sp>
+        <p:nvSpPr>
+          <p:cNvPr id="6" name="Footer Placeholder 5"/>
+          <p:cNvSpPr>
+            <a:spLocks noGrp="1"/>
+          </p:cNvSpPr>
+          <p:nvPr>
+            <p:ph type="ftr" sz="quarter" idx="4"/>
+          </p:nvPr>
+        </p:nvSpPr>
+        <p:spPr>
+          <a:xfrm>
+            <a:off x="0" y="8685213"/>
+            <a:ext cx="2971800" cy="457200"/>
+          </a:xfrm>
+          <a:prstGeom prst="rect">
+            <a:avLst/>
+          </a:prstGeom>
+        </p:spPr>
+        <p:txBody>
+          <a:bodyPr vert="horz" lIns="91440" tIns="45720" rIns="91440" bIns="45720" rtlCol="0" anchor="b"/>
+          <a:lstStyle>
+            <a:lvl1pPr algn="l">
+              <a:defRPr sz="1200"/>
+            </a:lvl1pPr>
+          </a:lstStyle>
+          <a:p>
+            <a:endParaRPr lang="en-US"/>
+          </a:p>
+        </p:txBody>
+      </p:sp>
+      <p:sp>
+        <p:nvSpPr>
+          <p:cNvPr id="7" name="Slide Number Placeholder 6"/>
+          <p:cNvSpPr>
+            <a:spLocks noGrp="1"/>
+          </p:cNvSpPr>
+          <p:nvPr>
+            <p:ph type="sldNum" sz="quarter" idx="5"/>
+          </p:nvPr>
+        </p:nvSpPr>
+        <p:spPr>
+          <a:xfrm>
+            <a:off x="3884613" y="8685213"/>
+            <a:ext cx="2971800" cy="457200"/>
+          </a:xfrm>
+          <a:prstGeom prst="rect">
+            <a:avLst/>
+          </a:prstGeom>
+        </p:spPr>
+        <p:txBody>
+          <a:bodyPr vert="horz" lIns="91440" tIns="45720" rIns="91440" bIns="45720" rtlCol="0" anchor="b"/>
+          <a:lstStyle>
+            <a:lvl1pPr algn="r">
+              <a:defRPr sz="1200"/>
+            </a:lvl1pPr>
+          </a:lstStyle>
+          <a:p>
+            <a:fld id="{0080D497-1768-4AE9-BF24-87E95313C9CB}" type="slidenum">
+              <a:rPr lang="en-US" smtClean="0"/>
+              <a:t>‹#›</a:t>
+            </a:fld>
+            <a:endParaRPr lang="en-US"/>
+          </a:p>
+        </p:txBody>
+      </p:sp>
+    </p:spTree>
+    <p:extLst>
+      <p:ext uri="{BB962C8B-B14F-4D97-AF65-F5344CB8AC3E}">
+        <p14:creationId xmlns:p14="http://schemas.microsoft.com/office/powerpoint/2010/main" val="2456739527"/>
+      </p:ext>
+    </p:extLst>
+  </p:cSld>
+  <p:clrMap bg1="lt1" tx1="dk1" bg2="lt2" tx2="dk2" accent1="accent1" accent2="accent2" accent3="accent3" accent4="accent4" accent5="accent5" accent6="accent6" hlink="hlink" folHlink="folHlink"/>
+  <p:notesStyle>
+    <a:lvl1pPr marL="0" algn="l" defTabSz="914400" rtl="0" eaLnBrk="1" latinLnBrk="0" hangingPunct="1">
+      <a:defRPr sz="1200" kern="1200">
+        <a:solidFill>
+          <a:schemeClr val="tx1"/>
+        </a:solidFill>
+        <a:latin typeface="+mn-lt"/>
+        <a:ea typeface="+mn-ea"/>
+        <a:cs typeface="+mn-cs"/>
+      </a:defRPr>
+    </a:lvl1pPr>
+    <a:lvl2pPr marL="457200" algn="l" defTabSz="914400" rtl="0" eaLnBrk="1" latinLnBrk="0" hangingPunct="1">
+      <a:defRPr sz="1200" kern="1200">
+        <a:solidFill>
+          <a:schemeClr val="tx1"/>
+        </a:solidFill>
+        <a:latin typeface="+mn-lt"/>
+        <a:ea typeface="+mn-ea"/>
+        <a:cs typeface="+mn-cs"/>
+      </a:defRPr>
+    </a:lvl2pPr>
+    <a:lvl3pPr marL="914400" algn="l" defTabSz="914400" rtl="0" eaLnBrk="1" latinLnBrk="0" hangingPunct="1">
+      <a:defRPr sz="1200" kern="1200">
+        <a:solidFill>
+          <a:schemeClr val="tx1"/>
+        </a:solidFill>
+        <a:latin typeface="+mn-lt"/>
+        <a:ea typeface="+mn-ea"/>
+        <a:cs typeface="+mn-cs"/>
+      </a:defRPr>
+    </a:lvl3pPr>
+    <a:lvl4pPr marL="1371600" algn="l" defTabSz="914400" rtl="0" eaLnBrk="1" latinLnBrk="0" hangingPunct="1">
+      <a:defRPr sz="1200" kern="1200">
+        <a:solidFill>
+          <a:schemeClr val="tx1"/>
+        </a:solidFill>
+        <a:latin typeface="+mn-lt"/>
+        <a:ea typeface="+mn-ea"/>
+        <a:cs typeface="+mn-cs"/>
+      </a:defRPr>
+    </a:lvl4pPr>
+    <a:lvl5pPr marL="1828800" algn="l" defTabSz="914400" rtl="0" eaLnBrk="1" latinLnBrk="0" hangingPunct="1">
+      <a:defRPr sz="1200" kern="1200">
+        <a:solidFill>
+          <a:schemeClr val="tx1"/>
+        </a:solidFill>
+        <a:latin typeface="+mn-lt"/>
+        <a:ea typeface="+mn-ea"/>
+        <a:cs typeface="+mn-cs"/>
+      </a:defRPr>
+    </a:lvl5pPr>
+    <a:lvl6pPr marL="2286000" algn="l" defTabSz="914400" rtl="0" eaLnBrk="1" latinLnBrk="0" hangingPunct="1">
+      <a:defRPr sz="1200" kern="1200">
+        <a:solidFill>
+          <a:schemeClr val="tx1"/>
+        </a:solidFill>
+        <a:latin typeface="+mn-lt"/>
+        <a:ea typeface="+mn-ea"/>
+        <a:cs typeface="+mn-cs"/>
+      </a:defRPr>
+    </a:lvl6pPr>
+    <a:lvl7pPr marL="2743200" algn="l" defTabSz="914400" rtl="0" eaLnBrk="1" latinLnBrk="0" hangingPunct="1">
+      <a:defRPr sz="1200" kern="1200">
+        <a:solidFill>
+          <a:schemeClr val="tx1"/>
+        </a:solidFill>
+        <a:latin typeface="+mn-lt"/>
+        <a:ea typeface="+mn-ea"/>
+        <a:cs typeface="+mn-cs"/>
+      </a:defRPr>
+    </a:lvl7pPr>
+    <a:lvl8pPr marL="3200400" algn="l" defTabSz="914400" rtl="0" eaLnBrk="1" latinLnBrk="0" hangingPunct="1">
+      <a:defRPr sz="1200" kern="1200">
+        <a:solidFill>
+          <a:schemeClr val="tx1"/>
+        </a:solidFill>
+        <a:latin typeface="+mn-lt"/>
+        <a:ea typeface="+mn-ea"/>
+        <a:cs typeface="+mn-cs"/>
+      </a:defRPr>
+    </a:lvl8pPr>
+    <a:lvl9pPr marL="3657600" algn="l" defTabSz="914400" rtl="0" eaLnBrk="1" latinLnBrk="0" hangingPunct="1">
+      <a:defRPr sz="1200" kern="1200">
+        <a:solidFill>
+          <a:schemeClr val="tx1"/>
+        </a:solidFill>
+        <a:latin typeface="+mn-lt"/>
+        <a:ea typeface="+mn-ea"/>
+        <a:cs typeface="+mn-cs"/>
+      </a:defRPr>
+    </a:lvl9pPr>
+  </p:notesStyle>
+</p:notesMaster>
+</file>
+
+<file path=ppt/notesSlides/notesSlide1.xml><?xml version="1.0" encoding="utf-8"?>
+<p:notes xmlns:a="http://schemas.openxmlformats.org/drawingml/2006/main" xmlns:r="http://schemas.openxmlformats.org/officeDocument/2006/relationships" xmlns:p="http://schemas.openxmlformats.org/presentationml/2006/main">
+  <p:cSld>
+    <p:spTree>
+      <p:nvGrpSpPr>
+        <p:cNvPr id="1" name=""/>
+        <p:cNvGrpSpPr/>
+        <p:nvPr/>
+      </p:nvGrpSpPr>
+      <p:grpSpPr>
+        <a:xfrm>
+          <a:off x="0" y="0"/>
+          <a:ext cx="0" cy="0"/>
+          <a:chOff x="0" y="0"/>
+          <a:chExt cx="0" cy="0"/>
+        </a:xfrm>
+      </p:grpSpPr>
+      <p:sp>
+        <p:nvSpPr>
+          <p:cNvPr id="2" name="Slide Image Placeholder 1"/>
+          <p:cNvSpPr>
+            <a:spLocks noGrp="1" noRot="1" noChangeAspect="1"/>
+          </p:cNvSpPr>
+          <p:nvPr>
+            <p:ph type="sldImg"/>
+          </p:nvPr>
+        </p:nvSpPr>
+        <p:spPr/>
+      </p:sp>
+      <p:sp>
+        <p:nvSpPr>
+          <p:cNvPr id="3" name="Notes Placeholder 2"/>
+          <p:cNvSpPr>
+            <a:spLocks noGrp="1"/>
+          </p:cNvSpPr>
+          <p:nvPr>
+            <p:ph type="body" idx="1"/>
+          </p:nvPr>
+        </p:nvSpPr>
+        <p:spPr/>
+        <p:txBody>
+          <a:bodyPr/>
+          <a:lstStyle/>
+          <a:p>
+            <a:endParaRPr lang="en-GB" dirty="0"/>
+          </a:p>
+        </p:txBody>
+      </p:sp>
+      <p:sp>
+        <p:nvSpPr>
+          <p:cNvPr id="4" name="Slide Number Placeholder 3"/>
+          <p:cNvSpPr>
+            <a:spLocks noGrp="1"/>
+          </p:cNvSpPr>
+          <p:nvPr>
+            <p:ph type="sldNum" sz="quarter" idx="10"/>
+          </p:nvPr>
+        </p:nvSpPr>
+        <p:spPr/>
+        <p:txBody>
+          <a:bodyPr/>
+          <a:lstStyle/>
+          <a:p>
+            <a:fld id="{2F36C460-ACCE-4C01-8B67-5379AE8387A3}" type="slidenum">
+              <a:rPr lang="en-GB" smtClean="0"/>
+              <a:t>8</a:t>
+            </a:fld>
+            <a:endParaRPr lang="en-GB"/>
+          </a:p>
+        </p:txBody>
+      </p:sp>
+    </p:spTree>
+    <p:extLst>
+      <p:ext uri="{BB962C8B-B14F-4D97-AF65-F5344CB8AC3E}">
+        <p14:creationId xmlns:p14="http://schemas.microsoft.com/office/powerpoint/2010/main" val="3203601426"/>
+      </p:ext>
+    </p:extLst>
+  </p:cSld>
+  <p:clrMapOvr>
+    <a:masterClrMapping/>
+  </p:clrMapOvr>
+</p:notes>
+</file>
+
 <file path=ppt/slideLayouts/slideLayout1.xml><?xml version="1.0" encoding="utf-8"?>
 <p:sldLayout xmlns:a="http://schemas.openxmlformats.org/drawingml/2006/main" xmlns:r="http://schemas.openxmlformats.org/officeDocument/2006/relationships" xmlns:p="http://schemas.openxmlformats.org/presentationml/2006/main" type="title" preserve="1">
   <p:cSld name="Diapositive de titre">
@@ -294,7 +732,7 @@
           <a:p>
             <a:fld id="{519BC0D5-E863-414A-87A7-748B4A81AC5F}" type="datetimeFigureOut">
               <a:rPr lang="fr-FR" smtClean="0"/>
-              <a:t>29/07/2015</a:t>
+              <a:t>08/09/2015</a:t>
             </a:fld>
             <a:endParaRPr lang="fr-FR"/>
           </a:p>
@@ -464,7 +902,7 @@
           <a:p>
             <a:fld id="{519BC0D5-E863-414A-87A7-748B4A81AC5F}" type="datetimeFigureOut">
               <a:rPr lang="fr-FR" smtClean="0"/>
-              <a:t>29/07/2015</a:t>
+              <a:t>08/09/2015</a:t>
             </a:fld>
             <a:endParaRPr lang="fr-FR"/>
           </a:p>
@@ -644,7 +1082,7 @@
           <a:p>
             <a:fld id="{519BC0D5-E863-414A-87A7-748B4A81AC5F}" type="datetimeFigureOut">
               <a:rPr lang="fr-FR" smtClean="0"/>
-              <a:t>29/07/2015</a:t>
+              <a:t>08/09/2015</a:t>
             </a:fld>
             <a:endParaRPr lang="fr-FR"/>
           </a:p>
@@ -814,7 +1252,7 @@
           <a:p>
             <a:fld id="{519BC0D5-E863-414A-87A7-748B4A81AC5F}" type="datetimeFigureOut">
               <a:rPr lang="fr-FR" smtClean="0"/>
-              <a:t>29/07/2015</a:t>
+              <a:t>08/09/2015</a:t>
             </a:fld>
             <a:endParaRPr lang="fr-FR"/>
           </a:p>
@@ -1060,7 +1498,7 @@
           <a:p>
             <a:fld id="{519BC0D5-E863-414A-87A7-748B4A81AC5F}" type="datetimeFigureOut">
               <a:rPr lang="fr-FR" smtClean="0"/>
-              <a:t>29/07/2015</a:t>
+              <a:t>08/09/2015</a:t>
             </a:fld>
             <a:endParaRPr lang="fr-FR"/>
           </a:p>
@@ -1348,7 +1786,7 @@
           <a:p>
             <a:fld id="{519BC0D5-E863-414A-87A7-748B4A81AC5F}" type="datetimeFigureOut">
               <a:rPr lang="fr-FR" smtClean="0"/>
-              <a:t>29/07/2015</a:t>
+              <a:t>08/09/2015</a:t>
             </a:fld>
             <a:endParaRPr lang="fr-FR"/>
           </a:p>
@@ -1770,7 +2208,7 @@
           <a:p>
             <a:fld id="{519BC0D5-E863-414A-87A7-748B4A81AC5F}" type="datetimeFigureOut">
               <a:rPr lang="fr-FR" smtClean="0"/>
-              <a:t>29/07/2015</a:t>
+              <a:t>08/09/2015</a:t>
             </a:fld>
             <a:endParaRPr lang="fr-FR"/>
           </a:p>
@@ -1888,7 +2326,7 @@
           <a:p>
             <a:fld id="{519BC0D5-E863-414A-87A7-748B4A81AC5F}" type="datetimeFigureOut">
               <a:rPr lang="fr-FR" smtClean="0"/>
-              <a:t>29/07/2015</a:t>
+              <a:t>08/09/2015</a:t>
             </a:fld>
             <a:endParaRPr lang="fr-FR"/>
           </a:p>
@@ -1983,7 +2421,7 @@
           <a:p>
             <a:fld id="{519BC0D5-E863-414A-87A7-748B4A81AC5F}" type="datetimeFigureOut">
               <a:rPr lang="fr-FR" smtClean="0"/>
-              <a:t>29/07/2015</a:t>
+              <a:t>08/09/2015</a:t>
             </a:fld>
             <a:endParaRPr lang="fr-FR"/>
           </a:p>
@@ -2260,7 +2698,7 @@
           <a:p>
             <a:fld id="{519BC0D5-E863-414A-87A7-748B4A81AC5F}" type="datetimeFigureOut">
               <a:rPr lang="fr-FR" smtClean="0"/>
-              <a:t>29/07/2015</a:t>
+              <a:t>08/09/2015</a:t>
             </a:fld>
             <a:endParaRPr lang="fr-FR"/>
           </a:p>
@@ -2513,7 +2951,7 @@
           <a:p>
             <a:fld id="{519BC0D5-E863-414A-87A7-748B4A81AC5F}" type="datetimeFigureOut">
               <a:rPr lang="fr-FR" smtClean="0"/>
-              <a:t>29/07/2015</a:t>
+              <a:t>08/09/2015</a:t>
             </a:fld>
             <a:endParaRPr lang="fr-FR"/>
           </a:p>
@@ -2726,7 +3164,7 @@
           <a:p>
             <a:fld id="{519BC0D5-E863-414A-87A7-748B4A81AC5F}" type="datetimeFigureOut">
               <a:rPr lang="fr-FR" smtClean="0"/>
-              <a:t>29/07/2015</a:t>
+              <a:t>08/09/2015</a:t>
             </a:fld>
             <a:endParaRPr lang="fr-FR"/>
           </a:p>
@@ -5660,15 +6098,7 @@
           <a:p>
             <a:r>
               <a:rPr lang="en-US" sz="2800" dirty="0" smtClean="0"/>
-              <a:t>Architecture 3 (for </a:t>
-            </a:r>
-            <a:r>
-              <a:rPr lang="en-US" sz="2800" dirty="0" smtClean="0"/>
-              <a:t>mobile connected </a:t>
-            </a:r>
-            <a:r>
-              <a:rPr lang="en-US" sz="2800" dirty="0" smtClean="0"/>
-              <a:t>devices)</a:t>
+              <a:t>Architecture 3 (for mobile connected devices)</a:t>
             </a:r>
             <a:endParaRPr lang="fr-FR" sz="2800" dirty="0"/>
           </a:p>
@@ -5931,15 +6361,7 @@
                   <a:schemeClr val="dk1"/>
                 </a:solidFill>
               </a:rPr>
-              <a:t>/Web </a:t>
-            </a:r>
-            <a:r>
-              <a:rPr lang="en-US" sz="1200" dirty="0" smtClean="0">
-                <a:solidFill>
-                  <a:schemeClr val="dk1"/>
-                </a:solidFill>
-              </a:rPr>
-              <a:t>Server</a:t>
+              <a:t>/Web Server</a:t>
             </a:r>
           </a:p>
           <a:p>
@@ -7141,12 +7563,17 @@
         </p:nvSpPr>
         <p:spPr>
           <a:xfrm>
-            <a:off x="899592" y="3889844"/>
-            <a:ext cx="3197194" cy="2249214"/>
+            <a:off x="395536" y="3889844"/>
+            <a:ext cx="3701250" cy="1552079"/>
           </a:xfrm>
           <a:prstGeom prst="cloud">
             <a:avLst/>
           </a:prstGeom>
+          <a:solidFill>
+            <a:schemeClr val="bg1">
+              <a:lumMod val="95000"/>
+            </a:schemeClr>
+          </a:solidFill>
           <a:ln w="9525"/>
         </p:spPr>
         <p:style>
@@ -7168,7 +7595,11 @@
           <a:lstStyle/>
           <a:p>
             <a:pPr algn="ctr"/>
-            <a:endParaRPr lang="fr-FR" sz="1200"/>
+            <a:r>
+              <a:rPr lang="fr-FR" sz="1200" dirty="0" smtClean="0"/>
+              <a:t>Mobile Network</a:t>
+            </a:r>
+            <a:endParaRPr lang="fr-FR" sz="1200" dirty="0"/>
           </a:p>
         </p:txBody>
       </p:sp>
@@ -7180,12 +7611,17 @@
         </p:nvSpPr>
         <p:spPr>
           <a:xfrm>
-            <a:off x="902386" y="5751377"/>
-            <a:ext cx="2913530" cy="1401192"/>
+            <a:off x="478807" y="5661248"/>
+            <a:ext cx="3337109" cy="1152128"/>
           </a:xfrm>
           <a:prstGeom prst="cloud">
             <a:avLst/>
           </a:prstGeom>
+          <a:solidFill>
+            <a:schemeClr val="bg1">
+              <a:lumMod val="75000"/>
+            </a:schemeClr>
+          </a:solidFill>
           <a:ln w="9525"/>
         </p:spPr>
         <p:style>
@@ -7207,7 +7643,19 @@
           <a:lstStyle/>
           <a:p>
             <a:pPr algn="ctr"/>
-            <a:endParaRPr lang="fr-FR" sz="1200"/>
+            <a:r>
+              <a:rPr lang="fr-FR" sz="1200" dirty="0" smtClean="0"/>
+              <a:t>Home/</a:t>
+            </a:r>
+            <a:r>
+              <a:rPr lang="fr-FR" sz="1200" dirty="0" err="1" smtClean="0"/>
+              <a:t>Fixed</a:t>
+            </a:r>
+            <a:r>
+              <a:rPr lang="fr-FR" sz="1200" dirty="0" smtClean="0"/>
+              <a:t> Network</a:t>
+            </a:r>
+            <a:endParaRPr lang="fr-FR" sz="1200" dirty="0"/>
           </a:p>
         </p:txBody>
       </p:sp>
@@ -7219,8 +7667,8 @@
         </p:nvSpPr>
         <p:spPr>
           <a:xfrm>
-            <a:off x="5220071" y="4599187"/>
-            <a:ext cx="3672409" cy="1926157"/>
+            <a:off x="5285109" y="4576732"/>
+            <a:ext cx="3312369" cy="1730382"/>
           </a:xfrm>
           <a:prstGeom prst="cloud">
             <a:avLst/>
@@ -7274,15 +7722,7 @@
           <a:p>
             <a:r>
               <a:rPr lang="en-US" sz="2800" dirty="0" smtClean="0"/>
-              <a:t>Architecture </a:t>
-            </a:r>
-            <a:r>
-              <a:rPr lang="en-US" sz="2800" dirty="0" smtClean="0"/>
-              <a:t>4 </a:t>
-            </a:r>
-            <a:r>
-              <a:rPr lang="en-US" sz="2800" dirty="0" smtClean="0"/>
-              <a:t>(for </a:t>
+              <a:t>Architecture 4 (for </a:t>
             </a:r>
             <a:r>
               <a:rPr lang="en-US" sz="2800" dirty="0" err="1" smtClean="0"/>
@@ -7290,221 +7730,9 @@
             </a:r>
             <a:r>
               <a:rPr lang="en-US" sz="2800" dirty="0" smtClean="0"/>
-              <a:t> connected </a:t>
-            </a:r>
-            <a:r>
-              <a:rPr lang="en-US" sz="2800" dirty="0" smtClean="0"/>
-              <a:t>devices)</a:t>
+              <a:t> connected devices)</a:t>
             </a:r>
             <a:endParaRPr lang="fr-FR" sz="2800" dirty="0"/>
-          </a:p>
-        </p:txBody>
-      </p:sp>
-      <p:sp>
-        <p:nvSpPr>
-          <p:cNvPr id="4" name="Rectangle à coins arrondis 3"/>
-          <p:cNvSpPr/>
-          <p:nvPr/>
-        </p:nvSpPr>
-        <p:spPr>
-          <a:xfrm>
-            <a:off x="258873" y="4563020"/>
-            <a:ext cx="864096" cy="2178348"/>
-          </a:xfrm>
-          <a:prstGeom prst="roundRect">
-            <a:avLst/>
-          </a:prstGeom>
-          <a:ln w="9525"/>
-        </p:spPr>
-        <p:style>
-          <a:lnRef idx="2">
-            <a:schemeClr val="dk1"/>
-          </a:lnRef>
-          <a:fillRef idx="1">
-            <a:schemeClr val="lt1"/>
-          </a:fillRef>
-          <a:effectRef idx="0">
-            <a:schemeClr val="dk1"/>
-          </a:effectRef>
-          <a:fontRef idx="minor">
-            <a:schemeClr val="dk1"/>
-          </a:fontRef>
-        </p:style>
-        <p:txBody>
-          <a:bodyPr rtlCol="0" anchor="ctr"/>
-          <a:lstStyle/>
-          <a:p>
-            <a:pPr algn="ctr"/>
-            <a:endParaRPr lang="en-US" sz="1200" dirty="0" smtClean="0"/>
-          </a:p>
-          <a:p>
-            <a:pPr algn="ctr"/>
-            <a:endParaRPr lang="en-US" sz="1200" dirty="0"/>
-          </a:p>
-          <a:p>
-            <a:pPr algn="ctr"/>
-            <a:endParaRPr lang="en-US" sz="1200" dirty="0" smtClean="0"/>
-          </a:p>
-          <a:p>
-            <a:pPr algn="ctr"/>
-            <a:endParaRPr lang="en-US" sz="1200" dirty="0"/>
-          </a:p>
-          <a:p>
-            <a:pPr algn="ctr"/>
-            <a:endParaRPr lang="en-US" sz="1200" dirty="0" smtClean="0"/>
-          </a:p>
-          <a:p>
-            <a:pPr algn="ctr"/>
-            <a:r>
-              <a:rPr lang="en-US" sz="1200" dirty="0" smtClean="0"/>
-              <a:t>UE</a:t>
-            </a:r>
-            <a:endParaRPr lang="fr-FR" sz="1200" dirty="0"/>
-          </a:p>
-        </p:txBody>
-      </p:sp>
-      <p:sp>
-        <p:nvSpPr>
-          <p:cNvPr id="5" name="Rectangle à coins arrondis 4"/>
-          <p:cNvSpPr/>
-          <p:nvPr/>
-        </p:nvSpPr>
-        <p:spPr>
-          <a:xfrm>
-            <a:off x="342881" y="4761780"/>
-            <a:ext cx="700727" cy="394635"/>
-          </a:xfrm>
-          <a:prstGeom prst="roundRect">
-            <a:avLst/>
-          </a:prstGeom>
-          <a:ln w="9525"/>
-        </p:spPr>
-        <p:style>
-          <a:lnRef idx="2">
-            <a:schemeClr val="dk1"/>
-          </a:lnRef>
-          <a:fillRef idx="1">
-            <a:schemeClr val="lt1"/>
-          </a:fillRef>
-          <a:effectRef idx="0">
-            <a:schemeClr val="dk1"/>
-          </a:effectRef>
-          <a:fontRef idx="minor">
-            <a:schemeClr val="dk1"/>
-          </a:fontRef>
-        </p:style>
-        <p:txBody>
-          <a:bodyPr rtlCol="0" anchor="ctr"/>
-          <a:lstStyle/>
-          <a:p>
-            <a:pPr algn="ctr"/>
-            <a:r>
-              <a:rPr lang="en-US" sz="1200" dirty="0"/>
-              <a:t>App</a:t>
-            </a:r>
-            <a:endParaRPr lang="fr-FR" sz="1200" dirty="0"/>
-          </a:p>
-        </p:txBody>
-      </p:sp>
-      <p:sp>
-        <p:nvSpPr>
-          <p:cNvPr id="6" name="Rectangle à coins arrondis 5"/>
-          <p:cNvSpPr/>
-          <p:nvPr/>
-        </p:nvSpPr>
-        <p:spPr>
-          <a:xfrm>
-            <a:off x="2843809" y="5013176"/>
-            <a:ext cx="1152128" cy="526179"/>
-          </a:xfrm>
-          <a:prstGeom prst="roundRect">
-            <a:avLst/>
-          </a:prstGeom>
-          <a:ln w="9525"/>
-        </p:spPr>
-        <p:style>
-          <a:lnRef idx="2">
-            <a:schemeClr val="dk1"/>
-          </a:lnRef>
-          <a:fillRef idx="1">
-            <a:schemeClr val="lt1"/>
-          </a:fillRef>
-          <a:effectRef idx="0">
-            <a:schemeClr val="dk1"/>
-          </a:effectRef>
-          <a:fontRef idx="minor">
-            <a:schemeClr val="dk1"/>
-          </a:fontRef>
-        </p:style>
-        <p:txBody>
-          <a:bodyPr rtlCol="0" anchor="ctr"/>
-          <a:lstStyle/>
-          <a:p>
-            <a:pPr algn="ctr"/>
-            <a:r>
-              <a:rPr lang="en-US" sz="1200" dirty="0" smtClean="0">
-                <a:solidFill>
-                  <a:schemeClr val="dk1"/>
-                </a:solidFill>
-              </a:rPr>
-              <a:t>PDN Gateway</a:t>
-            </a:r>
-            <a:endParaRPr lang="fr-FR" sz="1200" dirty="0">
-              <a:solidFill>
-                <a:schemeClr val="dk1"/>
-              </a:solidFill>
-            </a:endParaRPr>
-          </a:p>
-        </p:txBody>
-      </p:sp>
-      <p:sp>
-        <p:nvSpPr>
-          <p:cNvPr id="8" name="Rectangle à coins arrondis 7"/>
-          <p:cNvSpPr/>
-          <p:nvPr/>
-        </p:nvSpPr>
-        <p:spPr>
-          <a:xfrm>
-            <a:off x="2999825" y="4077498"/>
-            <a:ext cx="816091" cy="526179"/>
-          </a:xfrm>
-          <a:prstGeom prst="roundRect">
-            <a:avLst/>
-          </a:prstGeom>
-          <a:ln w="9525"/>
-        </p:spPr>
-        <p:style>
-          <a:lnRef idx="2">
-            <a:schemeClr val="dk1"/>
-          </a:lnRef>
-          <a:fillRef idx="1">
-            <a:schemeClr val="lt1"/>
-          </a:fillRef>
-          <a:effectRef idx="0">
-            <a:schemeClr val="dk1"/>
-          </a:effectRef>
-          <a:fontRef idx="minor">
-            <a:schemeClr val="dk1"/>
-          </a:fontRef>
-        </p:style>
-        <p:txBody>
-          <a:bodyPr rtlCol="0" anchor="ctr"/>
-          <a:lstStyle/>
-          <a:p>
-            <a:pPr algn="ctr"/>
-            <a:r>
-              <a:rPr lang="en-US" sz="1200" dirty="0" smtClean="0">
-                <a:solidFill>
-                  <a:schemeClr val="dk1"/>
-                </a:solidFill>
-              </a:rPr>
-              <a:t>PCRF</a:t>
-            </a:r>
-            <a:endParaRPr lang="fr-FR" sz="1200" dirty="0">
-              <a:solidFill>
-                <a:schemeClr val="dk1"/>
-              </a:solidFill>
-            </a:endParaRPr>
           </a:p>
         </p:txBody>
       </p:sp>
@@ -7522,17 +7750,17 @@
           <a:prstGeom prst="roundRect">
             <a:avLst/>
           </a:prstGeom>
-          <a:ln w="9525"/>
-        </p:spPr>
-        <p:style>
-          <a:lnRef idx="2">
-            <a:schemeClr val="dk1"/>
-          </a:lnRef>
-          <a:fillRef idx="1">
-            <a:schemeClr val="lt1"/>
-          </a:fillRef>
-          <a:effectRef idx="0">
-            <a:schemeClr val="dk1"/>
+          <a:ln/>
+        </p:spPr>
+        <p:style>
+          <a:lnRef idx="1">
+            <a:schemeClr val="accent3"/>
+          </a:lnRef>
+          <a:fillRef idx="2">
+            <a:schemeClr val="accent3"/>
+          </a:fillRef>
+          <a:effectRef idx="1">
+            <a:schemeClr val="accent3"/>
           </a:effectRef>
           <a:fontRef idx="minor">
             <a:schemeClr val="dk1"/>
@@ -7557,15 +7785,7 @@
                   <a:schemeClr val="dk1"/>
                 </a:solidFill>
               </a:rPr>
-              <a:t>/Web </a:t>
-            </a:r>
-            <a:r>
-              <a:rPr lang="en-US" sz="1200" dirty="0" smtClean="0">
-                <a:solidFill>
-                  <a:schemeClr val="dk1"/>
-                </a:solidFill>
-              </a:rPr>
-              <a:t>Server</a:t>
+              <a:t>/Web Server</a:t>
             </a:r>
           </a:p>
           <a:p>
@@ -7594,31 +7814,31 @@
         <p:nvCxnSpPr>
           <p:cNvPr id="11" name="Connecteur droit avec flèche 10"/>
           <p:cNvCxnSpPr>
-            <a:stCxn id="6" idx="1"/>
-            <a:endCxn id="4" idx="3"/>
+            <a:endCxn id="60" idx="2"/>
           </p:cNvCxnSpPr>
           <p:nvPr/>
         </p:nvCxnSpPr>
         <p:spPr>
-          <a:xfrm flipH="1">
-            <a:off x="1122969" y="5276266"/>
-            <a:ext cx="1720840" cy="375928"/>
+          <a:xfrm flipH="1" flipV="1">
+            <a:off x="478808" y="4670976"/>
+            <a:ext cx="2365003" cy="486218"/>
           </a:xfrm>
           <a:prstGeom prst="straightConnector1">
             <a:avLst/>
           </a:prstGeom>
           <a:ln>
-            <a:tailEnd type="arrow"/>
+            <a:headEnd type="none" w="med" len="med"/>
+            <a:tailEnd type="none" w="med" len="med"/>
           </a:ln>
         </p:spPr>
         <p:style>
-          <a:lnRef idx="1">
+          <a:lnRef idx="3">
             <a:schemeClr val="dk1"/>
           </a:lnRef>
           <a:fillRef idx="0">
             <a:schemeClr val="dk1"/>
           </a:fillRef>
-          <a:effectRef idx="0">
+          <a:effectRef idx="2">
             <a:schemeClr val="dk1"/>
           </a:effectRef>
           <a:fontRef idx="minor">
@@ -7626,59 +7846,6 @@
           </a:fontRef>
         </p:style>
       </p:cxnSp>
-      <p:sp>
-        <p:nvSpPr>
-          <p:cNvPr id="12" name="Rectangle à coins arrondis 11"/>
-          <p:cNvSpPr/>
-          <p:nvPr/>
-        </p:nvSpPr>
-        <p:spPr>
-          <a:xfrm>
-            <a:off x="5137577" y="2718102"/>
-            <a:ext cx="2984657" cy="599610"/>
-          </a:xfrm>
-          <a:prstGeom prst="roundRect">
-            <a:avLst/>
-          </a:prstGeom>
-          <a:ln w="9525">
-            <a:prstDash val="dash"/>
-          </a:ln>
-        </p:spPr>
-        <p:style>
-          <a:lnRef idx="2">
-            <a:schemeClr val="dk1"/>
-          </a:lnRef>
-          <a:fillRef idx="1">
-            <a:schemeClr val="lt1"/>
-          </a:fillRef>
-          <a:effectRef idx="0">
-            <a:schemeClr val="dk1"/>
-          </a:effectRef>
-          <a:fontRef idx="minor">
-            <a:schemeClr val="dk1"/>
-          </a:fontRef>
-        </p:style>
-        <p:txBody>
-          <a:bodyPr rtlCol="0" anchor="ctr"/>
-          <a:lstStyle/>
-          <a:p>
-            <a:pPr algn="ctr"/>
-            <a:r>
-              <a:rPr lang="en-US" sz="1200" dirty="0" smtClean="0">
-                <a:solidFill>
-                  <a:schemeClr val="dk1"/>
-                </a:solidFill>
-              </a:rPr>
-              <a:t>Broker</a:t>
-            </a:r>
-            <a:endParaRPr lang="fr-FR" sz="1200" dirty="0">
-              <a:solidFill>
-                <a:schemeClr val="dk1"/>
-              </a:solidFill>
-            </a:endParaRPr>
-          </a:p>
-        </p:txBody>
-      </p:sp>
       <p:cxnSp>
         <p:nvCxnSpPr>
           <p:cNvPr id="13" name="Connecteur droit avec flèche 12"/>
@@ -7691,24 +7858,26 @@
         <p:spPr>
           <a:xfrm>
             <a:off x="5474253" y="2111708"/>
-            <a:ext cx="1155653" cy="606394"/>
+            <a:ext cx="1565859" cy="597212"/>
           </a:xfrm>
           <a:prstGeom prst="straightConnector1">
             <a:avLst/>
           </a:prstGeom>
           <a:ln>
-            <a:tailEnd type="arrow"/>
+            <a:prstDash val="sysDot"/>
+            <a:headEnd type="none" w="med" len="med"/>
+            <a:tailEnd type="none" w="med" len="med"/>
           </a:ln>
         </p:spPr>
         <p:style>
-          <a:lnRef idx="1">
-            <a:schemeClr val="dk1"/>
+          <a:lnRef idx="3">
+            <a:schemeClr val="accent4"/>
           </a:lnRef>
           <a:fillRef idx="0">
-            <a:schemeClr val="dk1"/>
-          </a:fillRef>
-          <a:effectRef idx="0">
-            <a:schemeClr val="dk1"/>
+            <a:schemeClr val="accent4"/>
+          </a:fillRef>
+          <a:effectRef idx="2">
+            <a:schemeClr val="accent4"/>
           </a:effectRef>
           <a:fontRef idx="minor">
             <a:schemeClr val="tx1"/>
@@ -7726,25 +7895,27 @@
         </p:nvCxnSpPr>
         <p:spPr>
           <a:xfrm flipH="1">
-            <a:off x="3407871" y="3945952"/>
-            <a:ext cx="598904" cy="131546"/>
+            <a:off x="3407871" y="3777746"/>
+            <a:ext cx="338297" cy="299752"/>
           </a:xfrm>
           <a:prstGeom prst="straightConnector1">
             <a:avLst/>
           </a:prstGeom>
           <a:ln>
-            <a:tailEnd type="arrow"/>
+            <a:prstDash val="sysDot"/>
+            <a:headEnd type="none" w="med" len="med"/>
+            <a:tailEnd type="none" w="med" len="med"/>
           </a:ln>
         </p:spPr>
         <p:style>
-          <a:lnRef idx="1">
-            <a:schemeClr val="dk1"/>
+          <a:lnRef idx="3">
+            <a:schemeClr val="accent4"/>
           </a:lnRef>
           <a:fillRef idx="0">
-            <a:schemeClr val="dk1"/>
-          </a:fillRef>
-          <a:effectRef idx="0">
-            <a:schemeClr val="dk1"/>
+            <a:schemeClr val="accent4"/>
+          </a:fillRef>
+          <a:effectRef idx="2">
+            <a:schemeClr val="accent4"/>
           </a:effectRef>
           <a:fontRef idx="minor">
             <a:schemeClr val="tx1"/>
@@ -7761,26 +7932,28 @@
           <p:nvPr/>
         </p:nvCxnSpPr>
         <p:spPr>
-          <a:xfrm>
-            <a:off x="3407871" y="4603677"/>
-            <a:ext cx="12002" cy="409499"/>
+          <a:xfrm flipH="1">
+            <a:off x="2915816" y="4603677"/>
+            <a:ext cx="492055" cy="337491"/>
           </a:xfrm>
           <a:prstGeom prst="straightConnector1">
             <a:avLst/>
           </a:prstGeom>
           <a:ln>
-            <a:tailEnd type="arrow"/>
+            <a:prstDash val="sysDot"/>
+            <a:headEnd type="none" w="med" len="med"/>
+            <a:tailEnd type="none" w="med" len="med"/>
           </a:ln>
         </p:spPr>
         <p:style>
-          <a:lnRef idx="1">
-            <a:schemeClr val="dk1"/>
+          <a:lnRef idx="3">
+            <a:schemeClr val="accent4"/>
           </a:lnRef>
           <a:fillRef idx="0">
-            <a:schemeClr val="dk1"/>
-          </a:fillRef>
-          <a:effectRef idx="0">
-            <a:schemeClr val="dk1"/>
+            <a:schemeClr val="accent4"/>
+          </a:fillRef>
+          <a:effectRef idx="2">
+            <a:schemeClr val="accent4"/>
           </a:effectRef>
           <a:fontRef idx="minor">
             <a:schemeClr val="tx1"/>
@@ -7794,9 +7967,9 @@
           <p:nvPr/>
         </p:nvSpPr>
         <p:spPr>
-          <a:xfrm>
-            <a:off x="1694979" y="4963416"/>
-            <a:ext cx="831638" cy="461665"/>
+          <a:xfrm rot="723927">
+            <a:off x="1130573" y="4926511"/>
+            <a:ext cx="1266985" cy="276999"/>
           </a:xfrm>
           <a:prstGeom prst="rect">
             <a:avLst/>
@@ -7811,62 +7984,9 @@
           <a:p>
             <a:r>
               <a:rPr lang="en-US" sz="1200" dirty="0" smtClean="0"/>
-              <a:t>dedicated bearer</a:t>
+              <a:t>Dedicated Bearer</a:t>
             </a:r>
             <a:endParaRPr lang="fr-FR" sz="1200" dirty="0"/>
-          </a:p>
-        </p:txBody>
-      </p:sp>
-      <p:sp>
-        <p:nvSpPr>
-          <p:cNvPr id="19" name="Rectangle à coins arrondis 18"/>
-          <p:cNvSpPr/>
-          <p:nvPr/>
-        </p:nvSpPr>
-        <p:spPr>
-          <a:xfrm>
-            <a:off x="4197634" y="5080576"/>
-            <a:ext cx="1022437" cy="464615"/>
-          </a:xfrm>
-          <a:prstGeom prst="roundRect">
-            <a:avLst/>
-          </a:prstGeom>
-          <a:ln w="9525">
-            <a:prstDash val="solid"/>
-          </a:ln>
-        </p:spPr>
-        <p:style>
-          <a:lnRef idx="2">
-            <a:schemeClr val="dk1"/>
-          </a:lnRef>
-          <a:fillRef idx="1">
-            <a:schemeClr val="lt1"/>
-          </a:fillRef>
-          <a:effectRef idx="0">
-            <a:schemeClr val="dk1"/>
-          </a:effectRef>
-          <a:fontRef idx="minor">
-            <a:schemeClr val="dk1"/>
-          </a:fontRef>
-        </p:style>
-        <p:txBody>
-          <a:bodyPr rtlCol="0" anchor="ctr"/>
-          <a:lstStyle/>
-          <a:p>
-            <a:pPr algn="ctr"/>
-            <a:r>
-              <a:rPr lang="en-US" sz="1200" dirty="0" smtClean="0">
-                <a:solidFill>
-                  <a:schemeClr val="dk1"/>
-                </a:solidFill>
-              </a:rPr>
-              <a:t>TDF</a:t>
-            </a:r>
-            <a:endParaRPr lang="fr-FR" sz="1200" dirty="0">
-              <a:solidFill>
-                <a:schemeClr val="dk1"/>
-              </a:solidFill>
-            </a:endParaRPr>
           </a:p>
         </p:txBody>
       </p:sp>
@@ -7874,29 +7994,28 @@
         <p:nvCxnSpPr>
           <p:cNvPr id="21" name="Connecteur droit 20"/>
           <p:cNvCxnSpPr>
-            <a:stCxn id="6" idx="3"/>
-            <a:endCxn id="19" idx="1"/>
+            <a:stCxn id="6" idx="1"/>
+            <a:endCxn id="19" idx="3"/>
           </p:cNvCxnSpPr>
           <p:nvPr/>
         </p:nvCxnSpPr>
         <p:spPr>
           <a:xfrm>
-            <a:off x="3995937" y="5276266"/>
-            <a:ext cx="201697" cy="36618"/>
+            <a:off x="2339752" y="5204258"/>
+            <a:ext cx="2952328" cy="1232795"/>
           </a:xfrm>
           <a:prstGeom prst="line">
             <a:avLst/>
           </a:prstGeom>
-          <a:ln w="6350"/>
-        </p:spPr>
-        <p:style>
-          <a:lnRef idx="1">
+        </p:spPr>
+        <p:style>
+          <a:lnRef idx="3">
             <a:schemeClr val="dk1"/>
           </a:lnRef>
           <a:fillRef idx="0">
             <a:schemeClr val="dk1"/>
           </a:fillRef>
-          <a:effectRef idx="0">
+          <a:effectRef idx="2">
             <a:schemeClr val="dk1"/>
           </a:effectRef>
           <a:fontRef idx="minor">
@@ -7909,370 +8028,109 @@
           <p:cNvPr id="31" name="Connecteur droit avec flèche 30"/>
           <p:cNvCxnSpPr>
             <a:stCxn id="19" idx="0"/>
-            <a:endCxn id="8" idx="3"/>
+            <a:endCxn id="8" idx="0"/>
           </p:cNvCxnSpPr>
           <p:nvPr/>
         </p:nvCxnSpPr>
         <p:spPr>
           <a:xfrm flipH="1" flipV="1">
-            <a:off x="3815916" y="4340588"/>
-            <a:ext cx="892937" cy="739988"/>
-          </a:xfrm>
-          <a:prstGeom prst="straightConnector1">
-            <a:avLst/>
-          </a:prstGeom>
-          <a:ln>
-            <a:tailEnd type="arrow"/>
-          </a:ln>
-        </p:spPr>
-        <p:style>
-          <a:lnRef idx="1">
-            <a:schemeClr val="dk1"/>
-          </a:lnRef>
-          <a:fillRef idx="0">
-            <a:schemeClr val="dk1"/>
-          </a:fillRef>
-          <a:effectRef idx="0">
-            <a:schemeClr val="dk1"/>
-          </a:effectRef>
-          <a:fontRef idx="minor">
-            <a:schemeClr val="tx1"/>
-          </a:fontRef>
-        </p:style>
-      </p:cxnSp>
-      <p:sp>
-        <p:nvSpPr>
-          <p:cNvPr id="18" name="Rectangle à coins arrondis 17"/>
-          <p:cNvSpPr/>
-          <p:nvPr/>
-        </p:nvSpPr>
-        <p:spPr>
-          <a:xfrm>
-            <a:off x="5916149" y="5021507"/>
-            <a:ext cx="816091" cy="526179"/>
-          </a:xfrm>
-          <a:prstGeom prst="roundRect">
-            <a:avLst/>
-          </a:prstGeom>
-          <a:ln w="9525"/>
-        </p:spPr>
-        <p:style>
-          <a:lnRef idx="2">
-            <a:schemeClr val="dk1"/>
-          </a:lnRef>
-          <a:fillRef idx="1">
-            <a:schemeClr val="lt1"/>
-          </a:fillRef>
-          <a:effectRef idx="0">
-            <a:schemeClr val="dk1"/>
-          </a:effectRef>
-          <a:fontRef idx="minor">
-            <a:schemeClr val="dk1"/>
-          </a:fontRef>
-        </p:style>
-        <p:txBody>
-          <a:bodyPr rtlCol="0" anchor="ctr"/>
-          <a:lstStyle/>
-          <a:p>
-            <a:pPr algn="ctr"/>
-            <a:r>
-              <a:rPr lang="en-US" sz="1200" dirty="0" smtClean="0">
-                <a:solidFill>
-                  <a:schemeClr val="dk1"/>
-                </a:solidFill>
-              </a:rPr>
-              <a:t>TURN</a:t>
-            </a:r>
-            <a:endParaRPr lang="fr-FR" sz="1200" dirty="0">
-              <a:solidFill>
-                <a:schemeClr val="dk1"/>
-              </a:solidFill>
-            </a:endParaRPr>
-          </a:p>
-        </p:txBody>
-      </p:sp>
-      <p:cxnSp>
-        <p:nvCxnSpPr>
-          <p:cNvPr id="20" name="Connecteur droit avec flèche 37"/>
-          <p:cNvCxnSpPr>
-            <a:stCxn id="5" idx="0"/>
-            <a:endCxn id="12" idx="1"/>
-          </p:cNvCxnSpPr>
-          <p:nvPr/>
-        </p:nvCxnSpPr>
-        <p:spPr>
-          <a:xfrm flipV="1">
-            <a:off x="693245" y="3017907"/>
-            <a:ext cx="4444332" cy="1743873"/>
+            <a:off x="3407871" y="4077498"/>
+            <a:ext cx="1372991" cy="2055239"/>
           </a:xfrm>
           <a:prstGeom prst="straightConnector1">
             <a:avLst/>
           </a:prstGeom>
           <a:ln>
             <a:prstDash val="sysDot"/>
-            <a:tailEnd type="arrow"/>
+            <a:headEnd type="none" w="med" len="med"/>
+            <a:tailEnd type="none" w="med" len="med"/>
           </a:ln>
         </p:spPr>
         <p:style>
-          <a:lnRef idx="1">
-            <a:schemeClr val="dk1"/>
+          <a:lnRef idx="3">
+            <a:schemeClr val="accent4"/>
           </a:lnRef>
           <a:fillRef idx="0">
-            <a:schemeClr val="dk1"/>
-          </a:fillRef>
-          <a:effectRef idx="0">
-            <a:schemeClr val="dk1"/>
+            <a:schemeClr val="accent4"/>
+          </a:fillRef>
+          <a:effectRef idx="2">
+            <a:schemeClr val="accent4"/>
           </a:effectRef>
           <a:fontRef idx="minor">
             <a:schemeClr val="tx1"/>
           </a:fontRef>
         </p:style>
       </p:cxnSp>
-      <p:sp>
-        <p:nvSpPr>
-          <p:cNvPr id="42" name="Rectangle à coins arrondis 17"/>
-          <p:cNvSpPr/>
-          <p:nvPr/>
-        </p:nvSpPr>
-        <p:spPr>
-          <a:xfrm>
-            <a:off x="7194259" y="5612878"/>
-            <a:ext cx="816091" cy="526179"/>
-          </a:xfrm>
-          <a:prstGeom prst="roundRect">
-            <a:avLst/>
-          </a:prstGeom>
-          <a:ln w="9525"/>
-        </p:spPr>
-        <p:style>
-          <a:lnRef idx="2">
-            <a:schemeClr val="dk1"/>
-          </a:lnRef>
-          <a:fillRef idx="1">
-            <a:schemeClr val="lt1"/>
-          </a:fillRef>
-          <a:effectRef idx="0">
-            <a:schemeClr val="dk1"/>
-          </a:effectRef>
-          <a:fontRef idx="minor">
-            <a:schemeClr val="dk1"/>
-          </a:fontRef>
-        </p:style>
-        <p:txBody>
-          <a:bodyPr rtlCol="0" anchor="ctr"/>
-          <a:lstStyle/>
-          <a:p>
-            <a:pPr algn="ctr"/>
-            <a:r>
-              <a:rPr lang="en-US" sz="1200" dirty="0" smtClean="0">
-                <a:solidFill>
-                  <a:schemeClr val="dk1"/>
-                </a:solidFill>
-              </a:rPr>
-              <a:t>TURN</a:t>
-            </a:r>
-            <a:endParaRPr lang="fr-FR" sz="1200" dirty="0">
-              <a:solidFill>
-                <a:schemeClr val="dk1"/>
-              </a:solidFill>
-            </a:endParaRPr>
-          </a:p>
-        </p:txBody>
-      </p:sp>
-      <p:sp>
-        <p:nvSpPr>
-          <p:cNvPr id="44" name="Rectangle à coins arrondis 7"/>
-          <p:cNvSpPr/>
-          <p:nvPr/>
-        </p:nvSpPr>
-        <p:spPr>
-          <a:xfrm>
-            <a:off x="4006775" y="3682862"/>
-            <a:ext cx="1213296" cy="526179"/>
-          </a:xfrm>
-          <a:prstGeom prst="roundRect">
-            <a:avLst/>
-          </a:prstGeom>
-          <a:ln w="9525"/>
-        </p:spPr>
-        <p:style>
-          <a:lnRef idx="2">
-            <a:schemeClr val="dk1"/>
-          </a:lnRef>
-          <a:fillRef idx="1">
-            <a:schemeClr val="lt1"/>
-          </a:fillRef>
-          <a:effectRef idx="0">
-            <a:schemeClr val="dk1"/>
-          </a:effectRef>
-          <a:fontRef idx="minor">
-            <a:schemeClr val="dk1"/>
-          </a:fontRef>
-        </p:style>
-        <p:txBody>
-          <a:bodyPr rtlCol="0" anchor="ctr"/>
-          <a:lstStyle/>
-          <a:p>
-            <a:pPr algn="ctr"/>
-            <a:r>
-              <a:rPr lang="en-US" sz="1200" dirty="0" smtClean="0">
-                <a:solidFill>
-                  <a:schemeClr val="dk1"/>
-                </a:solidFill>
-              </a:rPr>
-              <a:t>AF</a:t>
-            </a:r>
-            <a:br>
-              <a:rPr lang="en-US" sz="1200" dirty="0" smtClean="0">
-                <a:solidFill>
-                  <a:schemeClr val="dk1"/>
-                </a:solidFill>
-              </a:rPr>
-            </a:br>
-            <a:r>
-              <a:rPr lang="en-US" sz="1200" dirty="0" smtClean="0">
-                <a:solidFill>
-                  <a:schemeClr val="dk1"/>
-                </a:solidFill>
-              </a:rPr>
-              <a:t>(Connector)</a:t>
-            </a:r>
-            <a:endParaRPr lang="fr-FR" sz="1200" dirty="0">
-              <a:solidFill>
-                <a:schemeClr val="dk1"/>
-              </a:solidFill>
-            </a:endParaRPr>
-          </a:p>
-        </p:txBody>
-      </p:sp>
       <p:cxnSp>
         <p:nvCxnSpPr>
           <p:cNvPr id="51" name="Connecteur droit avec flèche 13"/>
           <p:cNvCxnSpPr>
-            <a:stCxn id="12" idx="2"/>
+            <a:stCxn id="12" idx="0"/>
             <a:endCxn id="44" idx="3"/>
           </p:cNvCxnSpPr>
           <p:nvPr/>
         </p:nvCxnSpPr>
         <p:spPr>
           <a:xfrm flipH="1">
-            <a:off x="5220071" y="3317712"/>
-            <a:ext cx="1409835" cy="628240"/>
+            <a:off x="4959464" y="2708920"/>
+            <a:ext cx="2080648" cy="1068826"/>
           </a:xfrm>
           <a:prstGeom prst="straightConnector1">
             <a:avLst/>
           </a:prstGeom>
           <a:ln>
-            <a:tailEnd type="arrow"/>
+            <a:prstDash val="sysDot"/>
+            <a:headEnd type="none" w="med" len="med"/>
+            <a:tailEnd type="none" w="med" len="med"/>
           </a:ln>
         </p:spPr>
         <p:style>
-          <a:lnRef idx="1">
-            <a:schemeClr val="dk1"/>
+          <a:lnRef idx="3">
+            <a:schemeClr val="accent4"/>
           </a:lnRef>
           <a:fillRef idx="0">
-            <a:schemeClr val="dk1"/>
-          </a:fillRef>
-          <a:effectRef idx="0">
-            <a:schemeClr val="dk1"/>
+            <a:schemeClr val="accent4"/>
+          </a:fillRef>
+          <a:effectRef idx="2">
+            <a:schemeClr val="accent4"/>
           </a:effectRef>
           <a:fontRef idx="minor">
             <a:schemeClr val="tx1"/>
           </a:fontRef>
         </p:style>
       </p:cxnSp>
-      <p:sp>
-        <p:nvSpPr>
-          <p:cNvPr id="54" name="Rectangle à coins arrondis 17"/>
-          <p:cNvSpPr/>
-          <p:nvPr/>
-        </p:nvSpPr>
-        <p:spPr>
-          <a:xfrm>
-            <a:off x="6544781" y="3682863"/>
-            <a:ext cx="1814856" cy="526179"/>
-          </a:xfrm>
-          <a:prstGeom prst="roundRect">
-            <a:avLst/>
-          </a:prstGeom>
-          <a:ln w="9525"/>
-        </p:spPr>
-        <p:style>
-          <a:lnRef idx="2">
-            <a:schemeClr val="dk1"/>
-          </a:lnRef>
-          <a:fillRef idx="1">
-            <a:schemeClr val="lt1"/>
-          </a:fillRef>
-          <a:effectRef idx="0">
-            <a:schemeClr val="dk1"/>
-          </a:effectRef>
-          <a:fontRef idx="minor">
-            <a:schemeClr val="dk1"/>
-          </a:fontRef>
-        </p:style>
-        <p:txBody>
-          <a:bodyPr rtlCol="0" anchor="ctr"/>
-          <a:lstStyle/>
-          <a:p>
-            <a:pPr algn="ctr"/>
-            <a:r>
-              <a:rPr lang="en-US" sz="1200" dirty="0" smtClean="0">
-                <a:solidFill>
-                  <a:schemeClr val="dk1"/>
-                </a:solidFill>
-              </a:rPr>
-              <a:t>Backend QoS</a:t>
-            </a:r>
-          </a:p>
-          <a:p>
-            <a:pPr algn="ctr"/>
-            <a:r>
-              <a:rPr lang="de-DE" sz="1200" dirty="0" err="1" smtClean="0"/>
-              <a:t>Function</a:t>
-            </a:r>
-            <a:r>
-              <a:rPr lang="de-DE" sz="1200" dirty="0" smtClean="0"/>
-              <a:t> (Connector)</a:t>
-            </a:r>
-            <a:endParaRPr lang="fr-FR" sz="1200" dirty="0">
-              <a:solidFill>
-                <a:schemeClr val="dk1"/>
-              </a:solidFill>
-            </a:endParaRPr>
-          </a:p>
-        </p:txBody>
-      </p:sp>
       <p:cxnSp>
         <p:nvCxnSpPr>
           <p:cNvPr id="55" name="Connecteur droit avec flèche 13"/>
           <p:cNvCxnSpPr>
-            <a:stCxn id="12" idx="2"/>
+            <a:stCxn id="12" idx="0"/>
             <a:endCxn id="54" idx="0"/>
           </p:cNvCxnSpPr>
           <p:nvPr/>
         </p:nvCxnSpPr>
         <p:spPr>
           <a:xfrm>
-            <a:off x="6629906" y="3317712"/>
-            <a:ext cx="822303" cy="365151"/>
+            <a:off x="7040112" y="2708920"/>
+            <a:ext cx="412097" cy="973943"/>
           </a:xfrm>
           <a:prstGeom prst="straightConnector1">
             <a:avLst/>
           </a:prstGeom>
           <a:ln>
-            <a:tailEnd type="arrow"/>
+            <a:prstDash val="sysDot"/>
+            <a:headEnd type="none" w="med" len="med"/>
+            <a:tailEnd type="none" w="med" len="med"/>
           </a:ln>
         </p:spPr>
         <p:style>
-          <a:lnRef idx="1">
-            <a:schemeClr val="dk1"/>
+          <a:lnRef idx="3">
+            <a:schemeClr val="accent4"/>
           </a:lnRef>
           <a:fillRef idx="0">
-            <a:schemeClr val="dk1"/>
-          </a:fillRef>
-          <a:effectRef idx="0">
-            <a:schemeClr val="dk1"/>
+            <a:schemeClr val="accent4"/>
+          </a:fillRef>
+          <a:effectRef idx="2">
+            <a:schemeClr val="accent4"/>
           </a:effectRef>
           <a:fontRef idx="minor">
             <a:schemeClr val="tx1"/>
@@ -8290,25 +8148,27 @@
         </p:nvCxnSpPr>
         <p:spPr>
           <a:xfrm flipH="1">
-            <a:off x="6732240" y="4209042"/>
-            <a:ext cx="719969" cy="1075555"/>
+            <a:off x="6612227" y="4209042"/>
+            <a:ext cx="839982" cy="923208"/>
           </a:xfrm>
           <a:prstGeom prst="straightConnector1">
             <a:avLst/>
           </a:prstGeom>
           <a:ln>
-            <a:tailEnd type="arrow"/>
+            <a:prstDash val="sysDot"/>
+            <a:headEnd type="none" w="med" len="med"/>
+            <a:tailEnd type="none" w="med" len="med"/>
           </a:ln>
         </p:spPr>
         <p:style>
-          <a:lnRef idx="1">
-            <a:schemeClr val="dk1"/>
+          <a:lnRef idx="3">
+            <a:schemeClr val="accent4"/>
           </a:lnRef>
           <a:fillRef idx="0">
-            <a:schemeClr val="dk1"/>
-          </a:fillRef>
-          <a:effectRef idx="0">
-            <a:schemeClr val="dk1"/>
+            <a:schemeClr val="accent4"/>
+          </a:fillRef>
+          <a:effectRef idx="2">
+            <a:schemeClr val="accent4"/>
           </a:effectRef>
           <a:fontRef idx="minor">
             <a:schemeClr val="tx1"/>
@@ -8327,24 +8187,26 @@
         <p:spPr>
           <a:xfrm>
             <a:off x="7452209" y="4209042"/>
-            <a:ext cx="150096" cy="1403836"/>
+            <a:ext cx="150096" cy="948150"/>
           </a:xfrm>
           <a:prstGeom prst="straightConnector1">
             <a:avLst/>
           </a:prstGeom>
           <a:ln>
-            <a:tailEnd type="arrow"/>
+            <a:prstDash val="sysDot"/>
+            <a:headEnd type="none" w="med" len="med"/>
+            <a:tailEnd type="none" w="med" len="med"/>
           </a:ln>
         </p:spPr>
         <p:style>
-          <a:lnRef idx="1">
-            <a:schemeClr val="dk1"/>
+          <a:lnRef idx="3">
+            <a:schemeClr val="accent4"/>
           </a:lnRef>
           <a:fillRef idx="0">
-            <a:schemeClr val="dk1"/>
-          </a:fillRef>
-          <a:effectRef idx="0">
-            <a:schemeClr val="dk1"/>
+            <a:schemeClr val="accent4"/>
+          </a:fillRef>
+          <a:effectRef idx="2">
+            <a:schemeClr val="accent4"/>
           </a:effectRef>
           <a:fontRef idx="minor">
             <a:schemeClr val="tx1"/>
@@ -8358,9 +8220,9 @@
           <p:nvPr/>
         </p:nvSpPr>
         <p:spPr>
-          <a:xfrm rot="20343114">
-            <a:off x="2518700" y="3571868"/>
-            <a:ext cx="962251" cy="276999"/>
+          <a:xfrm rot="20708751">
+            <a:off x="1918868" y="3297013"/>
+            <a:ext cx="2594493" cy="276999"/>
           </a:xfrm>
           <a:prstGeom prst="rect">
             <a:avLst/>
@@ -8375,131 +8237,13 @@
           <a:p>
             <a:r>
               <a:rPr lang="en-US" sz="1200" dirty="0" err="1" smtClean="0"/>
-              <a:t>getStats</a:t>
+              <a:t>PeerConnection.getStats</a:t>
             </a:r>
             <a:r>
               <a:rPr lang="en-US" sz="1200" dirty="0" smtClean="0"/>
-              <a:t> info</a:t>
+              <a:t>() Information</a:t>
             </a:r>
             <a:endParaRPr lang="fr-FR" sz="1200" dirty="0"/>
-          </a:p>
-        </p:txBody>
-      </p:sp>
-      <p:sp>
-        <p:nvSpPr>
-          <p:cNvPr id="74" name="Freeform 73"/>
-          <p:cNvSpPr/>
-          <p:nvPr/>
-        </p:nvSpPr>
-        <p:spPr>
-          <a:xfrm>
-            <a:off x="755576" y="5373216"/>
-            <a:ext cx="8039595" cy="933899"/>
-          </a:xfrm>
-          <a:custGeom>
-            <a:avLst/>
-            <a:gdLst>
-              <a:gd name="connsiteX0" fmla="*/ 0 w 8039595"/>
-              <a:gd name="connsiteY0" fmla="*/ 292631 h 933899"/>
-              <a:gd name="connsiteX1" fmla="*/ 2541320 w 8039595"/>
-              <a:gd name="connsiteY1" fmla="*/ 55125 h 933899"/>
-              <a:gd name="connsiteX2" fmla="*/ 4001985 w 8039595"/>
-              <a:gd name="connsiteY2" fmla="*/ 55125 h 933899"/>
-              <a:gd name="connsiteX3" fmla="*/ 5248894 w 8039595"/>
-              <a:gd name="connsiteY3" fmla="*/ 43249 h 933899"/>
-              <a:gd name="connsiteX4" fmla="*/ 6816437 w 8039595"/>
-              <a:gd name="connsiteY4" fmla="*/ 672642 h 933899"/>
-              <a:gd name="connsiteX5" fmla="*/ 8039595 w 8039595"/>
-              <a:gd name="connsiteY5" fmla="*/ 933899 h 933899"/>
-              <a:gd name="connsiteX6" fmla="*/ 8039595 w 8039595"/>
-              <a:gd name="connsiteY6" fmla="*/ 933899 h 933899"/>
-            </a:gdLst>
-            <a:ahLst/>
-            <a:cxnLst>
-              <a:cxn ang="0">
-                <a:pos x="connsiteX0" y="connsiteY0"/>
-              </a:cxn>
-              <a:cxn ang="0">
-                <a:pos x="connsiteX1" y="connsiteY1"/>
-              </a:cxn>
-              <a:cxn ang="0">
-                <a:pos x="connsiteX2" y="connsiteY2"/>
-              </a:cxn>
-              <a:cxn ang="0">
-                <a:pos x="connsiteX3" y="connsiteY3"/>
-              </a:cxn>
-              <a:cxn ang="0">
-                <a:pos x="connsiteX4" y="connsiteY4"/>
-              </a:cxn>
-              <a:cxn ang="0">
-                <a:pos x="connsiteX5" y="connsiteY5"/>
-              </a:cxn>
-              <a:cxn ang="0">
-                <a:pos x="connsiteX6" y="connsiteY6"/>
-              </a:cxn>
-            </a:cxnLst>
-            <a:rect l="l" t="t" r="r" b="b"/>
-            <a:pathLst>
-              <a:path w="8039595" h="933899">
-                <a:moveTo>
-                  <a:pt x="0" y="292631"/>
-                </a:moveTo>
-                <a:cubicBezTo>
-                  <a:pt x="937161" y="193670"/>
-                  <a:pt x="1874323" y="94709"/>
-                  <a:pt x="2541320" y="55125"/>
-                </a:cubicBezTo>
-                <a:cubicBezTo>
-                  <a:pt x="3208317" y="15541"/>
-                  <a:pt x="4001985" y="55125"/>
-                  <a:pt x="4001985" y="55125"/>
-                </a:cubicBezTo>
-                <a:cubicBezTo>
-                  <a:pt x="4453247" y="53146"/>
-                  <a:pt x="4779819" y="-59671"/>
-                  <a:pt x="5248894" y="43249"/>
-                </a:cubicBezTo>
-                <a:cubicBezTo>
-                  <a:pt x="5717969" y="146168"/>
-                  <a:pt x="6351320" y="524200"/>
-                  <a:pt x="6816437" y="672642"/>
-                </a:cubicBezTo>
-                <a:cubicBezTo>
-                  <a:pt x="7281554" y="821084"/>
-                  <a:pt x="8039595" y="933899"/>
-                  <a:pt x="8039595" y="933899"/>
-                </a:cubicBezTo>
-                <a:lnTo>
-                  <a:pt x="8039595" y="933899"/>
-                </a:lnTo>
-              </a:path>
-            </a:pathLst>
-          </a:custGeom>
-          <a:noFill/>
-          <a:ln w="28575"/>
-        </p:spPr>
-        <p:style>
-          <a:lnRef idx="2">
-            <a:schemeClr val="accent1">
-              <a:shade val="50000"/>
-            </a:schemeClr>
-          </a:lnRef>
-          <a:fillRef idx="1">
-            <a:schemeClr val="accent1"/>
-          </a:fillRef>
-          <a:effectRef idx="0">
-            <a:schemeClr val="accent1"/>
-          </a:effectRef>
-          <a:fontRef idx="minor">
-            <a:schemeClr val="lt1"/>
-          </a:fontRef>
-        </p:style>
-        <p:txBody>
-          <a:bodyPr rtlCol="0" anchor="ctr"/>
-          <a:lstStyle/>
-          <a:p>
-            <a:pPr algn="ctr"/>
-            <a:endParaRPr lang="en-US" sz="1200"/>
           </a:p>
         </p:txBody>
       </p:sp>
@@ -8511,8 +8255,8 @@
         </p:nvSpPr>
         <p:spPr>
           <a:xfrm>
-            <a:off x="1122969" y="5612878"/>
-            <a:ext cx="1403648" cy="276999"/>
+            <a:off x="1008867" y="2028705"/>
+            <a:ext cx="1403648" cy="461665"/>
           </a:xfrm>
           <a:prstGeom prst="rect">
             <a:avLst/>
@@ -8533,9 +8277,31 @@
                   </a:schemeClr>
                 </a:solidFill>
               </a:rPr>
-              <a:t>Data  Plane Traffic</a:t>
-            </a:r>
-            <a:endParaRPr lang="en-US" sz="1200" dirty="0">
+              <a:t>Data  Plane </a:t>
+            </a:r>
+            <a:r>
+              <a:rPr lang="de-DE" sz="1200" dirty="0" smtClean="0">
+                <a:solidFill>
+                  <a:schemeClr val="tx2">
+                    <a:lumMod val="50000"/>
+                  </a:schemeClr>
+                </a:solidFill>
+              </a:rPr>
+              <a:t>Traffic</a:t>
+            </a:r>
+          </a:p>
+          <a:p>
+            <a:r>
+              <a:rPr lang="de-DE" sz="1200" dirty="0" smtClean="0">
+                <a:solidFill>
+                  <a:schemeClr val="tx2">
+                    <a:lumMod val="50000"/>
+                  </a:schemeClr>
+                </a:solidFill>
+              </a:rPr>
+              <a:t>Signalling Plane</a:t>
+            </a:r>
+            <a:endParaRPr lang="de-DE" sz="1200" dirty="0">
               <a:solidFill>
                 <a:schemeClr val="tx2">
                   <a:lumMod val="50000"/>
@@ -8692,46 +8458,199 @@
           <p:cNvPr id="32" name="Connecteur droit avec flèche 30"/>
           <p:cNvCxnSpPr>
             <a:stCxn id="19" idx="0"/>
+            <a:endCxn id="12" idx="0"/>
           </p:cNvCxnSpPr>
           <p:nvPr/>
         </p:nvCxnSpPr>
         <p:spPr>
           <a:xfrm flipV="1">
-            <a:off x="4708853" y="3317712"/>
-            <a:ext cx="1343226" cy="1762864"/>
+            <a:off x="4780862" y="2708920"/>
+            <a:ext cx="2259250" cy="3423817"/>
           </a:xfrm>
           <a:prstGeom prst="straightConnector1">
             <a:avLst/>
           </a:prstGeom>
           <a:ln>
-            <a:tailEnd type="arrow"/>
+            <a:prstDash val="sysDot"/>
+            <a:headEnd type="none" w="med" len="med"/>
+            <a:tailEnd type="none" w="med" len="med"/>
           </a:ln>
         </p:spPr>
         <p:style>
-          <a:lnRef idx="1">
-            <a:schemeClr val="dk1"/>
+          <a:lnRef idx="3">
+            <a:schemeClr val="accent4"/>
           </a:lnRef>
           <a:fillRef idx="0">
-            <a:schemeClr val="dk1"/>
-          </a:fillRef>
-          <a:effectRef idx="0">
-            <a:schemeClr val="dk1"/>
+            <a:schemeClr val="accent4"/>
+          </a:fillRef>
+          <a:effectRef idx="2">
+            <a:schemeClr val="accent4"/>
           </a:effectRef>
           <a:fontRef idx="minor">
             <a:schemeClr val="tx1"/>
           </a:fontRef>
         </p:style>
       </p:cxnSp>
-      <p:sp>
-        <p:nvSpPr>
-          <p:cNvPr id="36" name="Rectangle à coins arrondis 5"/>
+      <p:cxnSp>
+        <p:nvCxnSpPr>
+          <p:cNvPr id="37" name="Connecteur droit 20"/>
+          <p:cNvCxnSpPr>
+            <a:stCxn id="36" idx="1"/>
+            <a:endCxn id="19" idx="3"/>
+          </p:cNvCxnSpPr>
+          <p:nvPr/>
+        </p:nvCxnSpPr>
+        <p:spPr>
+          <a:xfrm flipV="1">
+            <a:off x="2267744" y="6437053"/>
+            <a:ext cx="3024336" cy="100008"/>
+          </a:xfrm>
+          <a:prstGeom prst="line">
+            <a:avLst/>
+          </a:prstGeom>
+          <a:ln>
+            <a:headEnd type="none" w="med" len="med"/>
+            <a:tailEnd type="none" w="med" len="med"/>
+          </a:ln>
+        </p:spPr>
+        <p:style>
+          <a:lnRef idx="3">
+            <a:schemeClr val="dk1"/>
+          </a:lnRef>
+          <a:fillRef idx="0">
+            <a:schemeClr val="dk1"/>
+          </a:fillRef>
+          <a:effectRef idx="2">
+            <a:schemeClr val="dk1"/>
+          </a:effectRef>
+          <a:fontRef idx="minor">
+            <a:schemeClr val="tx1"/>
+          </a:fontRef>
+        </p:style>
+      </p:cxnSp>
+      <p:cxnSp>
+        <p:nvCxnSpPr>
+          <p:cNvPr id="43" name="Connecteur droit 20"/>
+          <p:cNvCxnSpPr>
+            <a:stCxn id="36" idx="1"/>
+            <a:endCxn id="53" idx="2"/>
+          </p:cNvCxnSpPr>
+          <p:nvPr/>
+        </p:nvCxnSpPr>
+        <p:spPr>
+          <a:xfrm flipH="1" flipV="1">
+            <a:off x="473176" y="6334027"/>
+            <a:ext cx="1794568" cy="203034"/>
+          </a:xfrm>
+          <a:prstGeom prst="line">
+            <a:avLst/>
+          </a:prstGeom>
+          <a:ln>
+            <a:headEnd type="none" w="med" len="med"/>
+            <a:tailEnd type="none" w="med" len="med"/>
+          </a:ln>
+        </p:spPr>
+        <p:style>
+          <a:lnRef idx="3">
+            <a:schemeClr val="dk1"/>
+          </a:lnRef>
+          <a:fillRef idx="0">
+            <a:schemeClr val="dk1"/>
+          </a:fillRef>
+          <a:effectRef idx="2">
+            <a:schemeClr val="dk1"/>
+          </a:effectRef>
+          <a:fontRef idx="minor">
+            <a:schemeClr val="tx1"/>
+          </a:fontRef>
+        </p:style>
+      </p:cxnSp>
+      <p:cxnSp>
+        <p:nvCxnSpPr>
+          <p:cNvPr id="48" name="Connecteur droit avec flèche 13"/>
+          <p:cNvCxnSpPr>
+            <a:stCxn id="12" idx="0"/>
+            <a:endCxn id="47" idx="0"/>
+          </p:cNvCxnSpPr>
+          <p:nvPr/>
+        </p:nvCxnSpPr>
+        <p:spPr>
+          <a:xfrm flipH="1">
+            <a:off x="5020385" y="2708920"/>
+            <a:ext cx="2019727" cy="1500122"/>
+          </a:xfrm>
+          <a:prstGeom prst="straightConnector1">
+            <a:avLst/>
+          </a:prstGeom>
+          <a:ln>
+            <a:prstDash val="sysDot"/>
+            <a:headEnd type="none" w="med" len="med"/>
+            <a:tailEnd type="none" w="med" len="med"/>
+          </a:ln>
+        </p:spPr>
+        <p:style>
+          <a:lnRef idx="3">
+            <a:schemeClr val="accent4"/>
+          </a:lnRef>
+          <a:fillRef idx="0">
+            <a:schemeClr val="accent4"/>
+          </a:fillRef>
+          <a:effectRef idx="2">
+            <a:schemeClr val="accent4"/>
+          </a:effectRef>
+          <a:fontRef idx="minor">
+            <a:schemeClr val="tx1"/>
+          </a:fontRef>
+        </p:style>
+      </p:cxnSp>
+      <p:cxnSp>
+        <p:nvCxnSpPr>
+          <p:cNvPr id="52" name="Connecteur droit avec flèche 13"/>
+          <p:cNvCxnSpPr>
+            <a:stCxn id="47" idx="0"/>
+            <a:endCxn id="36" idx="2"/>
+          </p:cNvCxnSpPr>
+          <p:nvPr/>
+        </p:nvCxnSpPr>
+        <p:spPr>
+          <a:xfrm flipH="1">
+            <a:off x="2957772" y="4209042"/>
+            <a:ext cx="2062613" cy="2591108"/>
+          </a:xfrm>
+          <a:prstGeom prst="straightConnector1">
+            <a:avLst/>
+          </a:prstGeom>
+          <a:ln>
+            <a:prstDash val="sysDot"/>
+            <a:headEnd type="none" w="med" len="med"/>
+            <a:tailEnd type="none" w="med" len="med"/>
+          </a:ln>
+        </p:spPr>
+        <p:style>
+          <a:lnRef idx="3">
+            <a:schemeClr val="accent4"/>
+          </a:lnRef>
+          <a:fillRef idx="0">
+            <a:schemeClr val="accent4"/>
+          </a:fillRef>
+          <a:effectRef idx="2">
+            <a:schemeClr val="accent4"/>
+          </a:effectRef>
+          <a:fontRef idx="minor">
+            <a:schemeClr val="tx1"/>
+          </a:fontRef>
+        </p:style>
+      </p:cxnSp>
+      <p:sp>
+        <p:nvSpPr>
+          <p:cNvPr id="50" name="Rectangle à coins arrondis 3"/>
           <p:cNvSpPr/>
           <p:nvPr/>
         </p:nvSpPr>
         <p:spPr>
           <a:xfrm>
-            <a:off x="2267744" y="6044025"/>
-            <a:ext cx="1380056" cy="526179"/>
+            <a:off x="159671" y="5572319"/>
+            <a:ext cx="615743" cy="1133475"/>
           </a:xfrm>
           <a:prstGeom prst="roundRect">
             <a:avLst/>
@@ -8747,6 +8666,453 @@
           </a:fillRef>
           <a:effectRef idx="0">
             <a:schemeClr val="dk1"/>
+          </a:effectRef>
+          <a:fontRef idx="minor">
+            <a:schemeClr val="dk1"/>
+          </a:fontRef>
+        </p:style>
+        <p:txBody>
+          <a:bodyPr rtlCol="0" anchor="ctr"/>
+          <a:lstStyle/>
+          <a:p>
+            <a:pPr algn="ctr"/>
+            <a:endParaRPr lang="en-US" sz="1200" dirty="0" smtClean="0"/>
+          </a:p>
+          <a:p>
+            <a:pPr algn="ctr"/>
+            <a:endParaRPr lang="en-US" sz="1200" dirty="0"/>
+          </a:p>
+          <a:p>
+            <a:pPr algn="ctr"/>
+            <a:endParaRPr lang="en-US" sz="1200" dirty="0" smtClean="0"/>
+          </a:p>
+          <a:p>
+            <a:pPr algn="ctr"/>
+            <a:endParaRPr lang="en-US" sz="1200" dirty="0"/>
+          </a:p>
+          <a:p>
+            <a:pPr algn="ctr"/>
+            <a:endParaRPr lang="en-US" sz="1200" dirty="0" smtClean="0"/>
+          </a:p>
+          <a:p>
+            <a:pPr algn="ctr"/>
+            <a:r>
+              <a:rPr lang="en-US" sz="1200" dirty="0" smtClean="0"/>
+              <a:t>UE</a:t>
+            </a:r>
+            <a:endParaRPr lang="fr-FR" sz="1200" dirty="0"/>
+          </a:p>
+        </p:txBody>
+      </p:sp>
+      <p:sp>
+        <p:nvSpPr>
+          <p:cNvPr id="53" name="Rectangle à coins arrondis 4"/>
+          <p:cNvSpPr/>
+          <p:nvPr/>
+        </p:nvSpPr>
+        <p:spPr>
+          <a:xfrm>
+            <a:off x="193580" y="5600621"/>
+            <a:ext cx="559191" cy="733406"/>
+          </a:xfrm>
+          <a:prstGeom prst="roundRect">
+            <a:avLst/>
+          </a:prstGeom>
+          <a:ln/>
+        </p:spPr>
+        <p:style>
+          <a:lnRef idx="1">
+            <a:schemeClr val="accent3"/>
+          </a:lnRef>
+          <a:fillRef idx="2">
+            <a:schemeClr val="accent3"/>
+          </a:fillRef>
+          <a:effectRef idx="1">
+            <a:schemeClr val="accent3"/>
+          </a:effectRef>
+          <a:fontRef idx="minor">
+            <a:schemeClr val="dk1"/>
+          </a:fontRef>
+        </p:style>
+        <p:txBody>
+          <a:bodyPr rtlCol="0" anchor="ctr"/>
+          <a:lstStyle/>
+          <a:p>
+            <a:pPr algn="ctr"/>
+            <a:r>
+              <a:rPr lang="en-US" sz="700" dirty="0" smtClean="0"/>
+              <a:t>App</a:t>
+            </a:r>
+          </a:p>
+          <a:p>
+            <a:pPr algn="ctr"/>
+            <a:r>
+              <a:rPr lang="en-US" sz="700" dirty="0" smtClean="0"/>
+              <a:t>Network</a:t>
+            </a:r>
+            <a:r>
+              <a:rPr lang="en-US" sz="700" dirty="0" smtClean="0"/>
+              <a:t/>
+            </a:r>
+            <a:br>
+              <a:rPr lang="en-US" sz="700" dirty="0" smtClean="0"/>
+            </a:br>
+            <a:r>
+              <a:rPr lang="en-US" sz="700" dirty="0" err="1" smtClean="0"/>
+              <a:t>Hyperty</a:t>
+            </a:r>
+            <a:endParaRPr lang="fr-FR" sz="700" dirty="0"/>
+          </a:p>
+        </p:txBody>
+      </p:sp>
+      <p:sp>
+        <p:nvSpPr>
+          <p:cNvPr id="58" name="Rectangle à coins arrondis 3"/>
+          <p:cNvSpPr/>
+          <p:nvPr/>
+        </p:nvSpPr>
+        <p:spPr>
+          <a:xfrm>
+            <a:off x="165303" y="3909268"/>
+            <a:ext cx="615743" cy="1133475"/>
+          </a:xfrm>
+          <a:prstGeom prst="roundRect">
+            <a:avLst/>
+          </a:prstGeom>
+          <a:ln w="9525"/>
+        </p:spPr>
+        <p:style>
+          <a:lnRef idx="2">
+            <a:schemeClr val="dk1"/>
+          </a:lnRef>
+          <a:fillRef idx="1">
+            <a:schemeClr val="lt1"/>
+          </a:fillRef>
+          <a:effectRef idx="0">
+            <a:schemeClr val="dk1"/>
+          </a:effectRef>
+          <a:fontRef idx="minor">
+            <a:schemeClr val="dk1"/>
+          </a:fontRef>
+        </p:style>
+        <p:txBody>
+          <a:bodyPr rtlCol="0" anchor="ctr"/>
+          <a:lstStyle/>
+          <a:p>
+            <a:pPr algn="ctr"/>
+            <a:endParaRPr lang="en-US" sz="1200" dirty="0" smtClean="0"/>
+          </a:p>
+          <a:p>
+            <a:pPr algn="ctr"/>
+            <a:endParaRPr lang="en-US" sz="1200" dirty="0"/>
+          </a:p>
+          <a:p>
+            <a:pPr algn="ctr"/>
+            <a:endParaRPr lang="en-US" sz="1200" dirty="0" smtClean="0"/>
+          </a:p>
+          <a:p>
+            <a:pPr algn="ctr"/>
+            <a:endParaRPr lang="en-US" sz="1200" dirty="0"/>
+          </a:p>
+          <a:p>
+            <a:pPr algn="ctr"/>
+            <a:endParaRPr lang="en-US" sz="1200" dirty="0" smtClean="0"/>
+          </a:p>
+          <a:p>
+            <a:pPr algn="ctr"/>
+            <a:r>
+              <a:rPr lang="en-US" sz="1200" dirty="0" smtClean="0"/>
+              <a:t>UE</a:t>
+            </a:r>
+            <a:endParaRPr lang="fr-FR" sz="1200" dirty="0"/>
+          </a:p>
+        </p:txBody>
+      </p:sp>
+      <p:sp>
+        <p:nvSpPr>
+          <p:cNvPr id="60" name="Rectangle à coins arrondis 4"/>
+          <p:cNvSpPr/>
+          <p:nvPr/>
+        </p:nvSpPr>
+        <p:spPr>
+          <a:xfrm>
+            <a:off x="199212" y="3937570"/>
+            <a:ext cx="559191" cy="733406"/>
+          </a:xfrm>
+          <a:prstGeom prst="roundRect">
+            <a:avLst/>
+          </a:prstGeom>
+          <a:ln/>
+        </p:spPr>
+        <p:style>
+          <a:lnRef idx="1">
+            <a:schemeClr val="accent3"/>
+          </a:lnRef>
+          <a:fillRef idx="2">
+            <a:schemeClr val="accent3"/>
+          </a:fillRef>
+          <a:effectRef idx="1">
+            <a:schemeClr val="accent3"/>
+          </a:effectRef>
+          <a:fontRef idx="minor">
+            <a:schemeClr val="dk1"/>
+          </a:fontRef>
+        </p:style>
+        <p:txBody>
+          <a:bodyPr rtlCol="0" anchor="ctr"/>
+          <a:lstStyle/>
+          <a:p>
+            <a:pPr algn="ctr"/>
+            <a:r>
+              <a:rPr lang="en-US" sz="700" dirty="0" smtClean="0"/>
+              <a:t>App</a:t>
+            </a:r>
+            <a:br>
+              <a:rPr lang="en-US" sz="700" dirty="0" smtClean="0"/>
+            </a:br>
+            <a:r>
+              <a:rPr lang="en-US" sz="700" dirty="0" smtClean="0"/>
+              <a:t>Network </a:t>
+            </a:r>
+            <a:r>
+              <a:rPr lang="en-US" sz="700" dirty="0" err="1" smtClean="0"/>
+              <a:t>Hyperty</a:t>
+            </a:r>
+            <a:endParaRPr lang="fr-FR" sz="700" dirty="0"/>
+          </a:p>
+        </p:txBody>
+      </p:sp>
+      <p:cxnSp>
+        <p:nvCxnSpPr>
+          <p:cNvPr id="80" name="Straight Connector 79"/>
+          <p:cNvCxnSpPr>
+            <a:stCxn id="53" idx="1"/>
+          </p:cNvCxnSpPr>
+          <p:nvPr/>
+        </p:nvCxnSpPr>
+        <p:spPr>
+          <a:xfrm rot="10800000" flipH="1">
+            <a:off x="193579" y="2852936"/>
+            <a:ext cx="5354203" cy="3114388"/>
+          </a:xfrm>
+          <a:prstGeom prst="bentConnector3">
+            <a:avLst>
+              <a:gd name="adj1" fmla="val -1281"/>
+            </a:avLst>
+          </a:prstGeom>
+          <a:ln>
+            <a:prstDash val="sysDot"/>
+            <a:headEnd type="none" w="med" len="med"/>
+            <a:tailEnd type="none" w="med" len="med"/>
+          </a:ln>
+        </p:spPr>
+        <p:style>
+          <a:lnRef idx="3">
+            <a:schemeClr val="accent4"/>
+          </a:lnRef>
+          <a:fillRef idx="0">
+            <a:schemeClr val="accent4"/>
+          </a:fillRef>
+          <a:effectRef idx="2">
+            <a:schemeClr val="accent4"/>
+          </a:effectRef>
+          <a:fontRef idx="minor">
+            <a:schemeClr val="tx1"/>
+          </a:fontRef>
+        </p:style>
+      </p:cxnSp>
+      <p:cxnSp>
+        <p:nvCxnSpPr>
+          <p:cNvPr id="20" name="Connecteur droit avec flèche 37"/>
+          <p:cNvCxnSpPr>
+            <a:stCxn id="60" idx="3"/>
+            <a:endCxn id="12" idx="1"/>
+          </p:cNvCxnSpPr>
+          <p:nvPr/>
+        </p:nvCxnSpPr>
+        <p:spPr>
+          <a:xfrm flipV="1">
+            <a:off x="758403" y="3008725"/>
+            <a:ext cx="4789380" cy="1295548"/>
+          </a:xfrm>
+          <a:prstGeom prst="straightConnector1">
+            <a:avLst/>
+          </a:prstGeom>
+          <a:ln>
+            <a:prstDash val="sysDot"/>
+            <a:headEnd type="none" w="med" len="med"/>
+            <a:tailEnd type="none" w="med" len="med"/>
+          </a:ln>
+        </p:spPr>
+        <p:style>
+          <a:lnRef idx="3">
+            <a:schemeClr val="accent4"/>
+          </a:lnRef>
+          <a:fillRef idx="0">
+            <a:schemeClr val="accent4"/>
+          </a:fillRef>
+          <a:effectRef idx="2">
+            <a:schemeClr val="accent4"/>
+          </a:effectRef>
+          <a:fontRef idx="minor">
+            <a:schemeClr val="tx1"/>
+          </a:fontRef>
+        </p:style>
+      </p:cxnSp>
+      <p:cxnSp>
+        <p:nvCxnSpPr>
+          <p:cNvPr id="89" name="Straight Connector 88"/>
+          <p:cNvCxnSpPr>
+            <a:stCxn id="18" idx="1"/>
+            <a:endCxn id="42" idx="3"/>
+          </p:cNvCxnSpPr>
+          <p:nvPr/>
+        </p:nvCxnSpPr>
+        <p:spPr>
+          <a:xfrm>
+            <a:off x="5796136" y="5132250"/>
+            <a:ext cx="2214214" cy="288032"/>
+          </a:xfrm>
+          <a:prstGeom prst="line">
+            <a:avLst/>
+          </a:prstGeom>
+        </p:spPr>
+        <p:style>
+          <a:lnRef idx="3">
+            <a:schemeClr val="dk1"/>
+          </a:lnRef>
+          <a:fillRef idx="0">
+            <a:schemeClr val="dk1"/>
+          </a:fillRef>
+          <a:effectRef idx="2">
+            <a:schemeClr val="dk1"/>
+          </a:effectRef>
+          <a:fontRef idx="minor">
+            <a:schemeClr val="tx1"/>
+          </a:fontRef>
+        </p:style>
+      </p:cxnSp>
+      <p:sp>
+        <p:nvSpPr>
+          <p:cNvPr id="6" name="Rectangle à coins arrondis 5"/>
+          <p:cNvSpPr/>
+          <p:nvPr/>
+        </p:nvSpPr>
+        <p:spPr>
+          <a:xfrm>
+            <a:off x="2339752" y="4941168"/>
+            <a:ext cx="1152128" cy="526179"/>
+          </a:xfrm>
+          <a:prstGeom prst="roundRect">
+            <a:avLst/>
+          </a:prstGeom>
+          <a:solidFill>
+            <a:schemeClr val="bg1">
+              <a:lumMod val="95000"/>
+            </a:schemeClr>
+          </a:solidFill>
+          <a:ln w="9525"/>
+        </p:spPr>
+        <p:style>
+          <a:lnRef idx="2">
+            <a:schemeClr val="dk1"/>
+          </a:lnRef>
+          <a:fillRef idx="1">
+            <a:schemeClr val="lt1"/>
+          </a:fillRef>
+          <a:effectRef idx="0">
+            <a:schemeClr val="dk1"/>
+          </a:effectRef>
+          <a:fontRef idx="minor">
+            <a:schemeClr val="dk1"/>
+          </a:fontRef>
+        </p:style>
+        <p:txBody>
+          <a:bodyPr rtlCol="0" anchor="ctr"/>
+          <a:lstStyle/>
+          <a:p>
+            <a:pPr algn="ctr"/>
+            <a:r>
+              <a:rPr lang="en-US" sz="1200" dirty="0"/>
+              <a:t>PDN Gateway</a:t>
+            </a:r>
+            <a:endParaRPr lang="fr-FR" sz="1200" dirty="0"/>
+          </a:p>
+        </p:txBody>
+      </p:sp>
+      <p:sp>
+        <p:nvSpPr>
+          <p:cNvPr id="8" name="Rectangle à coins arrondis 7"/>
+          <p:cNvSpPr/>
+          <p:nvPr/>
+        </p:nvSpPr>
+        <p:spPr>
+          <a:xfrm>
+            <a:off x="2999825" y="4077498"/>
+            <a:ext cx="816091" cy="526179"/>
+          </a:xfrm>
+          <a:prstGeom prst="roundRect">
+            <a:avLst/>
+          </a:prstGeom>
+          <a:solidFill>
+            <a:schemeClr val="bg1">
+              <a:lumMod val="95000"/>
+            </a:schemeClr>
+          </a:solidFill>
+          <a:ln w="9525"/>
+        </p:spPr>
+        <p:style>
+          <a:lnRef idx="2">
+            <a:schemeClr val="dk1"/>
+          </a:lnRef>
+          <a:fillRef idx="1">
+            <a:schemeClr val="lt1"/>
+          </a:fillRef>
+          <a:effectRef idx="0">
+            <a:schemeClr val="dk1"/>
+          </a:effectRef>
+          <a:fontRef idx="minor">
+            <a:schemeClr val="dk1"/>
+          </a:fontRef>
+        </p:style>
+        <p:txBody>
+          <a:bodyPr rtlCol="0" anchor="ctr"/>
+          <a:lstStyle/>
+          <a:p>
+            <a:pPr algn="ctr"/>
+            <a:r>
+              <a:rPr lang="en-US" sz="1200" dirty="0"/>
+              <a:t>PCRF</a:t>
+            </a:r>
+            <a:endParaRPr lang="fr-FR" sz="1200" dirty="0"/>
+          </a:p>
+        </p:txBody>
+      </p:sp>
+      <p:sp>
+        <p:nvSpPr>
+          <p:cNvPr id="44" name="Rectangle à coins arrondis 7"/>
+          <p:cNvSpPr/>
+          <p:nvPr/>
+        </p:nvSpPr>
+        <p:spPr>
+          <a:xfrm>
+            <a:off x="3746168" y="3514656"/>
+            <a:ext cx="1213296" cy="526179"/>
+          </a:xfrm>
+          <a:prstGeom prst="roundRect">
+            <a:avLst/>
+          </a:prstGeom>
+          <a:ln/>
+        </p:spPr>
+        <p:style>
+          <a:lnRef idx="1">
+            <a:schemeClr val="accent1"/>
+          </a:lnRef>
+          <a:fillRef idx="2">
+            <a:schemeClr val="accent1"/>
+          </a:fillRef>
+          <a:effectRef idx="1">
+            <a:schemeClr val="accent1"/>
           </a:effectRef>
           <a:fontRef idx="minor">
             <a:schemeClr val="dk1"/>
@@ -8763,7 +9129,7 @@
                   <a:schemeClr val="dk1"/>
                 </a:solidFill>
               </a:rPr>
-              <a:t>HGW</a:t>
+              <a:t>Connector:</a:t>
             </a:r>
             <a:br>
               <a:rPr lang="en-US" sz="1200" dirty="0" smtClean="0">
@@ -8778,7 +9144,7 @@
                   <a:schemeClr val="dk1"/>
                 </a:solidFill>
               </a:rPr>
-              <a:t>(DSCP Marking)</a:t>
+              <a:t>EPS Application Function</a:t>
             </a:r>
             <a:endParaRPr lang="fr-FR" sz="1200" dirty="0">
               <a:solidFill>
@@ -8788,33 +9154,90 @@
           </a:p>
         </p:txBody>
       </p:sp>
+      <p:sp>
+        <p:nvSpPr>
+          <p:cNvPr id="54" name="Rectangle à coins arrondis 17"/>
+          <p:cNvSpPr/>
+          <p:nvPr/>
+        </p:nvSpPr>
+        <p:spPr>
+          <a:xfrm>
+            <a:off x="6544781" y="3682863"/>
+            <a:ext cx="1814856" cy="526179"/>
+          </a:xfrm>
+          <a:prstGeom prst="roundRect">
+            <a:avLst/>
+          </a:prstGeom>
+          <a:ln/>
+        </p:spPr>
+        <p:style>
+          <a:lnRef idx="1">
+            <a:schemeClr val="accent1"/>
+          </a:lnRef>
+          <a:fillRef idx="2">
+            <a:schemeClr val="accent1"/>
+          </a:fillRef>
+          <a:effectRef idx="1">
+            <a:schemeClr val="accent1"/>
+          </a:effectRef>
+          <a:fontRef idx="minor">
+            <a:schemeClr val="dk1"/>
+          </a:fontRef>
+        </p:style>
+        <p:txBody>
+          <a:bodyPr rtlCol="0" anchor="ctr"/>
+          <a:lstStyle/>
+          <a:p>
+            <a:pPr algn="ctr"/>
+            <a:r>
+              <a:rPr lang="de-DE" sz="1200" dirty="0" smtClean="0"/>
+              <a:t>Connector</a:t>
+            </a:r>
+            <a:r>
+              <a:rPr lang="de-DE" sz="1200" dirty="0" smtClean="0"/>
+              <a:t>: </a:t>
+            </a:r>
+            <a:br>
+              <a:rPr lang="de-DE" sz="1200" dirty="0" smtClean="0"/>
+            </a:br>
+            <a:r>
+              <a:rPr lang="de-DE" sz="1200" dirty="0" smtClean="0"/>
+              <a:t>Backend TURN Network</a:t>
+            </a:r>
+            <a:endParaRPr lang="fr-FR" sz="1200" dirty="0">
+              <a:solidFill>
+                <a:schemeClr val="dk1"/>
+              </a:solidFill>
+            </a:endParaRPr>
+          </a:p>
+        </p:txBody>
+      </p:sp>
       <p:cxnSp>
         <p:nvCxnSpPr>
-          <p:cNvPr id="37" name="Connecteur droit 20"/>
+          <p:cNvPr id="104" name="Straight Connector 103"/>
           <p:cNvCxnSpPr>
-            <a:stCxn id="36" idx="3"/>
-            <a:endCxn id="19" idx="2"/>
+            <a:stCxn id="42" idx="1"/>
+            <a:endCxn id="56" idx="3"/>
           </p:cNvCxnSpPr>
           <p:nvPr/>
         </p:nvCxnSpPr>
         <p:spPr>
-          <a:xfrm flipV="1">
-            <a:off x="3647800" y="5545191"/>
-            <a:ext cx="1061053" cy="761924"/>
+          <a:xfrm>
+            <a:off x="7194259" y="5420282"/>
+            <a:ext cx="1842237" cy="909288"/>
           </a:xfrm>
           <a:prstGeom prst="line">
             <a:avLst/>
           </a:prstGeom>
-          <a:ln w="6350"/>
-        </p:spPr>
-        <p:style>
-          <a:lnRef idx="1">
+        </p:spPr>
+        <p:style>
+          <a:lnRef idx="3">
             <a:schemeClr val="dk1"/>
           </a:lnRef>
           <a:fillRef idx="0">
             <a:schemeClr val="dk1"/>
           </a:fillRef>
-          <a:effectRef idx="0">
+          <a:effectRef idx="2">
             <a:schemeClr val="dk1"/>
           </a:effectRef>
           <a:fontRef idx="minor">
@@ -8822,49 +9245,16 @@
           </a:fontRef>
         </p:style>
       </p:cxnSp>
-      <p:cxnSp>
-        <p:nvCxnSpPr>
-          <p:cNvPr id="43" name="Connecteur droit 20"/>
-          <p:cNvCxnSpPr>
-            <a:stCxn id="36" idx="1"/>
-          </p:cNvCxnSpPr>
-          <p:nvPr/>
-        </p:nvCxnSpPr>
-        <p:spPr>
-          <a:xfrm flipH="1" flipV="1">
-            <a:off x="1122970" y="5926155"/>
-            <a:ext cx="1144774" cy="380960"/>
-          </a:xfrm>
-          <a:prstGeom prst="line">
-            <a:avLst/>
-          </a:prstGeom>
-          <a:ln w="6350"/>
-        </p:spPr>
-        <p:style>
-          <a:lnRef idx="1">
-            <a:schemeClr val="dk1"/>
-          </a:lnRef>
-          <a:fillRef idx="0">
-            <a:schemeClr val="dk1"/>
-          </a:fillRef>
-          <a:effectRef idx="0">
-            <a:schemeClr val="dk1"/>
-          </a:effectRef>
-          <a:fontRef idx="minor">
-            <a:schemeClr val="tx1"/>
-          </a:fontRef>
-        </p:style>
-      </p:cxnSp>
-      <p:sp>
-        <p:nvSpPr>
-          <p:cNvPr id="47" name="Rectangle à coins arrondis 7"/>
+      <p:sp>
+        <p:nvSpPr>
+          <p:cNvPr id="42" name="Rectangle à coins arrondis 17"/>
           <p:cNvSpPr/>
           <p:nvPr/>
         </p:nvSpPr>
         <p:spPr>
           <a:xfrm>
-            <a:off x="4071813" y="6290667"/>
-            <a:ext cx="1213296" cy="526179"/>
+            <a:off x="7194259" y="5157192"/>
+            <a:ext cx="816091" cy="526179"/>
           </a:xfrm>
           <a:prstGeom prst="roundRect">
             <a:avLst/>
@@ -8890,17 +9280,64 @@
           <a:lstStyle/>
           <a:p>
             <a:pPr algn="ctr"/>
-            <a:r>
-              <a:rPr lang="en-US" sz="1200" dirty="0" smtClean="0"/>
-              <a:t>QoS for Fixed</a:t>
-            </a:r>
             <a:r>
               <a:rPr lang="en-US" sz="1200" dirty="0" smtClean="0">
                 <a:solidFill>
                   <a:schemeClr val="dk1"/>
                 </a:solidFill>
               </a:rPr>
-              <a:t/>
+              <a:t>TURN</a:t>
+            </a:r>
+            <a:endParaRPr lang="fr-FR" sz="1200" dirty="0">
+              <a:solidFill>
+                <a:schemeClr val="dk1"/>
+              </a:solidFill>
+            </a:endParaRPr>
+          </a:p>
+        </p:txBody>
+      </p:sp>
+      <p:sp>
+        <p:nvSpPr>
+          <p:cNvPr id="36" name="Rectangle à coins arrondis 5"/>
+          <p:cNvSpPr/>
+          <p:nvPr/>
+        </p:nvSpPr>
+        <p:spPr>
+          <a:xfrm>
+            <a:off x="2267744" y="6273971"/>
+            <a:ext cx="1380056" cy="526179"/>
+          </a:xfrm>
+          <a:prstGeom prst="roundRect">
+            <a:avLst/>
+          </a:prstGeom>
+          <a:ln w="9525"/>
+        </p:spPr>
+        <p:style>
+          <a:lnRef idx="2">
+            <a:schemeClr val="dk1"/>
+          </a:lnRef>
+          <a:fillRef idx="1">
+            <a:schemeClr val="lt1"/>
+          </a:fillRef>
+          <a:effectRef idx="0">
+            <a:schemeClr val="dk1"/>
+          </a:effectRef>
+          <a:fontRef idx="minor">
+            <a:schemeClr val="dk1"/>
+          </a:fontRef>
+        </p:style>
+        <p:txBody>
+          <a:bodyPr rtlCol="0" anchor="ctr"/>
+          <a:lstStyle/>
+          <a:p>
+            <a:pPr algn="ctr"/>
+            <a:r>
+              <a:rPr lang="en-US" sz="1200" dirty="0" smtClean="0">
+                <a:solidFill>
+                  <a:schemeClr val="dk1"/>
+                </a:solidFill>
+              </a:rPr>
+              <a:t>HGW</a:t>
             </a:r>
             <a:br>
               <a:rPr lang="en-US" sz="1200" dirty="0" smtClean="0">
@@ -8915,7 +9352,7 @@
                   <a:schemeClr val="dk1"/>
                 </a:solidFill>
               </a:rPr>
-              <a:t>(Connector)</a:t>
+              <a:t>(DSCP Marking)</a:t>
             </a:r>
             <a:endParaRPr lang="fr-FR" sz="1200" dirty="0">
               <a:solidFill>
@@ -8925,35 +9362,138 @@
           </a:p>
         </p:txBody>
       </p:sp>
+      <p:sp>
+        <p:nvSpPr>
+          <p:cNvPr id="47" name="Rectangle à coins arrondis 7"/>
+          <p:cNvSpPr/>
+          <p:nvPr/>
+        </p:nvSpPr>
+        <p:spPr>
+          <a:xfrm>
+            <a:off x="4352816" y="4209042"/>
+            <a:ext cx="1335138" cy="526179"/>
+          </a:xfrm>
+          <a:prstGeom prst="roundRect">
+            <a:avLst/>
+          </a:prstGeom>
+          <a:ln/>
+        </p:spPr>
+        <p:style>
+          <a:lnRef idx="1">
+            <a:schemeClr val="accent1"/>
+          </a:lnRef>
+          <a:fillRef idx="2">
+            <a:schemeClr val="accent1"/>
+          </a:fillRef>
+          <a:effectRef idx="1">
+            <a:schemeClr val="accent1"/>
+          </a:effectRef>
+          <a:fontRef idx="minor">
+            <a:schemeClr val="dk1"/>
+          </a:fontRef>
+        </p:style>
+        <p:txBody>
+          <a:bodyPr rtlCol="0" anchor="ctr"/>
+          <a:lstStyle/>
+          <a:p>
+            <a:pPr algn="ctr"/>
+            <a:r>
+              <a:rPr lang="en-US" sz="1200" dirty="0" smtClean="0"/>
+              <a:t>Connector:</a:t>
+            </a:r>
+            <a:br>
+              <a:rPr lang="en-US" sz="1200" dirty="0" smtClean="0"/>
+            </a:br>
+            <a:r>
+              <a:rPr lang="en-US" sz="1200" dirty="0" smtClean="0"/>
+              <a:t>Fixed Line Access</a:t>
+            </a:r>
+            <a:endParaRPr lang="fr-FR" sz="1200" dirty="0">
+              <a:solidFill>
+                <a:schemeClr val="dk1"/>
+              </a:solidFill>
+            </a:endParaRPr>
+          </a:p>
+        </p:txBody>
+      </p:sp>
+      <p:sp>
+        <p:nvSpPr>
+          <p:cNvPr id="12" name="Rectangle à coins arrondis 11"/>
+          <p:cNvSpPr/>
+          <p:nvPr/>
+        </p:nvSpPr>
+        <p:spPr>
+          <a:xfrm>
+            <a:off x="5547783" y="2708920"/>
+            <a:ext cx="2984657" cy="599610"/>
+          </a:xfrm>
+          <a:prstGeom prst="roundRect">
+            <a:avLst/>
+          </a:prstGeom>
+          <a:ln/>
+        </p:spPr>
+        <p:style>
+          <a:lnRef idx="1">
+            <a:schemeClr val="accent3"/>
+          </a:lnRef>
+          <a:fillRef idx="2">
+            <a:schemeClr val="accent3"/>
+          </a:fillRef>
+          <a:effectRef idx="1">
+            <a:schemeClr val="accent3"/>
+          </a:effectRef>
+          <a:fontRef idx="minor">
+            <a:schemeClr val="dk1"/>
+          </a:fontRef>
+        </p:style>
+        <p:txBody>
+          <a:bodyPr rtlCol="0" anchor="ctr"/>
+          <a:lstStyle/>
+          <a:p>
+            <a:pPr algn="ctr"/>
+            <a:r>
+              <a:rPr lang="en-US" sz="1200" dirty="0" smtClean="0">
+                <a:solidFill>
+                  <a:schemeClr val="dk1"/>
+                </a:solidFill>
+              </a:rPr>
+              <a:t>Broker</a:t>
+            </a:r>
+            <a:endParaRPr lang="fr-FR" sz="1200" dirty="0">
+              <a:solidFill>
+                <a:schemeClr val="dk1"/>
+              </a:solidFill>
+            </a:endParaRPr>
+          </a:p>
+        </p:txBody>
+      </p:sp>
       <p:cxnSp>
         <p:nvCxnSpPr>
-          <p:cNvPr id="48" name="Connecteur droit avec flèche 13"/>
-          <p:cNvCxnSpPr>
-            <a:stCxn id="12" idx="2"/>
-            <a:endCxn id="47" idx="0"/>
-          </p:cNvCxnSpPr>
+          <p:cNvPr id="119" name="Connecteur droit avec flèche 10"/>
+          <p:cNvCxnSpPr/>
           <p:nvPr/>
         </p:nvCxnSpPr>
         <p:spPr>
           <a:xfrm flipH="1">
-            <a:off x="4678461" y="3317712"/>
-            <a:ext cx="1951445" cy="2972955"/>
+            <a:off x="395537" y="2167205"/>
+            <a:ext cx="576063" cy="0"/>
           </a:xfrm>
           <a:prstGeom prst="straightConnector1">
             <a:avLst/>
           </a:prstGeom>
           <a:ln>
-            <a:tailEnd type="arrow"/>
+            <a:headEnd type="none" w="med" len="med"/>
+            <a:tailEnd type="none" w="med" len="med"/>
           </a:ln>
         </p:spPr>
         <p:style>
-          <a:lnRef idx="1">
+          <a:lnRef idx="3">
             <a:schemeClr val="dk1"/>
           </a:lnRef>
           <a:fillRef idx="0">
             <a:schemeClr val="dk1"/>
           </a:fillRef>
-          <a:effectRef idx="0">
+          <a:effectRef idx="2">
             <a:schemeClr val="dk1"/>
           </a:effectRef>
           <a:fontRef idx="minor">
@@ -8963,39 +9503,287 @@
       </p:cxnSp>
       <p:cxnSp>
         <p:nvCxnSpPr>
-          <p:cNvPr id="52" name="Connecteur droit avec flèche 13"/>
+          <p:cNvPr id="122" name="Connecteur droit avec flèche 30"/>
+          <p:cNvCxnSpPr/>
+          <p:nvPr/>
+        </p:nvCxnSpPr>
+        <p:spPr>
+          <a:xfrm flipH="1">
+            <a:off x="395537" y="2360807"/>
+            <a:ext cx="576063" cy="1"/>
+          </a:xfrm>
+          <a:prstGeom prst="straightConnector1">
+            <a:avLst/>
+          </a:prstGeom>
+          <a:ln>
+            <a:prstDash val="sysDot"/>
+            <a:headEnd type="none" w="med" len="med"/>
+            <a:tailEnd type="none" w="med" len="med"/>
+          </a:ln>
+        </p:spPr>
+        <p:style>
+          <a:lnRef idx="3">
+            <a:schemeClr val="accent4"/>
+          </a:lnRef>
+          <a:fillRef idx="0">
+            <a:schemeClr val="accent4"/>
+          </a:fillRef>
+          <a:effectRef idx="2">
+            <a:schemeClr val="accent4"/>
+          </a:effectRef>
+          <a:fontRef idx="minor">
+            <a:schemeClr val="tx1"/>
+          </a:fontRef>
+        </p:style>
+      </p:cxnSp>
+      <p:sp>
+        <p:nvSpPr>
+          <p:cNvPr id="130" name="ZoneTexte 38"/>
+          <p:cNvSpPr txBox="1"/>
+          <p:nvPr/>
+        </p:nvSpPr>
+        <p:spPr>
+          <a:xfrm>
+            <a:off x="1653464" y="2575937"/>
+            <a:ext cx="2594493" cy="276999"/>
+          </a:xfrm>
+          <a:prstGeom prst="rect">
+            <a:avLst/>
+          </a:prstGeom>
+          <a:noFill/>
+        </p:spPr>
+        <p:txBody>
+          <a:bodyPr wrap="none" rtlCol="0">
+            <a:spAutoFit/>
+          </a:bodyPr>
+          <a:lstStyle/>
+          <a:p>
+            <a:r>
+              <a:rPr lang="en-US" sz="1200" dirty="0" err="1" smtClean="0"/>
+              <a:t>PeerConnection.getStats</a:t>
+            </a:r>
+            <a:r>
+              <a:rPr lang="en-US" sz="1200" dirty="0" smtClean="0"/>
+              <a:t>() Information</a:t>
+            </a:r>
+            <a:endParaRPr lang="fr-FR" sz="1200" dirty="0"/>
+          </a:p>
+        </p:txBody>
+      </p:sp>
+      <p:sp>
+        <p:nvSpPr>
+          <p:cNvPr id="132" name="Oval 131"/>
+          <p:cNvSpPr/>
+          <p:nvPr/>
+        </p:nvSpPr>
+        <p:spPr>
+          <a:xfrm>
+            <a:off x="5579774" y="5784650"/>
+            <a:ext cx="216361" cy="884709"/>
+          </a:xfrm>
+          <a:prstGeom prst="ellipse">
+            <a:avLst/>
+          </a:prstGeom>
+        </p:spPr>
+        <p:style>
+          <a:lnRef idx="2">
+            <a:schemeClr val="accent2"/>
+          </a:lnRef>
+          <a:fillRef idx="1">
+            <a:schemeClr val="lt1"/>
+          </a:fillRef>
+          <a:effectRef idx="0">
+            <a:schemeClr val="accent2"/>
+          </a:effectRef>
+          <a:fontRef idx="minor">
+            <a:schemeClr val="dk1"/>
+          </a:fontRef>
+        </p:style>
+        <p:txBody>
+          <a:bodyPr rtlCol="0" anchor="ctr"/>
+          <a:lstStyle/>
+          <a:p>
+            <a:pPr algn="ctr"/>
+            <a:endParaRPr lang="en-US" dirty="0"/>
+          </a:p>
+        </p:txBody>
+      </p:sp>
+      <p:cxnSp>
+        <p:nvCxnSpPr>
+          <p:cNvPr id="87" name="Straight Arrow Connector 86"/>
           <p:cNvCxnSpPr>
-            <a:stCxn id="47" idx="1"/>
+            <a:stCxn id="19" idx="3"/>
+            <a:endCxn id="18" idx="3"/>
           </p:cNvCxnSpPr>
           <p:nvPr/>
         </p:nvCxnSpPr>
         <p:spPr>
-          <a:xfrm flipH="1" flipV="1">
-            <a:off x="3647801" y="6451973"/>
-            <a:ext cx="424012" cy="101784"/>
+          <a:xfrm flipV="1">
+            <a:off x="5292080" y="5132250"/>
+            <a:ext cx="1320147" cy="1304803"/>
           </a:xfrm>
           <a:prstGeom prst="straightConnector1">
             <a:avLst/>
           </a:prstGeom>
           <a:ln>
-            <a:tailEnd type="arrow"/>
+            <a:headEnd type="none" w="med" len="med"/>
+            <a:tailEnd type="none" w="med" len="med"/>
           </a:ln>
         </p:spPr>
         <p:style>
+          <a:lnRef idx="3">
+            <a:schemeClr val="dk1"/>
+          </a:lnRef>
+          <a:fillRef idx="0">
+            <a:schemeClr val="dk1"/>
+          </a:fillRef>
+          <a:effectRef idx="2">
+            <a:schemeClr val="dk1"/>
+          </a:effectRef>
+          <a:fontRef idx="minor">
+            <a:schemeClr val="tx1"/>
+          </a:fontRef>
+        </p:style>
+      </p:cxnSp>
+      <p:sp>
+        <p:nvSpPr>
+          <p:cNvPr id="18" name="Rectangle à coins arrondis 17"/>
+          <p:cNvSpPr/>
+          <p:nvPr/>
+        </p:nvSpPr>
+        <p:spPr>
+          <a:xfrm>
+            <a:off x="5796136" y="4869160"/>
+            <a:ext cx="816091" cy="526179"/>
+          </a:xfrm>
+          <a:prstGeom prst="roundRect">
+            <a:avLst/>
+          </a:prstGeom>
+          <a:ln w="9525"/>
+        </p:spPr>
+        <p:style>
+          <a:lnRef idx="2">
+            <a:schemeClr val="dk1"/>
+          </a:lnRef>
+          <a:fillRef idx="1">
+            <a:schemeClr val="lt1"/>
+          </a:fillRef>
+          <a:effectRef idx="0">
+            <a:schemeClr val="dk1"/>
+          </a:effectRef>
+          <a:fontRef idx="minor">
+            <a:schemeClr val="dk1"/>
+          </a:fontRef>
+        </p:style>
+        <p:txBody>
+          <a:bodyPr rtlCol="0" anchor="ctr"/>
+          <a:lstStyle/>
+          <a:p>
+            <a:pPr algn="ctr"/>
+            <a:r>
+              <a:rPr lang="en-US" sz="1200" dirty="0" smtClean="0">
+                <a:solidFill>
+                  <a:schemeClr val="dk1"/>
+                </a:solidFill>
+              </a:rPr>
+              <a:t>TURN</a:t>
+            </a:r>
+            <a:endParaRPr lang="fr-FR" sz="1200" dirty="0">
+              <a:solidFill>
+                <a:schemeClr val="dk1"/>
+              </a:solidFill>
+            </a:endParaRPr>
+          </a:p>
+        </p:txBody>
+      </p:sp>
+      <p:cxnSp>
+        <p:nvCxnSpPr>
+          <p:cNvPr id="98" name="Straight Arrow Connector 97"/>
+          <p:cNvCxnSpPr>
+            <a:stCxn id="19" idx="3"/>
+            <a:endCxn id="56" idx="1"/>
+          </p:cNvCxnSpPr>
+          <p:nvPr/>
+        </p:nvCxnSpPr>
+        <p:spPr>
+          <a:xfrm flipV="1">
+            <a:off x="5292080" y="6329570"/>
+            <a:ext cx="2880320" cy="107483"/>
+          </a:xfrm>
+          <a:prstGeom prst="straightConnector1">
+            <a:avLst/>
+          </a:prstGeom>
+          <a:ln>
+            <a:headEnd type="none" w="med" len="med"/>
+            <a:tailEnd type="none" w="med" len="med"/>
+          </a:ln>
+        </p:spPr>
+        <p:style>
+          <a:lnRef idx="3">
+            <a:schemeClr val="dk1"/>
+          </a:lnRef>
+          <a:fillRef idx="0">
+            <a:schemeClr val="dk1"/>
+          </a:fillRef>
+          <a:effectRef idx="2">
+            <a:schemeClr val="dk1"/>
+          </a:effectRef>
+          <a:fontRef idx="minor">
+            <a:schemeClr val="tx1"/>
+          </a:fontRef>
+        </p:style>
+      </p:cxnSp>
+      <p:sp>
+        <p:nvSpPr>
+          <p:cNvPr id="19" name="Rectangle à coins arrondis 18"/>
+          <p:cNvSpPr/>
+          <p:nvPr/>
+        </p:nvSpPr>
+        <p:spPr>
+          <a:xfrm>
+            <a:off x="4269643" y="6132737"/>
+            <a:ext cx="1022437" cy="608631"/>
+          </a:xfrm>
+          <a:prstGeom prst="roundRect">
+            <a:avLst/>
+          </a:prstGeom>
+          <a:ln/>
+        </p:spPr>
+        <p:style>
           <a:lnRef idx="1">
-            <a:schemeClr val="dk1"/>
-          </a:lnRef>
-          <a:fillRef idx="0">
-            <a:schemeClr val="dk1"/>
-          </a:fillRef>
-          <a:effectRef idx="0">
-            <a:schemeClr val="dk1"/>
-          </a:effectRef>
-          <a:fontRef idx="minor">
-            <a:schemeClr val="tx1"/>
-          </a:fontRef>
-        </p:style>
-      </p:cxnSp>
+            <a:schemeClr val="accent6"/>
+          </a:lnRef>
+          <a:fillRef idx="2">
+            <a:schemeClr val="accent6"/>
+          </a:fillRef>
+          <a:effectRef idx="1">
+            <a:schemeClr val="accent6"/>
+          </a:effectRef>
+          <a:fontRef idx="minor">
+            <a:schemeClr val="dk1"/>
+          </a:fontRef>
+        </p:style>
+        <p:txBody>
+          <a:bodyPr rtlCol="0" anchor="ctr"/>
+          <a:lstStyle/>
+          <a:p>
+            <a:pPr algn="ctr"/>
+            <a:r>
+              <a:rPr lang="en-US" sz="1200" dirty="0" smtClean="0">
+                <a:solidFill>
+                  <a:schemeClr val="dk1"/>
+                </a:solidFill>
+              </a:rPr>
+              <a:t>Traffic Detection Function(s)</a:t>
+            </a:r>
+            <a:endParaRPr lang="fr-FR" sz="1200" dirty="0">
+              <a:solidFill>
+                <a:schemeClr val="dk1"/>
+              </a:solidFill>
+            </a:endParaRPr>
+          </a:p>
+        </p:txBody>
+      </p:sp>
       <p:sp>
         <p:nvSpPr>
           <p:cNvPr id="56" name="Rectangle à coins arrondis 3"/>
@@ -9004,23 +9792,23 @@
         </p:nvSpPr>
         <p:spPr>
           <a:xfrm>
-            <a:off x="8711952" y="5879393"/>
+            <a:off x="8172400" y="5845763"/>
             <a:ext cx="864096" cy="967613"/>
           </a:xfrm>
           <a:prstGeom prst="roundRect">
             <a:avLst/>
           </a:prstGeom>
-          <a:ln w="9525"/>
-        </p:spPr>
-        <p:style>
-          <a:lnRef idx="2">
-            <a:schemeClr val="dk1"/>
-          </a:lnRef>
-          <a:fillRef idx="1">
-            <a:schemeClr val="lt1"/>
-          </a:fillRef>
-          <a:effectRef idx="0">
-            <a:schemeClr val="dk1"/>
+          <a:ln/>
+        </p:spPr>
+        <p:style>
+          <a:lnRef idx="1">
+            <a:schemeClr val="accent3"/>
+          </a:lnRef>
+          <a:fillRef idx="2">
+            <a:schemeClr val="accent3"/>
+          </a:fillRef>
+          <a:effectRef idx="1">
+            <a:schemeClr val="accent3"/>
           </a:effectRef>
           <a:fontRef idx="minor">
             <a:schemeClr val="dk1"/>
@@ -9036,6 +9824,48 @@
               <a:t>Other Peer</a:t>
             </a:r>
             <a:endParaRPr lang="en-US" sz="1200" dirty="0" smtClean="0"/>
+          </a:p>
+        </p:txBody>
+      </p:sp>
+      <p:sp>
+        <p:nvSpPr>
+          <p:cNvPr id="142" name="TextBox 141"/>
+          <p:cNvSpPr txBox="1"/>
+          <p:nvPr/>
+        </p:nvSpPr>
+        <p:spPr>
+          <a:xfrm>
+            <a:off x="5724128" y="6453336"/>
+            <a:ext cx="2172784" cy="261610"/>
+          </a:xfrm>
+          <a:prstGeom prst="rect">
+            <a:avLst/>
+          </a:prstGeom>
+          <a:noFill/>
+        </p:spPr>
+        <p:txBody>
+          <a:bodyPr wrap="square" rtlCol="0">
+            <a:spAutoFit/>
+          </a:bodyPr>
+          <a:lstStyle/>
+          <a:p>
+            <a:r>
+              <a:rPr lang="de-DE" sz="1050" dirty="0" err="1" smtClean="0"/>
+              <a:t>Direct</a:t>
+            </a:r>
+            <a:r>
+              <a:rPr lang="de-DE" sz="1050" dirty="0" smtClean="0"/>
+              <a:t> </a:t>
+            </a:r>
+            <a:r>
+              <a:rPr lang="de-DE" sz="1050" dirty="0" err="1" smtClean="0"/>
+              <a:t>or</a:t>
+            </a:r>
+            <a:r>
+              <a:rPr lang="de-DE" sz="1050" dirty="0" smtClean="0"/>
+              <a:t> TURN Server Path</a:t>
+            </a:r>
+            <a:endParaRPr lang="en-US" sz="1050" dirty="0"/>
           </a:p>
         </p:txBody>
       </p:sp>
@@ -9049,6 +9879,703 @@
   <p:clrMapOvr>
     <a:masterClrMapping/>
   </p:clrMapOvr>
+</p:sld>
+</file>
+
+<file path=ppt/slides/slide8.xml><?xml version="1.0" encoding="utf-8"?>
+<p:sld xmlns:a="http://schemas.openxmlformats.org/drawingml/2006/main" xmlns:r="http://schemas.openxmlformats.org/officeDocument/2006/relationships" xmlns:p="http://schemas.openxmlformats.org/presentationml/2006/main">
+  <p:cSld>
+    <p:spTree>
+      <p:nvGrpSpPr>
+        <p:cNvPr id="1" name=""/>
+        <p:cNvGrpSpPr/>
+        <p:nvPr/>
+      </p:nvGrpSpPr>
+      <p:grpSpPr>
+        <a:xfrm>
+          <a:off x="0" y="0"/>
+          <a:ext cx="0" cy="0"/>
+          <a:chOff x="0" y="0"/>
+          <a:chExt cx="0" cy="0"/>
+        </a:xfrm>
+      </p:grpSpPr>
+      <p:sp>
+        <p:nvSpPr>
+          <p:cNvPr id="9" name="Title 8"/>
+          <p:cNvSpPr>
+            <a:spLocks noGrp="1"/>
+          </p:cNvSpPr>
+          <p:nvPr>
+            <p:ph type="title"/>
+          </p:nvPr>
+        </p:nvSpPr>
+        <p:spPr/>
+        <p:txBody>
+          <a:bodyPr/>
+          <a:lstStyle/>
+          <a:p>
+            <a:r>
+              <a:rPr lang="en-GB" dirty="0" smtClean="0"/>
+              <a:t>Proposed QoS Categories</a:t>
+            </a:r>
+            <a:endParaRPr lang="en-GB" dirty="0"/>
+          </a:p>
+        </p:txBody>
+      </p:sp>
+      <p:sp>
+        <p:nvSpPr>
+          <p:cNvPr id="5" name="Slide Number Placeholder 4"/>
+          <p:cNvSpPr>
+            <a:spLocks noGrp="1"/>
+          </p:cNvSpPr>
+          <p:nvPr>
+            <p:ph type="sldNum" sz="quarter" idx="12"/>
+          </p:nvPr>
+        </p:nvSpPr>
+        <p:spPr/>
+        <p:txBody>
+          <a:bodyPr/>
+          <a:lstStyle/>
+          <a:p>
+            <a:fld id="{2A69829B-7244-4119-A08A-7E4189FF9392}" type="slidenum">
+              <a:rPr lang="en-US" smtClean="0"/>
+              <a:pPr/>
+              <a:t>8</a:t>
+            </a:fld>
+            <a:endParaRPr lang="en-US"/>
+          </a:p>
+        </p:txBody>
+      </p:sp>
+      <p:graphicFrame>
+        <p:nvGraphicFramePr>
+          <p:cNvPr id="2" name="Table 1"/>
+          <p:cNvGraphicFramePr>
+            <a:graphicFrameLocks noGrp="1"/>
+          </p:cNvGraphicFramePr>
+          <p:nvPr>
+            <p:extLst>
+              <p:ext uri="{D42A27DB-BD31-4B8C-83A1-F6EECF244321}">
+                <p14:modId xmlns:p14="http://schemas.microsoft.com/office/powerpoint/2010/main" val="4175511772"/>
+              </p:ext>
+            </p:extLst>
+          </p:nvPr>
+        </p:nvGraphicFramePr>
+        <p:xfrm>
+          <a:off x="179509" y="1808336"/>
+          <a:ext cx="8479536" cy="3845560"/>
+        </p:xfrm>
+        <a:graphic>
+          <a:graphicData uri="http://schemas.openxmlformats.org/drawingml/2006/table">
+            <a:tbl>
+              <a:tblPr firstRow="1" bandRow="1">
+                <a:tableStyleId>{6E25E649-3F16-4E02-A733-19D2CDBF48F0}</a:tableStyleId>
+              </a:tblPr>
+              <a:tblGrid>
+                <a:gridCol w="1584179"/>
+                <a:gridCol w="1242333"/>
+                <a:gridCol w="1413256"/>
+                <a:gridCol w="1413256"/>
+                <a:gridCol w="539667"/>
+                <a:gridCol w="2286845"/>
+              </a:tblGrid>
+              <a:tr h="370840">
+                <a:tc>
+                  <a:txBody>
+                    <a:bodyPr/>
+                    <a:lstStyle/>
+                    <a:p>
+                      <a:r>
+                        <a:rPr lang="en-US" sz="1400" noProof="0" dirty="0" smtClean="0"/>
+                        <a:t>QoS Level</a:t>
+                      </a:r>
+                      <a:endParaRPr lang="en-US" sz="1400" noProof="0" dirty="0"/>
+                    </a:p>
+                  </a:txBody>
+                  <a:tcPr/>
+                </a:tc>
+                <a:tc>
+                  <a:txBody>
+                    <a:bodyPr/>
+                    <a:lstStyle/>
+                    <a:p>
+                      <a:r>
+                        <a:rPr lang="en-US" sz="1400" noProof="0" dirty="0" smtClean="0"/>
+                        <a:t>GBR</a:t>
+                      </a:r>
+                      <a:endParaRPr lang="en-US" sz="1400" noProof="0" dirty="0"/>
+                    </a:p>
+                  </a:txBody>
+                  <a:tcPr/>
+                </a:tc>
+                <a:tc>
+                  <a:txBody>
+                    <a:bodyPr/>
+                    <a:lstStyle/>
+                    <a:p>
+                      <a:r>
+                        <a:rPr lang="en-US" sz="1400" noProof="0" dirty="0" smtClean="0"/>
+                        <a:t>Jitter</a:t>
+                      </a:r>
+                      <a:endParaRPr lang="en-US" sz="1400" noProof="0" dirty="0"/>
+                    </a:p>
+                  </a:txBody>
+                  <a:tcPr/>
+                </a:tc>
+                <a:tc>
+                  <a:txBody>
+                    <a:bodyPr/>
+                    <a:lstStyle/>
+                    <a:p>
+                      <a:r>
+                        <a:rPr lang="en-US" sz="1400" noProof="0" dirty="0" smtClean="0"/>
+                        <a:t>Delay</a:t>
+                      </a:r>
+                      <a:endParaRPr lang="en-US" sz="1400" noProof="0" dirty="0"/>
+                    </a:p>
+                  </a:txBody>
+                  <a:tcPr/>
+                </a:tc>
+                <a:tc>
+                  <a:txBody>
+                    <a:bodyPr/>
+                    <a:lstStyle/>
+                    <a:p>
+                      <a:r>
+                        <a:rPr lang="en-US" sz="1400" noProof="0" dirty="0" smtClean="0"/>
+                        <a:t>Loss</a:t>
+                      </a:r>
+                      <a:endParaRPr lang="en-US" sz="1400" noProof="0" dirty="0"/>
+                    </a:p>
+                  </a:txBody>
+                  <a:tcPr/>
+                </a:tc>
+                <a:tc>
+                  <a:txBody>
+                    <a:bodyPr/>
+                    <a:lstStyle/>
+                    <a:p>
+                      <a:r>
+                        <a:rPr lang="en-US" sz="1400" noProof="0" dirty="0" smtClean="0"/>
+                        <a:t>Comment</a:t>
+                      </a:r>
+                      <a:endParaRPr lang="en-US" sz="1400" noProof="0" dirty="0"/>
+                    </a:p>
+                  </a:txBody>
+                  <a:tcPr/>
+                </a:tc>
+              </a:tr>
+              <a:tr h="370840">
+                <a:tc>
+                  <a:txBody>
+                    <a:bodyPr/>
+                    <a:lstStyle/>
+                    <a:p>
+                      <a:r>
+                        <a:rPr lang="en-US" sz="1400" noProof="0" dirty="0" smtClean="0"/>
+                        <a:t>No QoS</a:t>
+                      </a:r>
+                      <a:endParaRPr lang="en-US" sz="1400" noProof="0" dirty="0"/>
+                    </a:p>
+                  </a:txBody>
+                  <a:tcPr/>
+                </a:tc>
+                <a:tc>
+                  <a:txBody>
+                    <a:bodyPr/>
+                    <a:lstStyle/>
+                    <a:p>
+                      <a:r>
+                        <a:rPr lang="en-US" sz="1400" noProof="0" dirty="0" smtClean="0"/>
+                        <a:t>Best</a:t>
+                      </a:r>
+                      <a:r>
+                        <a:rPr lang="en-US" sz="1400" baseline="0" noProof="0" dirty="0" smtClean="0"/>
+                        <a:t> Effort</a:t>
+                      </a:r>
+                      <a:endParaRPr lang="en-US" sz="1400" noProof="0" dirty="0"/>
+                    </a:p>
+                  </a:txBody>
+                  <a:tcPr/>
+                </a:tc>
+                <a:tc>
+                  <a:txBody>
+                    <a:bodyPr/>
+                    <a:lstStyle/>
+                    <a:p>
+                      <a:r>
+                        <a:rPr lang="en-US" sz="1400" noProof="0" dirty="0" smtClean="0"/>
+                        <a:t>BE</a:t>
+                      </a:r>
+                      <a:endParaRPr lang="en-US" sz="1400" noProof="0" dirty="0"/>
+                    </a:p>
+                  </a:txBody>
+                  <a:tcPr/>
+                </a:tc>
+                <a:tc>
+                  <a:txBody>
+                    <a:bodyPr/>
+                    <a:lstStyle/>
+                    <a:p>
+                      <a:r>
+                        <a:rPr lang="en-US" sz="1400" noProof="0" dirty="0" smtClean="0"/>
+                        <a:t>BE</a:t>
+                      </a:r>
+                      <a:endParaRPr lang="en-US" sz="1400" noProof="0" dirty="0"/>
+                    </a:p>
+                  </a:txBody>
+                  <a:tcPr/>
+                </a:tc>
+                <a:tc>
+                  <a:txBody>
+                    <a:bodyPr/>
+                    <a:lstStyle/>
+                    <a:p>
+                      <a:r>
+                        <a:rPr lang="en-US" sz="1400" noProof="0" dirty="0" smtClean="0"/>
+                        <a:t>BE</a:t>
+                      </a:r>
+                      <a:endParaRPr lang="en-US" sz="1400" noProof="0" dirty="0"/>
+                    </a:p>
+                  </a:txBody>
+                  <a:tcPr/>
+                </a:tc>
+                <a:tc>
+                  <a:txBody>
+                    <a:bodyPr/>
+                    <a:lstStyle/>
+                    <a:p>
+                      <a:r>
+                        <a:rPr lang="en-US" sz="1400" noProof="0" dirty="0" smtClean="0"/>
+                        <a:t>No guarantees</a:t>
+                      </a:r>
+                      <a:r>
+                        <a:rPr lang="en-US" sz="1400" baseline="0" noProof="0" dirty="0" smtClean="0"/>
+                        <a:t> at </a:t>
+                      </a:r>
+                      <a:r>
+                        <a:rPr lang="en-US" sz="1400" baseline="0" noProof="0" dirty="0" smtClean="0"/>
+                        <a:t>all</a:t>
+                      </a:r>
+                    </a:p>
+                    <a:p>
+                      <a:endParaRPr lang="en-US" sz="1400" noProof="0" dirty="0"/>
+                    </a:p>
+                  </a:txBody>
+                  <a:tcPr/>
+                </a:tc>
+              </a:tr>
+              <a:tr h="370840">
+                <a:tc>
+                  <a:txBody>
+                    <a:bodyPr/>
+                    <a:lstStyle/>
+                    <a:p>
+                      <a:r>
+                        <a:rPr lang="en-US" sz="1400" noProof="0" dirty="0" err="1" smtClean="0"/>
+                        <a:t>Parameterised</a:t>
+                      </a:r>
+                      <a:r>
+                        <a:rPr lang="en-US" sz="1400" baseline="0" noProof="0" dirty="0" smtClean="0"/>
+                        <a:t> </a:t>
+                      </a:r>
+                      <a:r>
+                        <a:rPr lang="en-US" sz="1400" noProof="0" dirty="0" smtClean="0"/>
+                        <a:t>QoS</a:t>
+                      </a:r>
+                      <a:r>
+                        <a:rPr lang="en-US" sz="1400" baseline="0" noProof="0" dirty="0" smtClean="0"/>
+                        <a:t/>
+                      </a:r>
+                      <a:br>
+                        <a:rPr lang="en-US" sz="1400" baseline="0" noProof="0" dirty="0" smtClean="0"/>
+                      </a:br>
+                      <a:r>
+                        <a:rPr lang="en-US" sz="1400" baseline="0" noProof="0" dirty="0" smtClean="0"/>
+                        <a:t>(</a:t>
+                      </a:r>
+                      <a:r>
+                        <a:rPr lang="en-US" sz="1400" baseline="0" noProof="0" dirty="0" err="1" smtClean="0"/>
+                        <a:t>baed</a:t>
+                      </a:r>
+                      <a:r>
+                        <a:rPr lang="en-US" sz="1400" baseline="0" noProof="0" dirty="0" smtClean="0"/>
+                        <a:t> on network parameters for direct comm.)</a:t>
+                      </a:r>
+                      <a:endParaRPr lang="en-US" sz="1400" noProof="0" dirty="0"/>
+                    </a:p>
+                  </a:txBody>
+                  <a:tcPr/>
+                </a:tc>
+                <a:tc>
+                  <a:txBody>
+                    <a:bodyPr/>
+                    <a:lstStyle/>
+                    <a:p>
+                      <a:r>
+                        <a:rPr lang="en-US" sz="1400" noProof="0" dirty="0" smtClean="0"/>
+                        <a:t>Guaranteed with </a:t>
+                      </a:r>
+                      <a:r>
+                        <a:rPr lang="en-US" sz="1400" noProof="0" dirty="0" smtClean="0"/>
+                        <a:t>parameters</a:t>
+                      </a:r>
+                      <a:endParaRPr lang="en-US" sz="1400" noProof="0" dirty="0"/>
+                    </a:p>
+                  </a:txBody>
+                  <a:tcPr/>
+                </a:tc>
+                <a:tc>
+                  <a:txBody>
+                    <a:bodyPr/>
+                    <a:lstStyle/>
+                    <a:p>
+                      <a:r>
+                        <a:rPr lang="en-US" sz="1400" noProof="0" dirty="0" smtClean="0"/>
+                        <a:t>Low</a:t>
+                      </a:r>
+                      <a:endParaRPr lang="en-US" sz="1400" noProof="0" dirty="0"/>
+                    </a:p>
+                  </a:txBody>
+                  <a:tcPr/>
+                </a:tc>
+                <a:tc>
+                  <a:txBody>
+                    <a:bodyPr/>
+                    <a:lstStyle/>
+                    <a:p>
+                      <a:r>
+                        <a:rPr lang="en-US" sz="1400" noProof="0" dirty="0" smtClean="0"/>
+                        <a:t>&lt; </a:t>
+                      </a:r>
+                      <a:r>
+                        <a:rPr lang="en-US" sz="1400" noProof="0" dirty="0" smtClean="0"/>
+                        <a:t>150ms; </a:t>
+                      </a:r>
+                      <a:r>
+                        <a:rPr lang="en-US" sz="1400" noProof="0" dirty="0" smtClean="0"/>
+                        <a:t/>
+                      </a:r>
+                      <a:br>
+                        <a:rPr lang="en-US" sz="1400" noProof="0" dirty="0" smtClean="0"/>
+                      </a:br>
+                      <a:r>
+                        <a:rPr lang="en-US" sz="1400" noProof="0" dirty="0" smtClean="0"/>
+                        <a:t>(</a:t>
+                      </a:r>
+                      <a:r>
+                        <a:rPr lang="en-US" sz="1400" noProof="0" dirty="0" smtClean="0"/>
+                        <a:t>e.g.</a:t>
+                      </a:r>
+                      <a:r>
+                        <a:rPr lang="en-US" sz="1400" baseline="0" noProof="0" dirty="0" smtClean="0"/>
+                        <a:t> for audio)</a:t>
+                      </a:r>
+                      <a:endParaRPr lang="en-US" sz="1400" noProof="0" dirty="0"/>
+                    </a:p>
+                  </a:txBody>
+                  <a:tcPr/>
+                </a:tc>
+                <a:tc>
+                  <a:txBody>
+                    <a:bodyPr/>
+                    <a:lstStyle/>
+                    <a:p>
+                      <a:r>
+                        <a:rPr lang="en-US" sz="1400" noProof="0" dirty="0" smtClean="0"/>
+                        <a:t>Low</a:t>
+                      </a:r>
+                      <a:endParaRPr lang="en-US" sz="1400" noProof="0" dirty="0"/>
+                    </a:p>
+                  </a:txBody>
+                  <a:tcPr/>
+                </a:tc>
+                <a:tc>
+                  <a:txBody>
+                    <a:bodyPr/>
+                    <a:lstStyle/>
+                    <a:p>
+                      <a:r>
+                        <a:rPr lang="en-US" sz="1400" noProof="0" dirty="0" smtClean="0"/>
+                        <a:t>As</a:t>
+                      </a:r>
+                      <a:r>
+                        <a:rPr lang="en-US" sz="1400" baseline="0" noProof="0" dirty="0" smtClean="0"/>
+                        <a:t> requested by Hyperties, Enforced on each technological </a:t>
+                      </a:r>
+                      <a:r>
+                        <a:rPr lang="en-US" sz="1400" baseline="0" noProof="0" dirty="0" smtClean="0"/>
+                        <a:t>domain;</a:t>
+                      </a:r>
+                    </a:p>
+                    <a:p>
+                      <a:r>
+                        <a:rPr lang="en-US" sz="1400" baseline="0" noProof="0" dirty="0" smtClean="0"/>
+                        <a:t/>
+                      </a:r>
+                      <a:br>
+                        <a:rPr lang="en-US" sz="1400" baseline="0" noProof="0" dirty="0" smtClean="0"/>
+                      </a:br>
+                      <a:r>
+                        <a:rPr lang="en-US" sz="1400" baseline="0" noProof="0" dirty="0" smtClean="0"/>
+                        <a:t>M2M Use Cases applicable</a:t>
+                      </a:r>
+                    </a:p>
+                  </a:txBody>
+                  <a:tcPr/>
+                </a:tc>
+              </a:tr>
+              <a:tr h="370840">
+                <a:tc>
+                  <a:txBody>
+                    <a:bodyPr/>
+                    <a:lstStyle/>
+                    <a:p>
+                      <a:r>
+                        <a:rPr lang="en-US" sz="1400" noProof="0" dirty="0" smtClean="0"/>
+                        <a:t>Redirected Path</a:t>
+                      </a:r>
+                      <a:r>
+                        <a:rPr lang="en-US" sz="1400" baseline="0" noProof="0" dirty="0" smtClean="0"/>
+                        <a:t> for better QoS (run via TURN servers</a:t>
+                      </a:r>
+                      <a:r>
+                        <a:rPr lang="en-US" sz="1400" baseline="0" noProof="0" dirty="0" smtClean="0"/>
+                        <a:t>);</a:t>
+                      </a:r>
+                      <a:endParaRPr lang="en-US" sz="1400" noProof="0" dirty="0"/>
+                    </a:p>
+                  </a:txBody>
+                  <a:tcPr/>
+                </a:tc>
+                <a:tc>
+                  <a:txBody>
+                    <a:bodyPr/>
+                    <a:lstStyle/>
+                    <a:p>
+                      <a:r>
+                        <a:rPr lang="en-US" sz="1400" noProof="0" dirty="0" smtClean="0"/>
+                        <a:t>Guaranteed with pre-defined</a:t>
+                      </a:r>
+                      <a:r>
+                        <a:rPr lang="en-US" sz="1400" baseline="0" noProof="0" dirty="0" smtClean="0"/>
+                        <a:t> </a:t>
+                      </a:r>
+                      <a:r>
+                        <a:rPr lang="en-US" sz="1400" baseline="0" noProof="0" dirty="0" smtClean="0"/>
+                        <a:t>parameters</a:t>
+                      </a:r>
+                      <a:endParaRPr lang="en-US" sz="1400" noProof="0" dirty="0"/>
+                    </a:p>
+                  </a:txBody>
+                  <a:tcPr/>
+                </a:tc>
+                <a:tc>
+                  <a:txBody>
+                    <a:bodyPr/>
+                    <a:lstStyle/>
+                    <a:p>
+                      <a:r>
+                        <a:rPr lang="en-US" sz="1400" noProof="0" dirty="0" smtClean="0"/>
+                        <a:t>Low</a:t>
+                      </a:r>
+                      <a:endParaRPr lang="en-US" sz="1400" noProof="0" dirty="0"/>
+                    </a:p>
+                  </a:txBody>
+                  <a:tcPr/>
+                </a:tc>
+                <a:tc>
+                  <a:txBody>
+                    <a:bodyPr/>
+                    <a:lstStyle/>
+                    <a:p>
+                      <a:r>
+                        <a:rPr lang="en-US" sz="1400" noProof="0" dirty="0" smtClean="0"/>
+                        <a:t>Pre-defined</a:t>
+                      </a:r>
+                    </a:p>
+                    <a:p>
+                      <a:r>
+                        <a:rPr lang="en-US" sz="1400" noProof="0" dirty="0" smtClean="0"/>
+                        <a:t>~</a:t>
+                      </a:r>
+                      <a:r>
+                        <a:rPr lang="en-US" sz="1400" baseline="0" noProof="0" dirty="0" smtClean="0"/>
+                        <a:t> &lt; 150ms</a:t>
+                      </a:r>
+                      <a:endParaRPr lang="en-US" sz="1400" noProof="0" dirty="0"/>
+                    </a:p>
+                  </a:txBody>
+                  <a:tcPr/>
+                </a:tc>
+                <a:tc>
+                  <a:txBody>
+                    <a:bodyPr/>
+                    <a:lstStyle/>
+                    <a:p>
+                      <a:r>
+                        <a:rPr lang="en-US" sz="1400" noProof="0" dirty="0" smtClean="0"/>
+                        <a:t>Low</a:t>
+                      </a:r>
+                      <a:endParaRPr lang="en-US" sz="1400" noProof="0" dirty="0"/>
+                    </a:p>
+                  </a:txBody>
+                  <a:tcPr/>
+                </a:tc>
+                <a:tc>
+                  <a:txBody>
+                    <a:bodyPr/>
+                    <a:lstStyle/>
+                    <a:p>
+                      <a:pPr marL="0" marR="0" indent="0" algn="l" defTabSz="457200" rtl="0" eaLnBrk="1" fontAlgn="auto" latinLnBrk="0" hangingPunct="1">
+                        <a:lnSpc>
+                          <a:spcPct val="100000"/>
+                        </a:lnSpc>
+                        <a:spcBef>
+                          <a:spcPts val="0"/>
+                        </a:spcBef>
+                        <a:spcAft>
+                          <a:spcPts val="0"/>
+                        </a:spcAft>
+                        <a:buClrTx/>
+                        <a:buSzTx/>
+                        <a:buFontTx/>
+                        <a:buNone/>
+                        <a:tabLst/>
+                        <a:defRPr/>
+                      </a:pPr>
+                      <a:r>
+                        <a:rPr lang="de-DE" sz="1400" noProof="0" dirty="0" err="1" smtClean="0"/>
+                        <a:t>Detection</a:t>
+                      </a:r>
+                      <a:r>
+                        <a:rPr lang="de-DE" sz="1400" noProof="0" dirty="0" smtClean="0"/>
+                        <a:t> via TDF</a:t>
+                      </a:r>
+                    </a:p>
+                    <a:p>
+                      <a:pPr marL="0" marR="0" indent="0" algn="l" defTabSz="457200" rtl="0" eaLnBrk="1" fontAlgn="auto" latinLnBrk="0" hangingPunct="1">
+                        <a:lnSpc>
+                          <a:spcPct val="100000"/>
+                        </a:lnSpc>
+                        <a:spcBef>
+                          <a:spcPts val="0"/>
+                        </a:spcBef>
+                        <a:spcAft>
+                          <a:spcPts val="0"/>
+                        </a:spcAft>
+                        <a:buClrTx/>
+                        <a:buSzTx/>
+                        <a:buFontTx/>
+                        <a:buNone/>
+                        <a:tabLst/>
+                        <a:defRPr/>
+                      </a:pPr>
+                      <a:endParaRPr lang="en-US" sz="1400" noProof="0" dirty="0" smtClean="0"/>
+                    </a:p>
+                    <a:p>
+                      <a:pPr marL="0" marR="0" indent="0" algn="l" defTabSz="457200" rtl="0" eaLnBrk="1" fontAlgn="auto" latinLnBrk="0" hangingPunct="1">
+                        <a:lnSpc>
+                          <a:spcPct val="100000"/>
+                        </a:lnSpc>
+                        <a:spcBef>
+                          <a:spcPts val="0"/>
+                        </a:spcBef>
+                        <a:spcAft>
+                          <a:spcPts val="0"/>
+                        </a:spcAft>
+                        <a:buClrTx/>
+                        <a:buSzTx/>
+                        <a:buFontTx/>
+                        <a:buNone/>
+                        <a:tabLst/>
+                        <a:defRPr/>
+                      </a:pPr>
+                      <a:r>
+                        <a:rPr lang="en-US" sz="1400" noProof="0" dirty="0" smtClean="0"/>
+                        <a:t>Pre-defined</a:t>
+                      </a:r>
+                      <a:r>
+                        <a:rPr lang="en-US" sz="1400" baseline="0" noProof="0" dirty="0" smtClean="0"/>
+                        <a:t> </a:t>
+                      </a:r>
+                      <a:r>
+                        <a:rPr lang="en-US" sz="1400" baseline="0" noProof="0" dirty="0" smtClean="0"/>
+                        <a:t>network routes via well established network routes (e.g. TURN</a:t>
+                      </a:r>
+                      <a:r>
+                        <a:rPr lang="en-US" sz="1400" baseline="0" noProof="0" dirty="0" smtClean="0"/>
+                        <a:t>); </a:t>
+                      </a:r>
+                    </a:p>
+                    <a:p>
+                      <a:pPr marL="0" marR="0" indent="0" algn="l" defTabSz="457200" rtl="0" eaLnBrk="1" fontAlgn="auto" latinLnBrk="0" hangingPunct="1">
+                        <a:lnSpc>
+                          <a:spcPct val="100000"/>
+                        </a:lnSpc>
+                        <a:spcBef>
+                          <a:spcPts val="0"/>
+                        </a:spcBef>
+                        <a:spcAft>
+                          <a:spcPts val="0"/>
+                        </a:spcAft>
+                        <a:buClrTx/>
+                        <a:buSzTx/>
+                        <a:buFontTx/>
+                        <a:buNone/>
+                        <a:tabLst/>
+                        <a:defRPr/>
+                      </a:pPr>
+                      <a:endParaRPr lang="en-US" sz="1400" baseline="0" noProof="0" dirty="0" smtClean="0"/>
+                    </a:p>
+                    <a:p>
+                      <a:pPr marL="0" marR="0" indent="0" algn="l" defTabSz="457200" rtl="0" eaLnBrk="1" fontAlgn="auto" latinLnBrk="0" hangingPunct="1">
+                        <a:lnSpc>
+                          <a:spcPct val="100000"/>
+                        </a:lnSpc>
+                        <a:spcBef>
+                          <a:spcPts val="0"/>
+                        </a:spcBef>
+                        <a:spcAft>
+                          <a:spcPts val="0"/>
+                        </a:spcAft>
+                        <a:buClrTx/>
+                        <a:buSzTx/>
+                        <a:buFontTx/>
+                        <a:buNone/>
+                        <a:tabLst/>
+                        <a:defRPr/>
+                      </a:pPr>
+                      <a:r>
+                        <a:rPr lang="en-US" sz="1400" baseline="0" noProof="0" dirty="0" smtClean="0"/>
+                        <a:t>H2H/H2M RTC Use Cases applicable</a:t>
+                      </a:r>
+                      <a:endParaRPr lang="en-US" sz="1400" noProof="0" dirty="0" smtClean="0"/>
+                    </a:p>
+                  </a:txBody>
+                  <a:tcPr/>
+                </a:tc>
+              </a:tr>
+            </a:tbl>
+          </a:graphicData>
+        </a:graphic>
+      </p:graphicFrame>
+    </p:spTree>
+    <p:extLst>
+      <p:ext uri="{BB962C8B-B14F-4D97-AF65-F5344CB8AC3E}">
+        <p14:creationId xmlns:p14="http://schemas.microsoft.com/office/powerpoint/2010/main" val="1315973084"/>
+      </p:ext>
+    </p:extLst>
+  </p:cSld>
+  <p:clrMapOvr>
+    <a:masterClrMapping/>
+  </p:clrMapOvr>
+  <p:timing>
+    <p:tnLst>
+      <p:par>
+        <p:cTn id="1" dur="indefinite" restart="never" nodeType="tmRoot"/>
+      </p:par>
+    </p:tnLst>
+  </p:timing>
 </p:sld>
 </file>
 
@@ -9335,4 +10862,289 @@
   <a:objectDefaults/>
   <a:extraClrSchemeLst/>
 </a:theme>
+</file>
+
+<file path=ppt/theme/theme2.xml><?xml version="1.0" encoding="utf-8"?>
+<a:theme xmlns:a="http://schemas.openxmlformats.org/drawingml/2006/main" name="Office Theme">
+  <a:themeElements>
+    <a:clrScheme name="Office">
+      <a:dk1>
+        <a:sysClr val="windowText" lastClr="000000"/>
+      </a:dk1>
+      <a:lt1>
+        <a:sysClr val="window" lastClr="FFFFFF"/>
+      </a:lt1>
+      <a:dk2>
+        <a:srgbClr val="1F497D"/>
+      </a:dk2>
+      <a:lt2>
+        <a:srgbClr val="EEECE1"/>
+      </a:lt2>
+      <a:accent1>
+        <a:srgbClr val="4F81BD"/>
+      </a:accent1>
+      <a:accent2>
+        <a:srgbClr val="C0504D"/>
+      </a:accent2>
+      <a:accent3>
+        <a:srgbClr val="9BBB59"/>
+      </a:accent3>
+      <a:accent4>
+        <a:srgbClr val="8064A2"/>
+      </a:accent4>
+      <a:accent5>
+        <a:srgbClr val="4BACC6"/>
+      </a:accent5>
+      <a:accent6>
+        <a:srgbClr val="F79646"/>
+      </a:accent6>
+      <a:hlink>
+        <a:srgbClr val="0000FF"/>
+      </a:hlink>
+      <a:folHlink>
+        <a:srgbClr val="800080"/>
+      </a:folHlink>
+    </a:clrScheme>
+    <a:fontScheme name="Office">
+      <a:majorFont>
+        <a:latin typeface="Calibri"/>
+        <a:ea typeface=""/>
+        <a:cs typeface=""/>
+        <a:font script="Jpan" typeface="ＭＳ Ｐゴシック"/>
+        <a:font script="Hang" typeface="맑은 고딕"/>
+        <a:font script="Hans" typeface="宋体"/>
+        <a:font script="Hant" typeface="新細明體"/>
+        <a:font script="Arab" typeface="Times New Roman"/>
+        <a:font script="Hebr" typeface="Times New Roman"/>
+        <a:font script="Thai" typeface="Angsana New"/>
+        <a:font script="Ethi" typeface="Nyala"/>
+        <a:font script="Beng" typeface="Vrinda"/>
+        <a:font script="Gujr" typeface="Shruti"/>
+        <a:font script="Khmr" typeface="MoolBoran"/>
+        <a:font script="Knda" typeface="Tunga"/>
+        <a:font script="Guru" typeface="Raavi"/>
+        <a:font script="Cans" typeface="Euphemia"/>
+        <a:font script="Cher" typeface="Plantagenet Cherokee"/>
+        <a:font script="Yiii" typeface="Microsoft Yi Baiti"/>
+        <a:font script="Tibt" typeface="Microsoft Himalaya"/>
+        <a:font script="Thaa" typeface="MV Boli"/>
+        <a:font script="Deva" typeface="Mangal"/>
+        <a:font script="Telu" typeface="Gautami"/>
+        <a:font script="Taml" typeface="Latha"/>
+        <a:font script="Syrc" typeface="Estrangelo Edessa"/>
+        <a:font script="Orya" typeface="Kalinga"/>
+        <a:font script="Mlym" typeface="Kartika"/>
+        <a:font script="Laoo" typeface="DokChampa"/>
+        <a:font script="Sinh" typeface="Iskoola Pota"/>
+        <a:font script="Mong" typeface="Mongolian Baiti"/>
+        <a:font script="Viet" typeface="Times New Roman"/>
+        <a:font script="Uigh" typeface="Microsoft Uighur"/>
+        <a:font script="Geor" typeface="Sylfaen"/>
+      </a:majorFont>
+      <a:minorFont>
+        <a:latin typeface="Calibri"/>
+        <a:ea typeface=""/>
+        <a:cs typeface=""/>
+        <a:font script="Jpan" typeface="ＭＳ Ｐゴシック"/>
+        <a:font script="Hang" typeface="맑은 고딕"/>
+        <a:font script="Hans" typeface="宋体"/>
+        <a:font script="Hant" typeface="新細明體"/>
+        <a:font script="Arab" typeface="Arial"/>
+        <a:font script="Hebr" typeface="Arial"/>
+        <a:font script="Thai" typeface="Cordia New"/>
+        <a:font script="Ethi" typeface="Nyala"/>
+        <a:font script="Beng" typeface="Vrinda"/>
+        <a:font script="Gujr" typeface="Shruti"/>
+        <a:font script="Khmr" typeface="DaunPenh"/>
+        <a:font script="Knda" typeface="Tunga"/>
+        <a:font script="Guru" typeface="Raavi"/>
+        <a:font script="Cans" typeface="Euphemia"/>
+        <a:font script="Cher" typeface="Plantagenet Cherokee"/>
+        <a:font script="Yiii" typeface="Microsoft Yi Baiti"/>
+        <a:font script="Tibt" typeface="Microsoft Himalaya"/>
+        <a:font script="Thaa" typeface="MV Boli"/>
+        <a:font script="Deva" typeface="Mangal"/>
+        <a:font script="Telu" typeface="Gautami"/>
+        <a:font script="Taml" typeface="Latha"/>
+        <a:font script="Syrc" typeface="Estrangelo Edessa"/>
+        <a:font script="Orya" typeface="Kalinga"/>
+        <a:font script="Mlym" typeface="Kartika"/>
+        <a:font script="Laoo" typeface="DokChampa"/>
+        <a:font script="Sinh" typeface="Iskoola Pota"/>
+        <a:font script="Mong" typeface="Mongolian Baiti"/>
+        <a:font script="Viet" typeface="Arial"/>
+        <a:font script="Uigh" typeface="Microsoft Uighur"/>
+        <a:font script="Geor" typeface="Sylfaen"/>
+      </a:minorFont>
+    </a:fontScheme>
+    <a:fmtScheme name="Office">
+      <a:fillStyleLst>
+        <a:solidFill>
+          <a:schemeClr val="phClr"/>
+        </a:solidFill>
+        <a:gradFill rotWithShape="1">
+          <a:gsLst>
+            <a:gs pos="0">
+              <a:schemeClr val="phClr">
+                <a:tint val="50000"/>
+                <a:satMod val="300000"/>
+              </a:schemeClr>
+            </a:gs>
+            <a:gs pos="35000">
+              <a:schemeClr val="phClr">
+                <a:tint val="37000"/>
+                <a:satMod val="300000"/>
+              </a:schemeClr>
+            </a:gs>
+            <a:gs pos="100000">
+              <a:schemeClr val="phClr">
+                <a:tint val="15000"/>
+                <a:satMod val="350000"/>
+              </a:schemeClr>
+            </a:gs>
+          </a:gsLst>
+          <a:lin ang="16200000" scaled="1"/>
+        </a:gradFill>
+        <a:gradFill rotWithShape="1">
+          <a:gsLst>
+            <a:gs pos="0">
+              <a:schemeClr val="phClr">
+                <a:shade val="51000"/>
+                <a:satMod val="130000"/>
+              </a:schemeClr>
+            </a:gs>
+            <a:gs pos="80000">
+              <a:schemeClr val="phClr">
+                <a:shade val="93000"/>
+                <a:satMod val="130000"/>
+              </a:schemeClr>
+            </a:gs>
+            <a:gs pos="100000">
+              <a:schemeClr val="phClr">
+                <a:shade val="94000"/>
+                <a:satMod val="135000"/>
+              </a:schemeClr>
+            </a:gs>
+          </a:gsLst>
+          <a:lin ang="16200000" scaled="0"/>
+        </a:gradFill>
+      </a:fillStyleLst>
+      <a:lnStyleLst>
+        <a:ln w="9525" cap="flat" cmpd="sng" algn="ctr">
+          <a:solidFill>
+            <a:schemeClr val="phClr">
+              <a:shade val="95000"/>
+              <a:satMod val="105000"/>
+            </a:schemeClr>
+          </a:solidFill>
+          <a:prstDash val="solid"/>
+        </a:ln>
+        <a:ln w="25400" cap="flat" cmpd="sng" algn="ctr">
+          <a:solidFill>
+            <a:schemeClr val="phClr"/>
+          </a:solidFill>
+          <a:prstDash val="solid"/>
+        </a:ln>
+        <a:ln w="38100" cap="flat" cmpd="sng" algn="ctr">
+          <a:solidFill>
+            <a:schemeClr val="phClr"/>
+          </a:solidFill>
+          <a:prstDash val="solid"/>
+        </a:ln>
+      </a:lnStyleLst>
+      <a:effectStyleLst>
+        <a:effectStyle>
+          <a:effectLst>
+            <a:outerShdw blurRad="40000" dist="20000" dir="5400000" rotWithShape="0">
+              <a:srgbClr val="000000">
+                <a:alpha val="38000"/>
+              </a:srgbClr>
+            </a:outerShdw>
+          </a:effectLst>
+        </a:effectStyle>
+        <a:effectStyle>
+          <a:effectLst>
+            <a:outerShdw blurRad="40000" dist="23000" dir="5400000" rotWithShape="0">
+              <a:srgbClr val="000000">
+                <a:alpha val="35000"/>
+              </a:srgbClr>
+            </a:outerShdw>
+          </a:effectLst>
+        </a:effectStyle>
+        <a:effectStyle>
+          <a:effectLst>
+            <a:outerShdw blurRad="40000" dist="23000" dir="5400000" rotWithShape="0">
+              <a:srgbClr val="000000">
+                <a:alpha val="35000"/>
+              </a:srgbClr>
+            </a:outerShdw>
+          </a:effectLst>
+          <a:scene3d>
+            <a:camera prst="orthographicFront">
+              <a:rot lat="0" lon="0" rev="0"/>
+            </a:camera>
+            <a:lightRig rig="threePt" dir="t">
+              <a:rot lat="0" lon="0" rev="1200000"/>
+            </a:lightRig>
+          </a:scene3d>
+          <a:sp3d>
+            <a:bevelT w="63500" h="25400"/>
+          </a:sp3d>
+        </a:effectStyle>
+      </a:effectStyleLst>
+      <a:bgFillStyleLst>
+        <a:solidFill>
+          <a:schemeClr val="phClr"/>
+        </a:solidFill>
+        <a:gradFill rotWithShape="1">
+          <a:gsLst>
+            <a:gs pos="0">
+              <a:schemeClr val="phClr">
+                <a:tint val="40000"/>
+                <a:satMod val="350000"/>
+              </a:schemeClr>
+            </a:gs>
+            <a:gs pos="40000">
+              <a:schemeClr val="phClr">
+                <a:tint val="45000"/>
+                <a:shade val="99000"/>
+                <a:satMod val="350000"/>
+              </a:schemeClr>
+            </a:gs>
+            <a:gs pos="100000">
+              <a:schemeClr val="phClr">
+                <a:shade val="20000"/>
+                <a:satMod val="255000"/>
+              </a:schemeClr>
+            </a:gs>
+          </a:gsLst>
+          <a:path path="circle">
+            <a:fillToRect l="50000" t="-80000" r="50000" b="180000"/>
+          </a:path>
+        </a:gradFill>
+        <a:gradFill rotWithShape="1">
+          <a:gsLst>
+            <a:gs pos="0">
+              <a:schemeClr val="phClr">
+                <a:tint val="80000"/>
+                <a:satMod val="300000"/>
+              </a:schemeClr>
+            </a:gs>
+            <a:gs pos="100000">
+              <a:schemeClr val="phClr">
+                <a:shade val="30000"/>
+                <a:satMod val="200000"/>
+              </a:schemeClr>
+            </a:gs>
+          </a:gsLst>
+          <a:path path="circle">
+            <a:fillToRect l="50000" t="50000" r="50000" b="50000"/>
+          </a:path>
+        </a:gradFill>
+      </a:bgFillStyleLst>
+    </a:fmtScheme>
+  </a:themeElements>
+  <a:objectDefaults/>
+  <a:extraClrSchemeLst/>
+</a:theme>
 </file>
</xml_diff>

<commit_message>
Update Arch - Minor typos
</commit_message>
<xml_diff>
--- a/docs/meetings/WP3.3/architectures_solutions_new.pptx
+++ b/docs/meetings/WP3.3/architectures_solutions_new.pptx
@@ -3579,6 +3579,13 @@
   <p:clrMapOvr>
     <a:masterClrMapping/>
   </p:clrMapOvr>
+  <p:timing>
+    <p:tnLst>
+      <p:par>
+        <p:cTn id="1" dur="indefinite" restart="never" nodeType="tmRoot"/>
+      </p:par>
+    </p:tnLst>
+  </p:timing>
 </p:sld>
 </file>
 
@@ -3839,6 +3846,13 @@
   <p:clrMapOvr>
     <a:masterClrMapping/>
   </p:clrMapOvr>
+  <p:timing>
+    <p:tnLst>
+      <p:par>
+        <p:cTn id="1" dur="indefinite" restart="never" nodeType="tmRoot"/>
+      </p:par>
+    </p:tnLst>
+  </p:timing>
 </p:sld>
 </file>
 
@@ -4456,6 +4470,13 @@
   <p:clrMapOvr>
     <a:masterClrMapping/>
   </p:clrMapOvr>
+  <p:timing>
+    <p:tnLst>
+      <p:par>
+        <p:cTn id="1" dur="indefinite" restart="never" nodeType="tmRoot"/>
+      </p:par>
+    </p:tnLst>
+  </p:timing>
 </p:sld>
 </file>
 
@@ -5207,6 +5228,13 @@
   <p:clrMapOvr>
     <a:masterClrMapping/>
   </p:clrMapOvr>
+  <p:timing>
+    <p:tnLst>
+      <p:par>
+        <p:cTn id="1" dur="indefinite" restart="never" nodeType="tmRoot"/>
+      </p:par>
+    </p:tnLst>
+  </p:timing>
 </p:sld>
 </file>
 
@@ -5976,6 +6004,13 @@
   <p:clrMapOvr>
     <a:masterClrMapping/>
   </p:clrMapOvr>
+  <p:timing>
+    <p:tnLst>
+      <p:par>
+        <p:cTn id="1" dur="indefinite" restart="never" nodeType="tmRoot"/>
+      </p:par>
+    </p:tnLst>
+  </p:timing>
 </p:sld>
 </file>
 
@@ -7535,6 +7570,13 @@
   <p:clrMapOvr>
     <a:masterClrMapping/>
   </p:clrMapOvr>
+  <p:timing>
+    <p:tnLst>
+      <p:par>
+        <p:cTn id="1" dur="indefinite" restart="never" nodeType="tmRoot"/>
+      </p:par>
+    </p:tnLst>
+  </p:timing>
 </p:sld>
 </file>
 
@@ -9854,6 +9896,13 @@
   <p:clrMapOvr>
     <a:masterClrMapping/>
   </p:clrMapOvr>
+  <p:timing>
+    <p:tnLst>
+      <p:par>
+        <p:cTn id="1" dur="indefinite" restart="never" nodeType="tmRoot"/>
+      </p:par>
+    </p:tnLst>
+  </p:timing>
 </p:sld>
 </file>
 
@@ -9930,7 +9979,7 @@
           <p:nvPr>
             <p:extLst>
               <p:ext uri="{D42A27DB-BD31-4B8C-83A1-F6EECF244321}">
-                <p14:modId xmlns:p14="http://schemas.microsoft.com/office/powerpoint/2010/main" val="4175511772"/>
+                <p14:modId xmlns:p14="http://schemas.microsoft.com/office/powerpoint/2010/main" val="1918768960"/>
               </p:ext>
             </p:extLst>
           </p:nvPr>
@@ -10161,16 +10210,16 @@
                         <a:rPr lang="en-US" sz="1400" baseline="0" noProof="0" dirty="0" smtClean="0"/>
                       </a:br>
                       <a:r>
-                        <a:rPr lang="en-US" sz="1400" baseline="0" noProof="0" dirty="0" smtClean="0"/>
+                        <a:rPr lang="en-US" sz="1400" baseline="0" noProof="0" smtClean="0"/>
                         <a:t>(</a:t>
                       </a:r>
                       <a:r>
-                        <a:rPr lang="en-US" sz="1400" baseline="0" noProof="0" dirty="0" err="1" smtClean="0"/>
-                        <a:t>baed</a:t>
+                        <a:rPr lang="en-US" sz="1400" baseline="0" noProof="0" smtClean="0"/>
+                        <a:t>based </a:t>
                       </a:r>
                       <a:r>
                         <a:rPr lang="en-US" sz="1400" baseline="0" noProof="0" dirty="0" smtClean="0"/>
-                        <a:t> on network parameters for direct comm.)</a:t>
+                        <a:t>on network parameters for direct comm.)</a:t>
                       </a:r>
                       <a:endParaRPr lang="en-US" sz="1400" noProof="0" dirty="0"/>
                     </a:p>
@@ -10387,12 +10436,8 @@
                         <a:defRPr/>
                       </a:pPr>
                       <a:r>
-                        <a:rPr lang="de-DE" sz="1400" noProof="0" dirty="0" err="1" smtClean="0"/>
-                        <a:t>Detection</a:t>
-                      </a:r>
-                      <a:r>
-                        <a:rPr lang="de-DE" sz="1400" noProof="0" dirty="0" smtClean="0"/>
-                        <a:t> via TDF</a:t>
+                        <a:rPr lang="en-US" sz="1400" noProof="0" dirty="0" smtClean="0"/>
+                        <a:t>Detection via TDF</a:t>
                       </a:r>
                     </a:p>
                     <a:p>

</xml_diff>

<commit_message>
architecture_prez added, which was presented at the plenary meeting
</commit_message>
<xml_diff>
--- a/docs/meetings/WP3.3/architectures_solutions_new.pptx
+++ b/docs/meetings/WP3.3/architectures_solutions_new.pptx
@@ -10210,11 +10210,11 @@
                         <a:rPr lang="en-US" sz="1400" baseline="0" noProof="0" dirty="0" smtClean="0"/>
                       </a:br>
                       <a:r>
-                        <a:rPr lang="en-US" sz="1400" baseline="0" noProof="0" smtClean="0"/>
+                        <a:rPr lang="en-US" sz="1400" baseline="0" noProof="0" dirty="0" smtClean="0"/>
                         <a:t>(</a:t>
                       </a:r>
                       <a:r>
-                        <a:rPr lang="en-US" sz="1400" baseline="0" noProof="0" smtClean="0"/>
+                        <a:rPr lang="en-US" sz="1400" baseline="0" noProof="0" dirty="0" smtClean="0"/>
                         <a:t>based </a:t>
                       </a:r>
                       <a:r>

</xml_diff>

<commit_message>
Calculation was wrong - now the first proposal seems to be correct.
</commit_message>
<xml_diff>
--- a/docs/meetings/WP3.3/architectures_solutions_new.pptx
+++ b/docs/meetings/WP3.3/architectures_solutions_new.pptx
@@ -45811,7 +45811,7 @@
             <p:spPr>
               <a:xfrm>
                 <a:off x="1835696" y="5539614"/>
-                <a:ext cx="5135830" cy="531299"/>
+                <a:ext cx="4635692" cy="531299"/>
               </a:xfrm>
               <a:prstGeom prst="rect">
                 <a:avLst/>
@@ -45824,6 +45824,7 @@
               </a:bodyPr>
               <a:lstStyle/>
               <a:p>
+                <a:pPr/>
                 <a14:m>
                   <m:oMathPara xmlns:m="http://schemas.openxmlformats.org/officeDocument/2006/math">
                     <m:oMathParaPr>
@@ -45883,7 +45884,7 @@
                         <a:rPr lang="de-DE" b="0" i="1" smtClean="0">
                           <a:latin typeface="Cambria Math"/>
                         </a:rPr>
-                        <m:t> (1+</m:t>
+                        <m:t> </m:t>
                       </m:r>
                       <m:sSup>
                         <m:sSupPr>
@@ -45991,12 +45992,6 @@
                           </m:f>
                         </m:sup>
                       </m:sSup>
-                      <m:r>
-                        <a:rPr lang="de-DE" b="0" i="1" smtClean="0">
-                          <a:latin typeface="Cambria Math"/>
-                        </a:rPr>
-                        <m:t>)</m:t>
-                      </m:r>
                     </m:oMath>
                   </m:oMathPara>
                 </a14:m>
@@ -46017,7 +46012,7 @@
             <p:spPr>
               <a:xfrm>
                 <a:off x="1835696" y="5539614"/>
-                <a:ext cx="5135830" cy="531299"/>
+                <a:ext cx="4635692" cy="531299"/>
               </a:xfrm>
               <a:prstGeom prst="rect">
                 <a:avLst/>
@@ -46405,7 +46400,7 @@
             <p:spPr>
               <a:xfrm>
                 <a:off x="827584" y="2287972"/>
-                <a:ext cx="5235472" cy="2078261"/>
+                <a:ext cx="4990405" cy="2042547"/>
               </a:xfrm>
               <a:prstGeom prst="rect">
                 <a:avLst/>
@@ -46418,6 +46413,7 @@
               </a:bodyPr>
               <a:lstStyle/>
               <a:p>
+                <a:pPr/>
                 <a14:m>
                   <m:oMathPara xmlns:m="http://schemas.openxmlformats.org/officeDocument/2006/math">
                     <m:oMathParaPr>
@@ -46477,7 +46473,7 @@
                         <a:rPr lang="de-DE" b="0" i="1" smtClean="0">
                           <a:latin typeface="Cambria Math"/>
                         </a:rPr>
-                        <m:t> (1+</m:t>
+                        <m:t> </m:t>
                       </m:r>
                       <m:sSup>
                         <m:sSupPr>
@@ -46585,12 +46581,6 @@
                           </m:f>
                         </m:sup>
                       </m:sSup>
-                      <m:r>
-                        <a:rPr lang="de-DE" b="0" i="1" smtClean="0">
-                          <a:latin typeface="Cambria Math"/>
-                        </a:rPr>
-                        <m:t>)</m:t>
-                      </m:r>
                     </m:oMath>
                   </m:oMathPara>
                 </a14:m>
@@ -46609,6 +46599,7 @@
                 <a:endParaRPr lang="de-DE" dirty="0"/>
               </a:p>
               <a:p>
+                <a:pPr/>
                 <a14:m>
                   <m:oMathPara xmlns:m="http://schemas.openxmlformats.org/officeDocument/2006/math">
                     <m:oMathParaPr>
@@ -46656,7 +46647,7 @@
                         <a:rPr lang="de-DE" b="0" i="1" smtClean="0">
                           <a:latin typeface="Cambria Math"/>
                         </a:rPr>
-                        <m:t>40 </m:t>
+                        <m:t>40</m:t>
                       </m:r>
                       <m:r>
                         <a:rPr lang="de-DE" b="0" i="1" smtClean="0">
@@ -46664,72 +46655,73 @@
                         </a:rPr>
                         <m:t>𝑚𝑠</m:t>
                       </m:r>
-                      <m:d>
-                        <m:dPr>
+                      <m:sSup>
+                        <m:sSupPr>
                           <m:ctrlPr>
+                            <a:rPr lang="de-DE" i="1">
+                              <a:latin typeface="Cambria Math"/>
+                            </a:rPr>
+                          </m:ctrlPr>
+                        </m:sSupPr>
+                        <m:e>
+                          <m:r>
                             <a:rPr lang="de-DE" b="0" i="1" smtClean="0">
                               <a:latin typeface="Cambria Math"/>
                             </a:rPr>
-                          </m:ctrlPr>
-                        </m:dPr>
-                        <m:e>
+                            <m:t> </m:t>
+                          </m:r>
                           <m:r>
                             <a:rPr lang="de-DE" i="1">
                               <a:latin typeface="Cambria Math"/>
                             </a:rPr>
-                            <m:t>1+</m:t>
+                            <m:t>𝑒</m:t>
                           </m:r>
-                          <m:sSup>
-                            <m:sSupPr>
+                        </m:e>
+                        <m:sup>
+                          <m:f>
+                            <m:fPr>
                               <m:ctrlPr>
                                 <a:rPr lang="de-DE" i="1">
                                   <a:latin typeface="Cambria Math"/>
                                 </a:rPr>
                               </m:ctrlPr>
-                            </m:sSupPr>
-                            <m:e>
+                            </m:fPr>
+                            <m:num>
                               <m:r>
                                 <a:rPr lang="de-DE" i="1">
                                   <a:latin typeface="Cambria Math"/>
                                 </a:rPr>
-                                <m:t>𝑒</m:t>
+                                <m:t>10</m:t>
                               </m:r>
-                            </m:e>
-                            <m:sup>
-                              <m:f>
-                                <m:fPr>
-                                  <m:ctrlPr>
-                                    <a:rPr lang="de-DE" i="1">
-                                      <a:latin typeface="Cambria Math"/>
-                                    </a:rPr>
-                                  </m:ctrlPr>
-                                </m:fPr>
-                                <m:num>
-                                  <m:r>
-                                    <a:rPr lang="de-DE" b="0" i="1" smtClean="0">
-                                      <a:latin typeface="Cambria Math"/>
-                                    </a:rPr>
-                                    <m:t>10</m:t>
-                                  </m:r>
-                                </m:num>
-                                <m:den>
-                                  <m:r>
-                                    <a:rPr lang="de-DE" b="0" i="1" smtClean="0">
-                                      <a:latin typeface="Cambria Math"/>
-                                    </a:rPr>
-                                    <m:t>50</m:t>
-                                  </m:r>
-                                </m:den>
-                              </m:f>
-                            </m:sup>
-                          </m:sSup>
-                        </m:e>
-                      </m:d>
+                            </m:num>
+                            <m:den>
+                              <m:r>
+                                <a:rPr lang="de-DE" i="1">
+                                  <a:latin typeface="Cambria Math"/>
+                                </a:rPr>
+                                <m:t>50</m:t>
+                              </m:r>
+                            </m:den>
+                          </m:f>
+                        </m:sup>
+                      </m:sSup>
                       <m:r>
                         <a:rPr lang="de-DE" b="0" i="1" smtClean="0">
                           <a:latin typeface="Cambria Math"/>
                         </a:rPr>
-                        <m:t>=88.8 </m:t>
+                        <m:t>=</m:t>
+                      </m:r>
+                      <m:r>
+                        <a:rPr lang="de-DE" b="0" i="1" smtClean="0">
+                          <a:latin typeface="Cambria Math"/>
+                        </a:rPr>
+                        <m:t>4</m:t>
+                      </m:r>
+                      <m:r>
+                        <a:rPr lang="de-DE" b="0" i="1" smtClean="0">
+                          <a:latin typeface="Cambria Math"/>
+                        </a:rPr>
+                        <m:t>8.8</m:t>
                       </m:r>
                       <m:r>
                         <a:rPr lang="de-DE" b="0" i="1" smtClean="0">
@@ -46741,7 +46733,7 @@
                         <a:rPr lang="de-DE" b="0" i="1" smtClean="0">
                           <a:latin typeface="Cambria Math"/>
                         </a:rPr>
-                        <m:t>=89 </m:t>
+                        <m:t>=49</m:t>
                       </m:r>
                       <m:r>
                         <a:rPr lang="de-DE" b="0" i="1" smtClean="0">
@@ -46772,7 +46764,7 @@
             <p:spPr>
               <a:xfrm>
                 <a:off x="827584" y="2287972"/>
-                <a:ext cx="5235472" cy="2078261"/>
+                <a:ext cx="4990405" cy="2042547"/>
               </a:xfrm>
               <a:prstGeom prst="rect">
                 <a:avLst/>
@@ -46780,7 +46772,7 @@
               <a:blipFill rotWithShape="1">
                 <a:blip r:embed="rId2"/>
                 <a:stretch>
-                  <a:fillRect l="-1048"/>
+                  <a:fillRect l="-1100"/>
                 </a:stretch>
               </a:blipFill>
             </p:spPr>

</xml_diff>